<commit_message>
Add `JavaMailSender` mock to tests, align profile configurations, and update npm dependencies. Introduced shared test properties file and removed authorization header checks in mock requests.
</commit_message>
<xml_diff>
--- a/doc/history/presentations/template.pptx
+++ b/doc/history/presentations/template.pptx
@@ -351,11 +351,15 @@
           <a:bodyPr/>
           <a:lstStyle/>
           <a:p>
-            <a:fld id="{C1FF6DA9-008F-8B48-92A6-B652298478BF}" type="slidenum">
-              <a:rPr lang="en-US" smtClean="0"/>
-              <a:t>‹#›</a:t>
-            </a:fld>
-            <a:endParaRPr lang="en-US"/>
+            <a:r>
+              <a:rPr lang="en-US" sz="900">
+                <a:solidFill>
+                  <a:srgbClr val="808080"/>
+                </a:solidFill>
+                <a:latin typeface="Calibri"/>
+              </a:rPr>
+              <a:t>&lt;#&gt;</a:t>
+            </a:r>
           </a:p>
         </p:txBody>
       </p:sp>
@@ -500,11 +504,15 @@
           <a:bodyPr/>
           <a:lstStyle/>
           <a:p>
-            <a:fld id="{C1FF6DA9-008F-8B48-92A6-B652298478BF}" type="slidenum">
-              <a:rPr lang="en-US" smtClean="0"/>
-              <a:t>‹#›</a:t>
-            </a:fld>
-            <a:endParaRPr lang="en-US"/>
+            <a:r>
+              <a:rPr lang="en-US" sz="900">
+                <a:solidFill>
+                  <a:srgbClr val="808080"/>
+                </a:solidFill>
+                <a:latin typeface="Calibri"/>
+              </a:rPr>
+              <a:t>&lt;#&gt;</a:t>
+            </a:r>
           </a:p>
         </p:txBody>
       </p:sp>
@@ -649,11 +657,15 @@
           <a:bodyPr/>
           <a:lstStyle/>
           <a:p>
-            <a:fld id="{C1FF6DA9-008F-8B48-92A6-B652298478BF}" type="slidenum">
-              <a:rPr lang="en-US" smtClean="0"/>
-              <a:t>‹#›</a:t>
-            </a:fld>
-            <a:endParaRPr lang="en-US"/>
+            <a:r>
+              <a:rPr lang="en-US" sz="900">
+                <a:solidFill>
+                  <a:srgbClr val="808080"/>
+                </a:solidFill>
+                <a:latin typeface="Calibri"/>
+              </a:rPr>
+              <a:t>&lt;#&gt;</a:t>
+            </a:r>
           </a:p>
         </p:txBody>
       </p:sp>
@@ -832,11 +844,15 @@
           <a:bodyPr/>
           <a:lstStyle/>
           <a:p>
-            <a:fld id="{C1FF6DA9-008F-8B48-92A6-B652298478BF}" type="slidenum">
-              <a:rPr lang="en-US" smtClean="0"/>
-              <a:t>‹#›</a:t>
-            </a:fld>
-            <a:endParaRPr lang="en-US"/>
+            <a:r>
+              <a:rPr lang="en-US" sz="900">
+                <a:solidFill>
+                  <a:srgbClr val="808080"/>
+                </a:solidFill>
+                <a:latin typeface="Calibri"/>
+              </a:rPr>
+              <a:t>&lt;#&gt;</a:t>
+            </a:r>
           </a:p>
         </p:txBody>
       </p:sp>
@@ -1076,11 +1092,15 @@
           <a:bodyPr/>
           <a:lstStyle/>
           <a:p>
-            <a:fld id="{C1FF6DA9-008F-8B48-92A6-B652298478BF}" type="slidenum">
-              <a:rPr lang="en-US" smtClean="0"/>
-              <a:t>‹#›</a:t>
-            </a:fld>
-            <a:endParaRPr lang="en-US"/>
+            <a:r>
+              <a:rPr lang="en-US" sz="900">
+                <a:solidFill>
+                  <a:srgbClr val="808080"/>
+                </a:solidFill>
+                <a:latin typeface="Calibri"/>
+              </a:rPr>
+              <a:t>&lt;#&gt;</a:t>
+            </a:r>
           </a:p>
         </p:txBody>
       </p:sp>
@@ -1366,11 +1386,15 @@
           <a:bodyPr/>
           <a:lstStyle/>
           <a:p>
-            <a:fld id="{C1FF6DA9-008F-8B48-92A6-B652298478BF}" type="slidenum">
-              <a:rPr lang="en-US" smtClean="0"/>
-              <a:t>‹#›</a:t>
-            </a:fld>
-            <a:endParaRPr lang="en-US"/>
+            <a:r>
+              <a:rPr lang="en-US" sz="900">
+                <a:solidFill>
+                  <a:srgbClr val="808080"/>
+                </a:solidFill>
+                <a:latin typeface="Calibri"/>
+              </a:rPr>
+              <a:t>&lt;#&gt;</a:t>
+            </a:r>
           </a:p>
         </p:txBody>
       </p:sp>
@@ -1788,11 +1812,15 @@
           <a:bodyPr/>
           <a:lstStyle/>
           <a:p>
-            <a:fld id="{C1FF6DA9-008F-8B48-92A6-B652298478BF}" type="slidenum">
-              <a:rPr lang="en-US" smtClean="0"/>
-              <a:t>‹#›</a:t>
-            </a:fld>
-            <a:endParaRPr lang="en-US"/>
+            <a:r>
+              <a:rPr lang="en-US" sz="900">
+                <a:solidFill>
+                  <a:srgbClr val="808080"/>
+                </a:solidFill>
+                <a:latin typeface="Calibri"/>
+              </a:rPr>
+              <a:t>&lt;#&gt;</a:t>
+            </a:r>
           </a:p>
         </p:txBody>
       </p:sp>
@@ -1915,11 +1943,15 @@
           <a:bodyPr/>
           <a:lstStyle/>
           <a:p>
-            <a:fld id="{C1FF6DA9-008F-8B48-92A6-B652298478BF}" type="slidenum">
-              <a:rPr lang="en-US" smtClean="0"/>
-              <a:t>‹#›</a:t>
-            </a:fld>
-            <a:endParaRPr lang="en-US"/>
+            <a:r>
+              <a:rPr lang="en-US" sz="900">
+                <a:solidFill>
+                  <a:srgbClr val="808080"/>
+                </a:solidFill>
+                <a:latin typeface="Calibri"/>
+              </a:rPr>
+              <a:t>&lt;#&gt;</a:t>
+            </a:r>
           </a:p>
         </p:txBody>
       </p:sp>
@@ -2015,11 +2047,15 @@
           <a:bodyPr/>
           <a:lstStyle/>
           <a:p>
-            <a:fld id="{C1FF6DA9-008F-8B48-92A6-B652298478BF}" type="slidenum">
-              <a:rPr lang="en-US" smtClean="0"/>
-              <a:t>‹#›</a:t>
-            </a:fld>
-            <a:endParaRPr lang="en-US"/>
+            <a:r>
+              <a:rPr lang="en-US" sz="900">
+                <a:solidFill>
+                  <a:srgbClr val="808080"/>
+                </a:solidFill>
+                <a:latin typeface="Calibri"/>
+              </a:rPr>
+              <a:t>&lt;#&gt;</a:t>
+            </a:r>
           </a:p>
         </p:txBody>
       </p:sp>
@@ -2289,11 +2325,15 @@
           <a:bodyPr/>
           <a:lstStyle/>
           <a:p>
-            <a:fld id="{C1FF6DA9-008F-8B48-92A6-B652298478BF}" type="slidenum">
-              <a:rPr lang="en-US" smtClean="0"/>
-              <a:t>‹#›</a:t>
-            </a:fld>
-            <a:endParaRPr lang="en-US"/>
+            <a:r>
+              <a:rPr lang="en-US" sz="900">
+                <a:solidFill>
+                  <a:srgbClr val="808080"/>
+                </a:solidFill>
+                <a:latin typeface="Calibri"/>
+              </a:rPr>
+              <a:t>&lt;#&gt;</a:t>
+            </a:r>
           </a:p>
         </p:txBody>
       </p:sp>
@@ -2540,11 +2580,15 @@
           <a:bodyPr/>
           <a:lstStyle/>
           <a:p>
-            <a:fld id="{C1FF6DA9-008F-8B48-92A6-B652298478BF}" type="slidenum">
-              <a:rPr lang="en-US" smtClean="0"/>
-              <a:t>‹#›</a:t>
-            </a:fld>
-            <a:endParaRPr lang="en-US"/>
+            <a:r>
+              <a:rPr lang="en-US" sz="900">
+                <a:solidFill>
+                  <a:srgbClr val="808080"/>
+                </a:solidFill>
+                <a:latin typeface="Calibri"/>
+              </a:rPr>
+              <a:t>&lt;#&gt;</a:t>
+            </a:r>
           </a:p>
         </p:txBody>
       </p:sp>
@@ -2787,11 +2831,180 @@
             </a:lvl1pPr>
           </a:lstStyle>
           <a:p>
-            <a:fld id="{C1FF6DA9-008F-8B48-92A6-B652298478BF}" type="slidenum">
-              <a:rPr lang="en-US" smtClean="0"/>
-              <a:t>‹#›</a:t>
-            </a:fld>
-            <a:endParaRPr lang="en-US"/>
+            <a:r>
+              <a:rPr lang="en-US" sz="900">
+                <a:solidFill>
+                  <a:srgbClr val="808080"/>
+                </a:solidFill>
+                <a:latin typeface="Calibri"/>
+              </a:rPr>
+              <a:t>&lt;#&gt;</a:t>
+            </a:r>
+          </a:p>
+        </p:txBody>
+      </p:sp>
+      <p:sp>
+        <p:nvSpPr>
+          <p:cNvPr name="TextBox 7" id="7"/>
+          <p:cNvSpPr txBox="true"/>
+          <p:nvPr/>
+        </p:nvSpPr>
+        <p:spPr>
+          <a:xfrm>
+            <a:off x="8255000" y="6350000"/>
+            <a:ext cx="635000" cy="381000"/>
+          </a:xfrm>
+          <a:prstGeom prst="rect">
+            <a:avLst/>
+          </a:prstGeom>
+        </p:spPr>
+        <p:txBody>
+          <a:bodyPr anchor="t" rtlCol="false"/>
+          <a:lstStyle/>
+          <a:p>
+            <a:pPr algn="l">
+              <a:defRPr/>
+            </a:pPr>
+            <a:r>
+              <a:rPr lang="en-US"/>
+              <a:t/>
+            </a:r>
+            <a:endParaRPr lang="en-US" sz="1100"/>
+          </a:p>
+          <a:p>
+            <a:r>
+              <a:rPr lang="en-US" sz="1000">
+                <a:solidFill>
+                  <a:srgbClr val="808080"/>
+                </a:solidFill>
+                <a:latin typeface="Arial"/>
+              </a:rPr>
+              <a:t>&lt;#&gt;</a:t>
+            </a:r>
+          </a:p>
+        </p:txBody>
+      </p:sp>
+      <p:sp>
+        <p:nvSpPr>
+          <p:cNvPr name="TextBox 8" id="8"/>
+          <p:cNvSpPr txBox="true"/>
+          <p:nvPr/>
+        </p:nvSpPr>
+        <p:spPr>
+          <a:xfrm>
+            <a:off x="635000" y="6350000"/>
+            <a:ext cx="5080000" cy="381000"/>
+          </a:xfrm>
+          <a:prstGeom prst="rect">
+            <a:avLst/>
+          </a:prstGeom>
+        </p:spPr>
+        <p:txBody>
+          <a:bodyPr anchor="t" rtlCol="false"/>
+          <a:lstStyle/>
+          <a:p>
+            <a:pPr algn="l">
+              <a:defRPr/>
+            </a:pPr>
+            <a:r>
+              <a:rPr lang="en-US"/>
+              <a:t/>
+            </a:r>
+            <a:endParaRPr lang="en-US" sz="1100"/>
+          </a:p>
+          <a:p>
+            <a:r>
+              <a:rPr lang="en-US" sz="1000">
+                <a:solidFill>
+                  <a:srgbClr val="808080"/>
+                </a:solidFill>
+                <a:latin typeface="Arial"/>
+              </a:rPr>
+              <a:t>AngularAI Project</a:t>
+            </a:r>
+          </a:p>
+        </p:txBody>
+      </p:sp>
+      <p:sp>
+        <p:nvSpPr>
+          <p:cNvPr name="TextBox 9" id="9"/>
+          <p:cNvSpPr txBox="true"/>
+          <p:nvPr/>
+        </p:nvSpPr>
+        <p:spPr>
+          <a:xfrm>
+            <a:off x="8255000" y="6477000"/>
+            <a:ext cx="635000" cy="254000"/>
+          </a:xfrm>
+          <a:prstGeom prst="rect">
+            <a:avLst/>
+          </a:prstGeom>
+        </p:spPr>
+        <p:txBody>
+          <a:bodyPr anchor="t" rtlCol="false"/>
+          <a:lstStyle/>
+          <a:p>
+            <a:pPr algn="l">
+              <a:defRPr/>
+            </a:pPr>
+            <a:r>
+              <a:rPr lang="en-US"/>
+              <a:t/>
+            </a:r>
+            <a:endParaRPr lang="en-US" sz="1100"/>
+          </a:p>
+          <a:p>
+            <a:pPr algn="r"/>
+            <a:r>
+              <a:rPr lang="en-US" sz="900">
+                <a:solidFill>
+                  <a:srgbClr val="808080"/>
+                </a:solidFill>
+                <a:latin typeface="Calibri"/>
+              </a:rPr>
+              <a:t>&lt;#&gt;</a:t>
+            </a:r>
+          </a:p>
+        </p:txBody>
+      </p:sp>
+      <p:sp>
+        <p:nvSpPr>
+          <p:cNvPr name="TextBox 10" id="10"/>
+          <p:cNvSpPr txBox="true"/>
+          <p:nvPr/>
+        </p:nvSpPr>
+        <p:spPr>
+          <a:xfrm>
+            <a:off x="508000" y="6477000"/>
+            <a:ext cx="5080000" cy="254000"/>
+          </a:xfrm>
+          <a:prstGeom prst="rect">
+            <a:avLst/>
+          </a:prstGeom>
+        </p:spPr>
+        <p:txBody>
+          <a:bodyPr anchor="t" rtlCol="false"/>
+          <a:lstStyle/>
+          <a:p>
+            <a:pPr algn="l">
+              <a:defRPr/>
+            </a:pPr>
+            <a:r>
+              <a:rPr lang="en-US"/>
+              <a:t/>
+            </a:r>
+            <a:endParaRPr lang="en-US" sz="1100"/>
+          </a:p>
+          <a:p>
+            <a:r>
+              <a:rPr lang="en-US" sz="900">
+                <a:solidFill>
+                  <a:srgbClr val="808080"/>
+                </a:solidFill>
+                <a:latin typeface="Calibri"/>
+              </a:rPr>
+              <a:t>AngularAI - Softwareentwicklung mit AI</a:t>
+            </a:r>
           </a:p>
         </p:txBody>
       </p:sp>
@@ -3070,7 +3283,7 @@
 </file>
 
 <file path=ppt/slides/slide1.xml><?xml version="1.0" encoding="utf-8"?>
-<p:sld xmlns:a="http://schemas.openxmlformats.org/drawingml/2006/main" xmlns:r="http://schemas.openxmlformats.org/officeDocument/2006/relationships" xmlns:p="http://schemas.openxmlformats.org/presentationml/2006/main">
+<p:sld xmlns:a="http://schemas.openxmlformats.org/drawingml/2006/main" xmlns:p="http://schemas.openxmlformats.org/presentationml/2006/main" xmlns:r="http://schemas.openxmlformats.org/officeDocument/2006/relationships">
   <p:cSld name="Title Slide">
     <p:spTree>
       <p:nvGrpSpPr>
@@ -3086,6 +3299,37 @@
           <a:chExt cx="0" cy="0"/>
         </a:xfrm>
       </p:grpSpPr>
+      <p:sp>
+        <p:nvSpPr>
+          <p:cNvPr id="2" name="AutoShape 2"/>
+          <p:cNvSpPr/>
+          <p:nvPr>
+            <p:ph type="sldNum"/>
+          </p:nvPr>
+        </p:nvSpPr>
+        <p:spPr>
+          <a:xfrm>
+            <a:off x="7620000" y="6350000"/>
+            <a:ext cx="1270000" cy="381000"/>
+          </a:xfrm>
+          <a:prstGeom prst="rect">
+            <a:avLst/>
+          </a:prstGeom>
+        </p:spPr>
+        <p:txBody>
+          <a:p>
+            <a:r>
+              <a:rPr lang="en-US" sz="900">
+                <a:solidFill>
+                  <a:srgbClr val="808080"/>
+                </a:solidFill>
+                <a:latin typeface="Calibri"/>
+              </a:rPr>
+              <a:t>&lt;#&gt;</a:t>
+            </a:r>
+          </a:p>
+        </p:txBody>
+      </p:sp>
     </p:spTree>
   </p:cSld>
   <p:clrMapOvr>
@@ -3095,7 +3339,7 @@
 </file>
 
 <file path=ppt/slides/slide10.xml><?xml version="1.0" encoding="utf-8"?>
-<p:sld xmlns:a="http://schemas.openxmlformats.org/drawingml/2006/main" xmlns:r="http://schemas.openxmlformats.org/officeDocument/2006/relationships" xmlns:p="http://schemas.openxmlformats.org/presentationml/2006/main">
+<p:sld xmlns:a="http://schemas.openxmlformats.org/drawingml/2006/main" xmlns:p="http://schemas.openxmlformats.org/presentationml/2006/main" xmlns:r="http://schemas.openxmlformats.org/officeDocument/2006/relationships">
   <p:cSld name="Appendix">
     <p:spTree>
       <p:nvGrpSpPr>
@@ -3137,6 +3381,37 @@
           </a:p>
         </p:txBody>
       </p:sp>
+      <p:sp>
+        <p:nvSpPr>
+          <p:cNvPr id="3" name="AutoShape 3"/>
+          <p:cNvSpPr/>
+          <p:nvPr>
+            <p:ph type="sldNum"/>
+          </p:nvPr>
+        </p:nvSpPr>
+        <p:spPr>
+          <a:xfrm>
+            <a:off x="7620000" y="6350000"/>
+            <a:ext cx="1270000" cy="381000"/>
+          </a:xfrm>
+          <a:prstGeom prst="rect">
+            <a:avLst/>
+          </a:prstGeom>
+        </p:spPr>
+        <p:txBody>
+          <a:p>
+            <a:r>
+              <a:rPr lang="en-US" sz="900">
+                <a:solidFill>
+                  <a:srgbClr val="808080"/>
+                </a:solidFill>
+                <a:latin typeface="Calibri"/>
+              </a:rPr>
+              <a:t>&lt;#&gt;</a:t>
+            </a:r>
+          </a:p>
+        </p:txBody>
+      </p:sp>
     </p:spTree>
   </p:cSld>
   <p:clrMapOvr>
@@ -3146,7 +3421,7 @@
 </file>
 
 <file path=ppt/slides/slide2.xml><?xml version="1.0" encoding="utf-8"?>
-<p:sld xmlns:a="http://schemas.openxmlformats.org/drawingml/2006/main" xmlns:r="http://schemas.openxmlformats.org/officeDocument/2006/relationships" xmlns:p="http://schemas.openxmlformats.org/presentationml/2006/main">
+<p:sld xmlns:a="http://schemas.openxmlformats.org/drawingml/2006/main" xmlns:p="http://schemas.openxmlformats.org/presentationml/2006/main" xmlns:r="http://schemas.openxmlformats.org/officeDocument/2006/relationships">
   <p:cSld name="Section Header">
     <p:spTree>
       <p:nvGrpSpPr>
@@ -3162,6 +3437,37 @@
           <a:chExt cx="0" cy="0"/>
         </a:xfrm>
       </p:grpSpPr>
+      <p:sp>
+        <p:nvSpPr>
+          <p:cNvPr id="2" name="AutoShape 2"/>
+          <p:cNvSpPr/>
+          <p:nvPr>
+            <p:ph type="sldNum"/>
+          </p:nvPr>
+        </p:nvSpPr>
+        <p:spPr>
+          <a:xfrm>
+            <a:off x="7620000" y="6350000"/>
+            <a:ext cx="1270000" cy="381000"/>
+          </a:xfrm>
+          <a:prstGeom prst="rect">
+            <a:avLst/>
+          </a:prstGeom>
+        </p:spPr>
+        <p:txBody>
+          <a:p>
+            <a:r>
+              <a:rPr lang="en-US" sz="900">
+                <a:solidFill>
+                  <a:srgbClr val="808080"/>
+                </a:solidFill>
+                <a:latin typeface="Calibri"/>
+              </a:rPr>
+              <a:t>&lt;#&gt;</a:t>
+            </a:r>
+          </a:p>
+        </p:txBody>
+      </p:sp>
     </p:spTree>
   </p:cSld>
   <p:clrMapOvr>
@@ -3171,7 +3477,7 @@
 </file>
 
 <file path=ppt/slides/slide3.xml><?xml version="1.0" encoding="utf-8"?>
-<p:sld xmlns:a="http://schemas.openxmlformats.org/drawingml/2006/main" xmlns:r="http://schemas.openxmlformats.org/officeDocument/2006/relationships" xmlns:p="http://schemas.openxmlformats.org/presentationml/2006/main">
+<p:sld xmlns:a="http://schemas.openxmlformats.org/drawingml/2006/main" xmlns:p="http://schemas.openxmlformats.org/presentationml/2006/main" xmlns:r="http://schemas.openxmlformats.org/officeDocument/2006/relationships">
   <p:cSld name="Title and Content">
     <p:spTree>
       <p:nvGrpSpPr>
@@ -3213,6 +3519,37 @@
           </a:p>
         </p:txBody>
       </p:sp>
+      <p:sp>
+        <p:nvSpPr>
+          <p:cNvPr id="3" name="AutoShape 3"/>
+          <p:cNvSpPr/>
+          <p:nvPr>
+            <p:ph type="sldNum"/>
+          </p:nvPr>
+        </p:nvSpPr>
+        <p:spPr>
+          <a:xfrm>
+            <a:off x="7620000" y="6350000"/>
+            <a:ext cx="1270000" cy="381000"/>
+          </a:xfrm>
+          <a:prstGeom prst="rect">
+            <a:avLst/>
+          </a:prstGeom>
+        </p:spPr>
+        <p:txBody>
+          <a:p>
+            <a:r>
+              <a:rPr lang="en-US" sz="900">
+                <a:solidFill>
+                  <a:srgbClr val="808080"/>
+                </a:solidFill>
+                <a:latin typeface="Calibri"/>
+              </a:rPr>
+              <a:t>&lt;#&gt;</a:t>
+            </a:r>
+          </a:p>
+        </p:txBody>
+      </p:sp>
     </p:spTree>
   </p:cSld>
   <p:clrMapOvr>
@@ -3222,7 +3559,7 @@
 </file>
 
 <file path=ppt/slides/slide4.xml><?xml version="1.0" encoding="utf-8"?>
-<p:sld xmlns:a="http://schemas.openxmlformats.org/drawingml/2006/main" xmlns:r="http://schemas.openxmlformats.org/officeDocument/2006/relationships" xmlns:p="http://schemas.openxmlformats.org/presentationml/2006/main">
+<p:sld xmlns:a="http://schemas.openxmlformats.org/drawingml/2006/main" xmlns:p="http://schemas.openxmlformats.org/presentationml/2006/main" xmlns:r="http://schemas.openxmlformats.org/officeDocument/2006/relationships">
   <p:cSld name="Title and Two Content">
     <p:spTree>
       <p:nvGrpSpPr>
@@ -3290,6 +3627,37 @@
           </a:p>
         </p:txBody>
       </p:sp>
+      <p:sp>
+        <p:nvSpPr>
+          <p:cNvPr id="4" name="AutoShape 4"/>
+          <p:cNvSpPr/>
+          <p:nvPr>
+            <p:ph type="sldNum"/>
+          </p:nvPr>
+        </p:nvSpPr>
+        <p:spPr>
+          <a:xfrm>
+            <a:off x="7620000" y="6350000"/>
+            <a:ext cx="1270000" cy="381000"/>
+          </a:xfrm>
+          <a:prstGeom prst="rect">
+            <a:avLst/>
+          </a:prstGeom>
+        </p:spPr>
+        <p:txBody>
+          <a:p>
+            <a:r>
+              <a:rPr lang="en-US" sz="900">
+                <a:solidFill>
+                  <a:srgbClr val="808080"/>
+                </a:solidFill>
+                <a:latin typeface="Calibri"/>
+              </a:rPr>
+              <a:t>&lt;#&gt;</a:t>
+            </a:r>
+          </a:p>
+        </p:txBody>
+      </p:sp>
     </p:spTree>
   </p:cSld>
   <p:clrMapOvr>
@@ -3299,7 +3667,7 @@
 </file>
 
 <file path=ppt/slides/slide5.xml><?xml version="1.0" encoding="utf-8"?>
-<p:sld xmlns:a="http://schemas.openxmlformats.org/drawingml/2006/main" xmlns:r="http://schemas.openxmlformats.org/officeDocument/2006/relationships" xmlns:p="http://schemas.openxmlformats.org/presentationml/2006/main">
+<p:sld xmlns:a="http://schemas.openxmlformats.org/drawingml/2006/main" xmlns:p="http://schemas.openxmlformats.org/presentationml/2006/main" xmlns:r="http://schemas.openxmlformats.org/officeDocument/2006/relationships">
   <p:cSld name="Title and Table">
     <p:spTree>
       <p:nvGrpSpPr>
@@ -3341,6 +3709,37 @@
           </a:p>
         </p:txBody>
       </p:sp>
+      <p:sp>
+        <p:nvSpPr>
+          <p:cNvPr id="3" name="AutoShape 3"/>
+          <p:cNvSpPr/>
+          <p:nvPr>
+            <p:ph type="sldNum"/>
+          </p:nvPr>
+        </p:nvSpPr>
+        <p:spPr>
+          <a:xfrm>
+            <a:off x="7620000" y="6350000"/>
+            <a:ext cx="1270000" cy="381000"/>
+          </a:xfrm>
+          <a:prstGeom prst="rect">
+            <a:avLst/>
+          </a:prstGeom>
+        </p:spPr>
+        <p:txBody>
+          <a:p>
+            <a:r>
+              <a:rPr lang="en-US" sz="900">
+                <a:solidFill>
+                  <a:srgbClr val="808080"/>
+                </a:solidFill>
+                <a:latin typeface="Calibri"/>
+              </a:rPr>
+              <a:t>&lt;#&gt;</a:t>
+            </a:r>
+          </a:p>
+        </p:txBody>
+      </p:sp>
     </p:spTree>
   </p:cSld>
   <p:clrMapOvr>
@@ -3350,7 +3749,7 @@
 </file>
 
 <file path=ppt/slides/slide6.xml><?xml version="1.0" encoding="utf-8"?>
-<p:sld xmlns:a="http://schemas.openxmlformats.org/drawingml/2006/main" xmlns:r="http://schemas.openxmlformats.org/officeDocument/2006/relationships" xmlns:p="http://schemas.openxmlformats.org/presentationml/2006/main">
+<p:sld xmlns:a="http://schemas.openxmlformats.org/drawingml/2006/main" xmlns:p="http://schemas.openxmlformats.org/presentationml/2006/main" xmlns:r="http://schemas.openxmlformats.org/officeDocument/2006/relationships">
   <p:cSld name="Two Content">
     <p:spTree>
       <p:nvGrpSpPr>
@@ -3418,6 +3817,37 @@
           </a:p>
         </p:txBody>
       </p:sp>
+      <p:sp>
+        <p:nvSpPr>
+          <p:cNvPr id="4" name="AutoShape 4"/>
+          <p:cNvSpPr/>
+          <p:nvPr>
+            <p:ph type="sldNum"/>
+          </p:nvPr>
+        </p:nvSpPr>
+        <p:spPr>
+          <a:xfrm>
+            <a:off x="7620000" y="6350000"/>
+            <a:ext cx="1270000" cy="381000"/>
+          </a:xfrm>
+          <a:prstGeom prst="rect">
+            <a:avLst/>
+          </a:prstGeom>
+        </p:spPr>
+        <p:txBody>
+          <a:p>
+            <a:r>
+              <a:rPr lang="en-US" sz="900">
+                <a:solidFill>
+                  <a:srgbClr val="808080"/>
+                </a:solidFill>
+                <a:latin typeface="Calibri"/>
+              </a:rPr>
+              <a:t>&lt;#&gt;</a:t>
+            </a:r>
+          </a:p>
+        </p:txBody>
+      </p:sp>
     </p:spTree>
   </p:cSld>
   <p:clrMapOvr>
@@ -3427,7 +3857,7 @@
 </file>
 
 <file path=ppt/slides/slide7.xml><?xml version="1.0" encoding="utf-8"?>
-<p:sld xmlns:a="http://schemas.openxmlformats.org/drawingml/2006/main" xmlns:r="http://schemas.openxmlformats.org/officeDocument/2006/relationships" xmlns:p="http://schemas.openxmlformats.org/presentationml/2006/main">
+<p:sld xmlns:a="http://schemas.openxmlformats.org/drawingml/2006/main" xmlns:p="http://schemas.openxmlformats.org/presentationml/2006/main" xmlns:r="http://schemas.openxmlformats.org/officeDocument/2006/relationships">
   <p:cSld name="Comparison">
     <p:spTree>
       <p:nvGrpSpPr>
@@ -3495,6 +3925,37 @@
           </a:p>
         </p:txBody>
       </p:sp>
+      <p:sp>
+        <p:nvSpPr>
+          <p:cNvPr id="4" name="AutoShape 4"/>
+          <p:cNvSpPr/>
+          <p:nvPr>
+            <p:ph type="sldNum"/>
+          </p:nvPr>
+        </p:nvSpPr>
+        <p:spPr>
+          <a:xfrm>
+            <a:off x="7620000" y="6350000"/>
+            <a:ext cx="1270000" cy="381000"/>
+          </a:xfrm>
+          <a:prstGeom prst="rect">
+            <a:avLst/>
+          </a:prstGeom>
+        </p:spPr>
+        <p:txBody>
+          <a:p>
+            <a:r>
+              <a:rPr lang="en-US" sz="900">
+                <a:solidFill>
+                  <a:srgbClr val="808080"/>
+                </a:solidFill>
+                <a:latin typeface="Calibri"/>
+              </a:rPr>
+              <a:t>&lt;#&gt;</a:t>
+            </a:r>
+          </a:p>
+        </p:txBody>
+      </p:sp>
     </p:spTree>
   </p:cSld>
   <p:clrMapOvr>
@@ -3504,7 +3965,7 @@
 </file>
 
 <file path=ppt/slides/slide8.xml><?xml version="1.0" encoding="utf-8"?>
-<p:sld xmlns:a="http://schemas.openxmlformats.org/drawingml/2006/main" xmlns:r="http://schemas.openxmlformats.org/officeDocument/2006/relationships" xmlns:p="http://schemas.openxmlformats.org/presentationml/2006/main">
+<p:sld xmlns:a="http://schemas.openxmlformats.org/drawingml/2006/main" xmlns:p="http://schemas.openxmlformats.org/presentationml/2006/main" xmlns:r="http://schemas.openxmlformats.org/officeDocument/2006/relationships">
   <p:cSld name="Content with Caption">
     <p:spTree>
       <p:nvGrpSpPr>
@@ -3546,6 +4007,37 @@
           </a:p>
         </p:txBody>
       </p:sp>
+      <p:sp>
+        <p:nvSpPr>
+          <p:cNvPr id="3" name="AutoShape 3"/>
+          <p:cNvSpPr/>
+          <p:nvPr>
+            <p:ph type="sldNum"/>
+          </p:nvPr>
+        </p:nvSpPr>
+        <p:spPr>
+          <a:xfrm>
+            <a:off x="7620000" y="6350000"/>
+            <a:ext cx="1270000" cy="381000"/>
+          </a:xfrm>
+          <a:prstGeom prst="rect">
+            <a:avLst/>
+          </a:prstGeom>
+        </p:spPr>
+        <p:txBody>
+          <a:p>
+            <a:r>
+              <a:rPr lang="en-US" sz="900">
+                <a:solidFill>
+                  <a:srgbClr val="808080"/>
+                </a:solidFill>
+                <a:latin typeface="Calibri"/>
+              </a:rPr>
+              <a:t>&lt;#&gt;</a:t>
+            </a:r>
+          </a:p>
+        </p:txBody>
+      </p:sp>
     </p:spTree>
   </p:cSld>
   <p:clrMapOvr>
@@ -3555,7 +4047,7 @@
 </file>
 
 <file path=ppt/slides/slide9.xml><?xml version="1.0" encoding="utf-8"?>
-<p:sld xmlns:a="http://schemas.openxmlformats.org/drawingml/2006/main" xmlns:r="http://schemas.openxmlformats.org/officeDocument/2006/relationships" xmlns:p="http://schemas.openxmlformats.org/presentationml/2006/main">
+<p:sld xmlns:a="http://schemas.openxmlformats.org/drawingml/2006/main" xmlns:p="http://schemas.openxmlformats.org/presentationml/2006/main" xmlns:r="http://schemas.openxmlformats.org/officeDocument/2006/relationships">
   <p:cSld name="Blank">
     <p:spTree>
       <p:nvGrpSpPr>
@@ -3571,6 +4063,37 @@
           <a:chExt cx="0" cy="0"/>
         </a:xfrm>
       </p:grpSpPr>
+      <p:sp>
+        <p:nvSpPr>
+          <p:cNvPr id="2" name="AutoShape 2"/>
+          <p:cNvSpPr/>
+          <p:nvPr>
+            <p:ph type="sldNum"/>
+          </p:nvPr>
+        </p:nvSpPr>
+        <p:spPr>
+          <a:xfrm>
+            <a:off x="7620000" y="6350000"/>
+            <a:ext cx="1270000" cy="381000"/>
+          </a:xfrm>
+          <a:prstGeom prst="rect">
+            <a:avLst/>
+          </a:prstGeom>
+        </p:spPr>
+        <p:txBody>
+          <a:p>
+            <a:r>
+              <a:rPr lang="en-US" sz="900">
+                <a:solidFill>
+                  <a:srgbClr val="808080"/>
+                </a:solidFill>
+                <a:latin typeface="Calibri"/>
+              </a:rPr>
+              <a:t>&lt;#&gt;</a:t>
+            </a:r>
+          </a:p>
+        </p:txBody>
+      </p:sp>
     </p:spTree>
   </p:cSld>
   <p:clrMapOvr>

</xml_diff>

<commit_message>
Remove outdated presentation files for cleanup
- Deleted unnecessary architecture overview diagrams and related YAML configurations.
- Removed auto-generated agenda Lua script and sample Cypress command files.
- Cleared old test fixtures and presentation resources, streamlining the project directory.
</commit_message>
<xml_diff>
--- a/doc/history/presentations/template.pptx
+++ b/doc/history/presentations/template.pptx
@@ -1,25 +1,16 @@
 
 <file path=ppt/presentation.xml><?xml version="1.0" encoding="utf-8"?>
-<p:presentation xmlns:a="http://schemas.openxmlformats.org/drawingml/2006/main" xmlns:r="http://schemas.openxmlformats.org/officeDocument/2006/relationships" xmlns:p="http://schemas.openxmlformats.org/presentationml/2006/main" saveSubsetFonts="1" autoCompressPictures="0">
+<p:presentation xmlns:a="http://schemas.openxmlformats.org/drawingml/2006/main" xmlns:r="http://schemas.openxmlformats.org/officeDocument/2006/relationships" xmlns:p="http://schemas.openxmlformats.org/presentationml/2006/main" saveSubsetFonts="1">
   <p:sldMasterIdLst>
     <p:sldMasterId id="2147483648" r:id="rId1"/>
   </p:sldMasterIdLst>
-  <p:notesMasterIdLst>
-    <p:notesMasterId r:id="rId6"/>
-  </p:notesMasterIdLst>
-  <p:sldIdLst>
-    <p:sldId id="256" r:id="rId2"/>
-    <p:sldId id="257" r:id="rId3"/>
-    <p:sldId id="258" r:id="rId4"/>
-    <p:sldId id="259" r:id="rId5"/>
-  </p:sldIdLst>
-  <p:sldSz cx="9144000" cy="5143500" type="screen16x9"/>
+  <p:sldSz cx="9144000" cy="6858000" type="screen4x3"/>
   <p:notesSz cx="6858000" cy="9144000"/>
   <p:defaultTextStyle>
     <a:defPPr>
       <a:defRPr lang="en-US"/>
     </a:defPPr>
-    <a:lvl1pPr marL="0" algn="l" defTabSz="457200" rtl="0" eaLnBrk="1" latinLnBrk="0" hangingPunct="1">
+    <a:lvl1pPr marL="0" algn="l" defTabSz="914400" rtl="0" eaLnBrk="1" latinLnBrk="0" hangingPunct="1">
       <a:defRPr sz="1800" kern="1200">
         <a:solidFill>
           <a:schemeClr val="tx1"/>
@@ -29,7 +20,7 @@
         <a:cs typeface="+mn-cs"/>
       </a:defRPr>
     </a:lvl1pPr>
-    <a:lvl2pPr marL="457200" algn="l" defTabSz="457200" rtl="0" eaLnBrk="1" latinLnBrk="0" hangingPunct="1">
+    <a:lvl2pPr marL="457200" algn="l" defTabSz="914400" rtl="0" eaLnBrk="1" latinLnBrk="0" hangingPunct="1">
       <a:defRPr sz="1800" kern="1200">
         <a:solidFill>
           <a:schemeClr val="tx1"/>
@@ -39,7 +30,7 @@
         <a:cs typeface="+mn-cs"/>
       </a:defRPr>
     </a:lvl2pPr>
-    <a:lvl3pPr marL="914400" algn="l" defTabSz="457200" rtl="0" eaLnBrk="1" latinLnBrk="0" hangingPunct="1">
+    <a:lvl3pPr marL="914400" algn="l" defTabSz="914400" rtl="0" eaLnBrk="1" latinLnBrk="0" hangingPunct="1">
       <a:defRPr sz="1800" kern="1200">
         <a:solidFill>
           <a:schemeClr val="tx1"/>
@@ -49,7 +40,7 @@
         <a:cs typeface="+mn-cs"/>
       </a:defRPr>
     </a:lvl3pPr>
-    <a:lvl4pPr marL="1371600" algn="l" defTabSz="457200" rtl="0" eaLnBrk="1" latinLnBrk="0" hangingPunct="1">
+    <a:lvl4pPr marL="1371600" algn="l" defTabSz="914400" rtl="0" eaLnBrk="1" latinLnBrk="0" hangingPunct="1">
       <a:defRPr sz="1800" kern="1200">
         <a:solidFill>
           <a:schemeClr val="tx1"/>
@@ -59,7 +50,7 @@
         <a:cs typeface="+mn-cs"/>
       </a:defRPr>
     </a:lvl4pPr>
-    <a:lvl5pPr marL="1828800" algn="l" defTabSz="457200" rtl="0" eaLnBrk="1" latinLnBrk="0" hangingPunct="1">
+    <a:lvl5pPr marL="1828800" algn="l" defTabSz="914400" rtl="0" eaLnBrk="1" latinLnBrk="0" hangingPunct="1">
       <a:defRPr sz="1800" kern="1200">
         <a:solidFill>
           <a:schemeClr val="tx1"/>
@@ -69,7 +60,7 @@
         <a:cs typeface="+mn-cs"/>
       </a:defRPr>
     </a:lvl5pPr>
-    <a:lvl6pPr marL="2286000" algn="l" defTabSz="457200" rtl="0" eaLnBrk="1" latinLnBrk="0" hangingPunct="1">
+    <a:lvl6pPr marL="2286000" algn="l" defTabSz="914400" rtl="0" eaLnBrk="1" latinLnBrk="0" hangingPunct="1">
       <a:defRPr sz="1800" kern="1200">
         <a:solidFill>
           <a:schemeClr val="tx1"/>
@@ -79,7 +70,7 @@
         <a:cs typeface="+mn-cs"/>
       </a:defRPr>
     </a:lvl6pPr>
-    <a:lvl7pPr marL="2743200" algn="l" defTabSz="457200" rtl="0" eaLnBrk="1" latinLnBrk="0" hangingPunct="1">
+    <a:lvl7pPr marL="2743200" algn="l" defTabSz="914400" rtl="0" eaLnBrk="1" latinLnBrk="0" hangingPunct="1">
       <a:defRPr sz="1800" kern="1200">
         <a:solidFill>
           <a:schemeClr val="tx1"/>
@@ -89,7 +80,7 @@
         <a:cs typeface="+mn-cs"/>
       </a:defRPr>
     </a:lvl7pPr>
-    <a:lvl8pPr marL="3200400" algn="l" defTabSz="457200" rtl="0" eaLnBrk="1" latinLnBrk="0" hangingPunct="1">
+    <a:lvl8pPr marL="3200400" algn="l" defTabSz="914400" rtl="0" eaLnBrk="1" latinLnBrk="0" hangingPunct="1">
       <a:defRPr sz="1800" kern="1200">
         <a:solidFill>
           <a:schemeClr val="tx1"/>
@@ -99,7 +90,7 @@
         <a:cs typeface="+mn-cs"/>
       </a:defRPr>
     </a:lvl8pPr>
-    <a:lvl9pPr marL="3657600" algn="l" defTabSz="457200" rtl="0" eaLnBrk="1" latinLnBrk="0" hangingPunct="1">
+    <a:lvl9pPr marL="3657600" algn="l" defTabSz="914400" rtl="0" eaLnBrk="1" latinLnBrk="0" hangingPunct="1">
       <a:defRPr sz="1800" kern="1200">
         <a:solidFill>
           <a:schemeClr val="tx1"/>
@@ -110,579 +101,7 @@
       </a:defRPr>
     </a:lvl9pPr>
   </p:defaultTextStyle>
-  <p:extLst>
-    <p:ext uri="{EFAFB233-063F-42B5-8137-9DF3F51BA10A}">
-      <p15:sldGuideLst xmlns:p15="http://schemas.microsoft.com/office/powerpoint/2012/main">
-        <p15:guide id="1" orient="horz" pos="1620" userDrawn="1">
-          <p15:clr>
-            <a:srgbClr val="A4A3A4"/>
-          </p15:clr>
-        </p15:guide>
-        <p15:guide id="2" pos="2880" userDrawn="1">
-          <p15:clr>
-            <a:srgbClr val="A4A3A4"/>
-          </p15:clr>
-        </p15:guide>
-      </p15:sldGuideLst>
-    </p:ext>
-  </p:extLst>
 </p:presentation>
-</file>
-
-<file path=ppt/notesMasters/notesMaster1.xml><?xml version="1.0" encoding="utf-8"?>
-<p:notesMaster xmlns:a="http://schemas.openxmlformats.org/drawingml/2006/main" xmlns:r="http://schemas.openxmlformats.org/officeDocument/2006/relationships" xmlns:p="http://schemas.openxmlformats.org/presentationml/2006/main">
-  <p:cSld>
-    <p:bg>
-      <p:bgRef idx="1001">
-        <a:schemeClr val="bg1"/>
-      </p:bgRef>
-    </p:bg>
-    <p:spTree>
-      <p:nvGrpSpPr>
-        <p:cNvPr id="1" name=""/>
-        <p:cNvGrpSpPr/>
-        <p:nvPr/>
-      </p:nvGrpSpPr>
-      <p:grpSpPr>
-        <a:xfrm>
-          <a:off x="0" y="0"/>
-          <a:ext cx="0" cy="0"/>
-          <a:chOff x="0" y="0"/>
-          <a:chExt cx="0" cy="0"/>
-        </a:xfrm>
-      </p:grpSpPr>
-      <p:sp>
-        <p:nvSpPr>
-          <p:cNvPr id="2" name="Header Placeholder 1"/>
-          <p:cNvSpPr>
-            <a:spLocks noGrp="1"/>
-          </p:cNvSpPr>
-          <p:nvPr>
-            <p:ph type="hdr" sz="quarter"/>
-          </p:nvPr>
-        </p:nvSpPr>
-        <p:spPr>
-          <a:xfrm>
-            <a:off x="0" y="0"/>
-            <a:ext cx="2971800" cy="458788"/>
-          </a:xfrm>
-          <a:prstGeom prst="rect">
-            <a:avLst/>
-          </a:prstGeom>
-        </p:spPr>
-        <p:txBody>
-          <a:bodyPr vert="horz" lIns="91440" tIns="45720" rIns="91440" bIns="45720" rtlCol="0"/>
-          <a:lstStyle>
-            <a:lvl1pPr algn="l">
-              <a:defRPr sz="1200"/>
-            </a:lvl1pPr>
-          </a:lstStyle>
-          <a:p>
-            <a:endParaRPr lang="en-US"/>
-          </a:p>
-        </p:txBody>
-      </p:sp>
-      <p:sp>
-        <p:nvSpPr>
-          <p:cNvPr id="3" name="Date Placeholder 2"/>
-          <p:cNvSpPr>
-            <a:spLocks noGrp="1"/>
-          </p:cNvSpPr>
-          <p:nvPr>
-            <p:ph type="dt" idx="1"/>
-          </p:nvPr>
-        </p:nvSpPr>
-        <p:spPr>
-          <a:xfrm>
-            <a:off x="3884613" y="0"/>
-            <a:ext cx="2971800" cy="458788"/>
-          </a:xfrm>
-          <a:prstGeom prst="rect">
-            <a:avLst/>
-          </a:prstGeom>
-        </p:spPr>
-        <p:txBody>
-          <a:bodyPr vert="horz" lIns="91440" tIns="45720" rIns="91440" bIns="45720" rtlCol="0"/>
-          <a:lstStyle>
-            <a:lvl1pPr algn="r">
-              <a:defRPr sz="1200"/>
-            </a:lvl1pPr>
-          </a:lstStyle>
-          <a:p>
-            <a:fld id="{0F9C1CCF-B725-44A7-AA57-5E433BD85C9F}" type="datetimeFigureOut">
-              <a:rPr lang="en-US" smtClean="0"/>
-              <a:t>1/2/22</a:t>
-            </a:fld>
-            <a:endParaRPr lang="en-US"/>
-          </a:p>
-        </p:txBody>
-      </p:sp>
-      <p:sp>
-        <p:nvSpPr>
-          <p:cNvPr id="4" name="Slide Image Placeholder 3"/>
-          <p:cNvSpPr>
-            <a:spLocks noGrp="1" noRot="1" noChangeAspect="1"/>
-          </p:cNvSpPr>
-          <p:nvPr>
-            <p:ph type="sldImg" idx="2"/>
-          </p:nvPr>
-        </p:nvSpPr>
-        <p:spPr>
-          <a:xfrm>
-            <a:off x="685800" y="1143000"/>
-            <a:ext cx="5486400" cy="3086100"/>
-          </a:xfrm>
-          <a:prstGeom prst="rect">
-            <a:avLst/>
-          </a:prstGeom>
-          <a:noFill/>
-          <a:ln w="12700">
-            <a:solidFill>
-              <a:prstClr val="black"/>
-            </a:solidFill>
-          </a:ln>
-        </p:spPr>
-        <p:txBody>
-          <a:bodyPr vert="horz" lIns="91440" tIns="45720" rIns="91440" bIns="45720" rtlCol="0" anchor="ctr"/>
-          <a:lstStyle/>
-          <a:p>
-            <a:endParaRPr lang="en-US"/>
-          </a:p>
-        </p:txBody>
-      </p:sp>
-      <p:sp>
-        <p:nvSpPr>
-          <p:cNvPr id="5" name="Notes Placeholder 4"/>
-          <p:cNvSpPr>
-            <a:spLocks noGrp="1"/>
-          </p:cNvSpPr>
-          <p:nvPr>
-            <p:ph type="body" sz="quarter" idx="3"/>
-          </p:nvPr>
-        </p:nvSpPr>
-        <p:spPr>
-          <a:xfrm>
-            <a:off x="685800" y="4400550"/>
-            <a:ext cx="5486400" cy="3600450"/>
-          </a:xfrm>
-          <a:prstGeom prst="rect">
-            <a:avLst/>
-          </a:prstGeom>
-        </p:spPr>
-        <p:txBody>
-          <a:bodyPr vert="horz" lIns="91440" tIns="45720" rIns="91440" bIns="45720" rtlCol="0"/>
-          <a:lstStyle/>
-          <a:p>
-            <a:pPr lvl="0"/>
-            <a:r>
-              <a:rPr lang="en-US"/>
-              <a:t>Click to edit Master text styles</a:t>
-            </a:r>
-          </a:p>
-          <a:p>
-            <a:pPr lvl="1"/>
-            <a:r>
-              <a:rPr lang="en-US"/>
-              <a:t>Second level</a:t>
-            </a:r>
-          </a:p>
-          <a:p>
-            <a:pPr lvl="2"/>
-            <a:r>
-              <a:rPr lang="en-US"/>
-              <a:t>Third level</a:t>
-            </a:r>
-          </a:p>
-          <a:p>
-            <a:pPr lvl="3"/>
-            <a:r>
-              <a:rPr lang="en-US"/>
-              <a:t>Fourth level</a:t>
-            </a:r>
-          </a:p>
-          <a:p>
-            <a:pPr lvl="4"/>
-            <a:r>
-              <a:rPr lang="en-US"/>
-              <a:t>Fifth level</a:t>
-            </a:r>
-          </a:p>
-        </p:txBody>
-      </p:sp>
-      <p:sp>
-        <p:nvSpPr>
-          <p:cNvPr id="6" name="Footer Placeholder 5"/>
-          <p:cNvSpPr>
-            <a:spLocks noGrp="1"/>
-          </p:cNvSpPr>
-          <p:nvPr>
-            <p:ph type="ftr" sz="quarter" idx="4"/>
-          </p:nvPr>
-        </p:nvSpPr>
-        <p:spPr>
-          <a:xfrm>
-            <a:off x="0" y="8685213"/>
-            <a:ext cx="2971800" cy="458787"/>
-          </a:xfrm>
-          <a:prstGeom prst="rect">
-            <a:avLst/>
-          </a:prstGeom>
-        </p:spPr>
-        <p:txBody>
-          <a:bodyPr vert="horz" lIns="91440" tIns="45720" rIns="91440" bIns="45720" rtlCol="0" anchor="b"/>
-          <a:lstStyle>
-            <a:lvl1pPr algn="l">
-              <a:defRPr sz="1200"/>
-            </a:lvl1pPr>
-          </a:lstStyle>
-          <a:p>
-            <a:endParaRPr lang="en-US"/>
-          </a:p>
-        </p:txBody>
-      </p:sp>
-      <p:sp>
-        <p:nvSpPr>
-          <p:cNvPr id="7" name="Slide Number Placeholder 6"/>
-          <p:cNvSpPr>
-            <a:spLocks noGrp="1"/>
-          </p:cNvSpPr>
-          <p:nvPr>
-            <p:ph type="sldNum" sz="quarter" idx="5"/>
-          </p:nvPr>
-        </p:nvSpPr>
-        <p:spPr>
-          <a:xfrm>
-            <a:off x="3884613" y="8685213"/>
-            <a:ext cx="2971800" cy="458787"/>
-          </a:xfrm>
-          <a:prstGeom prst="rect">
-            <a:avLst/>
-          </a:prstGeom>
-        </p:spPr>
-        <p:txBody>
-          <a:bodyPr vert="horz" lIns="91440" tIns="45720" rIns="91440" bIns="45720" rtlCol="0" anchor="b"/>
-          <a:lstStyle>
-            <a:lvl1pPr algn="r">
-              <a:defRPr sz="1200"/>
-            </a:lvl1pPr>
-          </a:lstStyle>
-          <a:p>
-            <a:fld id="{18BDFEC3-8487-43E8-A154-7C12CBC1FFF2}" type="slidenum">
-              <a:rPr lang="en-US" smtClean="0"/>
-              <a:t>‹#›</a:t>
-            </a:fld>
-            <a:endParaRPr lang="en-US"/>
-          </a:p>
-        </p:txBody>
-      </p:sp>
-    </p:spTree>
-    <p:extLst>
-      <p:ext uri="{BB962C8B-B14F-4D97-AF65-F5344CB8AC3E}">
-        <p14:creationId xmlns:p14="http://schemas.microsoft.com/office/powerpoint/2010/main" val="3782709779"/>
-      </p:ext>
-    </p:extLst>
-  </p:cSld>
-  <p:clrMap bg1="lt1" tx1="dk1" bg2="lt2" tx2="dk2" accent1="accent1" accent2="accent2" accent3="accent3" accent4="accent4" accent5="accent5" accent6="accent6" hlink="hlink" folHlink="folHlink"/>
-  <p:notesStyle>
-    <a:lvl1pPr marL="0" algn="l" defTabSz="914400" rtl="0" eaLnBrk="1" latinLnBrk="0" hangingPunct="1">
-      <a:defRPr sz="1200" kern="1200">
-        <a:solidFill>
-          <a:schemeClr val="tx1"/>
-        </a:solidFill>
-        <a:latin typeface="+mn-lt"/>
-        <a:ea typeface="+mn-ea"/>
-        <a:cs typeface="+mn-cs"/>
-      </a:defRPr>
-    </a:lvl1pPr>
-    <a:lvl2pPr marL="457200" algn="l" defTabSz="914400" rtl="0" eaLnBrk="1" latinLnBrk="0" hangingPunct="1">
-      <a:defRPr sz="1200" kern="1200">
-        <a:solidFill>
-          <a:schemeClr val="tx1"/>
-        </a:solidFill>
-        <a:latin typeface="+mn-lt"/>
-        <a:ea typeface="+mn-ea"/>
-        <a:cs typeface="+mn-cs"/>
-      </a:defRPr>
-    </a:lvl2pPr>
-    <a:lvl3pPr marL="914400" algn="l" defTabSz="914400" rtl="0" eaLnBrk="1" latinLnBrk="0" hangingPunct="1">
-      <a:defRPr sz="1200" kern="1200">
-        <a:solidFill>
-          <a:schemeClr val="tx1"/>
-        </a:solidFill>
-        <a:latin typeface="+mn-lt"/>
-        <a:ea typeface="+mn-ea"/>
-        <a:cs typeface="+mn-cs"/>
-      </a:defRPr>
-    </a:lvl3pPr>
-    <a:lvl4pPr marL="1371600" algn="l" defTabSz="914400" rtl="0" eaLnBrk="1" latinLnBrk="0" hangingPunct="1">
-      <a:defRPr sz="1200" kern="1200">
-        <a:solidFill>
-          <a:schemeClr val="tx1"/>
-        </a:solidFill>
-        <a:latin typeface="+mn-lt"/>
-        <a:ea typeface="+mn-ea"/>
-        <a:cs typeface="+mn-cs"/>
-      </a:defRPr>
-    </a:lvl4pPr>
-    <a:lvl5pPr marL="1828800" algn="l" defTabSz="914400" rtl="0" eaLnBrk="1" latinLnBrk="0" hangingPunct="1">
-      <a:defRPr sz="1200" kern="1200">
-        <a:solidFill>
-          <a:schemeClr val="tx1"/>
-        </a:solidFill>
-        <a:latin typeface="+mn-lt"/>
-        <a:ea typeface="+mn-ea"/>
-        <a:cs typeface="+mn-cs"/>
-      </a:defRPr>
-    </a:lvl5pPr>
-    <a:lvl6pPr marL="2286000" algn="l" defTabSz="914400" rtl="0" eaLnBrk="1" latinLnBrk="0" hangingPunct="1">
-      <a:defRPr sz="1200" kern="1200">
-        <a:solidFill>
-          <a:schemeClr val="tx1"/>
-        </a:solidFill>
-        <a:latin typeface="+mn-lt"/>
-        <a:ea typeface="+mn-ea"/>
-        <a:cs typeface="+mn-cs"/>
-      </a:defRPr>
-    </a:lvl6pPr>
-    <a:lvl7pPr marL="2743200" algn="l" defTabSz="914400" rtl="0" eaLnBrk="1" latinLnBrk="0" hangingPunct="1">
-      <a:defRPr sz="1200" kern="1200">
-        <a:solidFill>
-          <a:schemeClr val="tx1"/>
-        </a:solidFill>
-        <a:latin typeface="+mn-lt"/>
-        <a:ea typeface="+mn-ea"/>
-        <a:cs typeface="+mn-cs"/>
-      </a:defRPr>
-    </a:lvl7pPr>
-    <a:lvl8pPr marL="3200400" algn="l" defTabSz="914400" rtl="0" eaLnBrk="1" latinLnBrk="0" hangingPunct="1">
-      <a:defRPr sz="1200" kern="1200">
-        <a:solidFill>
-          <a:schemeClr val="tx1"/>
-        </a:solidFill>
-        <a:latin typeface="+mn-lt"/>
-        <a:ea typeface="+mn-ea"/>
-        <a:cs typeface="+mn-cs"/>
-      </a:defRPr>
-    </a:lvl8pPr>
-    <a:lvl9pPr marL="3657600" algn="l" defTabSz="914400" rtl="0" eaLnBrk="1" latinLnBrk="0" hangingPunct="1">
-      <a:defRPr sz="1200" kern="1200">
-        <a:solidFill>
-          <a:schemeClr val="tx1"/>
-        </a:solidFill>
-        <a:latin typeface="+mn-lt"/>
-        <a:ea typeface="+mn-ea"/>
-        <a:cs typeface="+mn-cs"/>
-      </a:defRPr>
-    </a:lvl9pPr>
-  </p:notesStyle>
-</p:notesMaster>
-</file>
-
-<file path=ppt/notesSlides/notesSlide1.xml><?xml version="1.0" encoding="utf-8"?>
-<p:notes xmlns:a="http://schemas.openxmlformats.org/drawingml/2006/main" xmlns:r="http://schemas.openxmlformats.org/officeDocument/2006/relationships" xmlns:p="http://schemas.openxmlformats.org/presentationml/2006/main">
-  <p:cSld>
-    <p:spTree>
-      <p:nvGrpSpPr>
-        <p:cNvPr id="1" name=""/>
-        <p:cNvGrpSpPr/>
-        <p:nvPr/>
-      </p:nvGrpSpPr>
-      <p:grpSpPr>
-        <a:xfrm>
-          <a:off x="0" y="0"/>
-          <a:ext cx="0" cy="0"/>
-          <a:chOff x="0" y="0"/>
-          <a:chExt cx="0" cy="0"/>
-        </a:xfrm>
-      </p:grpSpPr>
-      <p:sp>
-        <p:nvSpPr>
-          <p:cNvPr id="2" name="Slide Image Placeholder 1"/>
-          <p:cNvSpPr>
-            <a:spLocks noGrp="1" noRot="1" noChangeAspect="1"/>
-          </p:cNvSpPr>
-          <p:nvPr>
-            <p:ph type="sldImg"/>
-          </p:nvPr>
-        </p:nvSpPr>
-        <p:spPr>
-          <a:xfrm>
-            <a:off x="685800" y="1143000"/>
-            <a:ext cx="5486400" cy="3086100"/>
-          </a:xfrm>
-        </p:spPr>
-      </p:sp>
-      <p:sp>
-        <p:nvSpPr>
-          <p:cNvPr id="3" name="Notes Placeholder 2"/>
-          <p:cNvSpPr>
-            <a:spLocks noGrp="1"/>
-          </p:cNvSpPr>
-          <p:nvPr>
-            <p:ph type="body" idx="1"/>
-          </p:nvPr>
-        </p:nvSpPr>
-        <p:spPr/>
-        <p:txBody>
-          <a:bodyPr/>
-          <a:lstStyle/>
-          <a:p>
-            <a:r>
-              <a:rPr lang="en-US" dirty="0"/>
-              <a:t>Here</a:t>
-            </a:r>
-            <a:r>
-              <a:rPr lang="en-US" baseline="0" dirty="0"/>
-              <a:t> is a note</a:t>
-            </a:r>
-          </a:p>
-          <a:p>
-            <a:endParaRPr lang="en-US" baseline="0" dirty="0"/>
-          </a:p>
-          <a:p>
-            <a:r>
-              <a:rPr lang="en-US" baseline="0" dirty="0"/>
-              <a:t>With another paragraph.</a:t>
-            </a:r>
-            <a:endParaRPr lang="en-US" dirty="0"/>
-          </a:p>
-        </p:txBody>
-      </p:sp>
-      <p:sp>
-        <p:nvSpPr>
-          <p:cNvPr id="4" name="Slide Number Placeholder 3"/>
-          <p:cNvSpPr>
-            <a:spLocks noGrp="1"/>
-          </p:cNvSpPr>
-          <p:nvPr>
-            <p:ph type="sldNum" sz="quarter" idx="10"/>
-          </p:nvPr>
-        </p:nvSpPr>
-        <p:spPr/>
-        <p:txBody>
-          <a:bodyPr/>
-          <a:lstStyle/>
-          <a:p>
-            <a:fld id="{18BDFEC3-8487-43E8-A154-7C12CBC1FFF2}" type="slidenum">
-              <a:rPr lang="en-US" smtClean="0"/>
-              <a:t>1</a:t>
-            </a:fld>
-            <a:endParaRPr lang="en-US"/>
-          </a:p>
-        </p:txBody>
-      </p:sp>
-    </p:spTree>
-    <p:extLst>
-      <p:ext uri="{BB962C8B-B14F-4D97-AF65-F5344CB8AC3E}">
-        <p14:creationId xmlns:p14="http://schemas.microsoft.com/office/powerpoint/2010/main" val="3171319170"/>
-      </p:ext>
-    </p:extLst>
-  </p:cSld>
-  <p:clrMapOvr>
-    <a:masterClrMapping/>
-  </p:clrMapOvr>
-</p:notes>
-</file>
-
-<file path=ppt/notesSlides/notesSlide2.xml><?xml version="1.0" encoding="utf-8"?>
-<p:notes xmlns:a="http://schemas.openxmlformats.org/drawingml/2006/main" xmlns:r="http://schemas.openxmlformats.org/officeDocument/2006/relationships" xmlns:p="http://schemas.openxmlformats.org/presentationml/2006/main">
-  <p:cSld>
-    <p:spTree>
-      <p:nvGrpSpPr>
-        <p:cNvPr id="1" name=""/>
-        <p:cNvGrpSpPr/>
-        <p:nvPr/>
-      </p:nvGrpSpPr>
-      <p:grpSpPr>
-        <a:xfrm>
-          <a:off x="0" y="0"/>
-          <a:ext cx="0" cy="0"/>
-          <a:chOff x="0" y="0"/>
-          <a:chExt cx="0" cy="0"/>
-        </a:xfrm>
-      </p:grpSpPr>
-      <p:sp>
-        <p:nvSpPr>
-          <p:cNvPr id="2" name="Slide Image Placeholder 1"/>
-          <p:cNvSpPr>
-            <a:spLocks noGrp="1" noRot="1" noChangeAspect="1"/>
-          </p:cNvSpPr>
-          <p:nvPr>
-            <p:ph type="sldImg"/>
-          </p:nvPr>
-        </p:nvSpPr>
-        <p:spPr>
-          <a:xfrm>
-            <a:off x="685800" y="1143000"/>
-            <a:ext cx="5486400" cy="3086100"/>
-          </a:xfrm>
-        </p:spPr>
-      </p:sp>
-      <p:sp>
-        <p:nvSpPr>
-          <p:cNvPr id="3" name="Notes Placeholder 2"/>
-          <p:cNvSpPr>
-            <a:spLocks noGrp="1"/>
-          </p:cNvSpPr>
-          <p:nvPr>
-            <p:ph type="body" idx="1"/>
-          </p:nvPr>
-        </p:nvSpPr>
-        <p:spPr/>
-        <p:txBody>
-          <a:bodyPr/>
-          <a:lstStyle/>
-          <a:p>
-            <a:r>
-              <a:rPr lang="en-US" dirty="0"/>
-              <a:t>A</a:t>
-            </a:r>
-            <a:r>
-              <a:rPr lang="en-US" baseline="0" dirty="0"/>
-              <a:t> speaker note on </a:t>
-            </a:r>
-            <a:r>
-              <a:rPr lang="en-US" baseline="0"/>
-              <a:t>this slide too.</a:t>
-            </a:r>
-            <a:endParaRPr lang="en-US"/>
-          </a:p>
-        </p:txBody>
-      </p:sp>
-      <p:sp>
-        <p:nvSpPr>
-          <p:cNvPr id="4" name="Slide Number Placeholder 3"/>
-          <p:cNvSpPr>
-            <a:spLocks noGrp="1"/>
-          </p:cNvSpPr>
-          <p:nvPr>
-            <p:ph type="sldNum" sz="quarter" idx="10"/>
-          </p:nvPr>
-        </p:nvSpPr>
-        <p:spPr/>
-        <p:txBody>
-          <a:bodyPr/>
-          <a:lstStyle/>
-          <a:p>
-            <a:fld id="{18BDFEC3-8487-43E8-A154-7C12CBC1FFF2}" type="slidenum">
-              <a:rPr lang="en-US" smtClean="0"/>
-              <a:t>2</a:t>
-            </a:fld>
-            <a:endParaRPr lang="en-US"/>
-          </a:p>
-        </p:txBody>
-      </p:sp>
-    </p:spTree>
-    <p:extLst>
-      <p:ext uri="{BB962C8B-B14F-4D97-AF65-F5344CB8AC3E}">
-        <p14:creationId xmlns:p14="http://schemas.microsoft.com/office/powerpoint/2010/main" val="3016900036"/>
-      </p:ext>
-    </p:extLst>
-  </p:cSld>
-  <p:clrMapOvr>
-    <a:masterClrMapping/>
-  </p:clrMapOvr>
-</p:notes>
 </file>
 
 <file path=ppt/slideLayouts/slideLayout1.xml><?xml version="1.0" encoding="utf-8"?>
@@ -729,6 +148,7 @@
                 </a:solidFill>
                 <a:latin typeface="Frutiger for ZKB Light"/>
               </a:rPr>
+              <a:t/>
             </a:r>
           </a:p>
         </p:txBody>
@@ -762,7 +182,7 @@
                 </a:solidFill>
               </a:defRPr>
             </a:lvl1pPr>
-            <a:lvl2pPr marL="342900" indent="0" algn="ctr">
+            <a:lvl2pPr marL="457200" indent="0" algn="ctr">
               <a:buNone/>
               <a:defRPr>
                 <a:solidFill>
@@ -772,7 +192,7 @@
                 </a:solidFill>
               </a:defRPr>
             </a:lvl2pPr>
-            <a:lvl3pPr marL="685800" indent="0" algn="ctr">
+            <a:lvl3pPr marL="914400" indent="0" algn="ctr">
               <a:buNone/>
               <a:defRPr>
                 <a:solidFill>
@@ -782,7 +202,7 @@
                 </a:solidFill>
               </a:defRPr>
             </a:lvl3pPr>
-            <a:lvl4pPr marL="1028700" indent="0" algn="ctr">
+            <a:lvl4pPr marL="1371600" indent="0" algn="ctr">
               <a:buNone/>
               <a:defRPr>
                 <a:solidFill>
@@ -792,7 +212,7 @@
                 </a:solidFill>
               </a:defRPr>
             </a:lvl4pPr>
-            <a:lvl5pPr marL="1371600" indent="0" algn="ctr">
+            <a:lvl5pPr marL="1828800" indent="0" algn="ctr">
               <a:buNone/>
               <a:defRPr>
                 <a:solidFill>
@@ -802,7 +222,7 @@
                 </a:solidFill>
               </a:defRPr>
             </a:lvl5pPr>
-            <a:lvl6pPr marL="1714500" indent="0" algn="ctr">
+            <a:lvl6pPr marL="2286000" indent="0" algn="ctr">
               <a:buNone/>
               <a:defRPr>
                 <a:solidFill>
@@ -812,7 +232,7 @@
                 </a:solidFill>
               </a:defRPr>
             </a:lvl6pPr>
-            <a:lvl7pPr marL="2057400" indent="0" algn="ctr">
+            <a:lvl7pPr marL="2743200" indent="0" algn="ctr">
               <a:buNone/>
               <a:defRPr>
                 <a:solidFill>
@@ -822,7 +242,7 @@
                 </a:solidFill>
               </a:defRPr>
             </a:lvl7pPr>
-            <a:lvl8pPr marL="2400300" indent="0" algn="ctr">
+            <a:lvl8pPr marL="3200400" indent="0" algn="ctr">
               <a:buNone/>
               <a:defRPr>
                 <a:solidFill>
@@ -832,7 +252,7 @@
                 </a:solidFill>
               </a:defRPr>
             </a:lvl8pPr>
-            <a:lvl9pPr marL="2743200" indent="0" algn="ctr">
+            <a:lvl9pPr marL="3657600" indent="0" algn="ctr">
               <a:buNone/>
               <a:defRPr>
                 <a:solidFill>
@@ -845,12 +265,13 @@
           </a:lstStyle>
           <a:p>
             <a:r>
-              <a:rPr lang="en-US" sz="1400" b="false">
+              <a:rPr lang="en-US" sz="1400">
                 <a:solidFill>
                   <a:srgbClr val="003CD3"/>
                 </a:solidFill>
                 <a:latin typeface="Frutiger for ZKB Light"/>
               </a:rPr>
+              <a:t/>
             </a:r>
           </a:p>
         </p:txBody>
@@ -870,9 +291,10 @@
           <a:bodyPr/>
           <a:lstStyle/>
           <a:p>
-            <a:fld id="{241EB5C9-1307-BA42-ABA2-0BC069CD8E7F}" type="datetimeFigureOut">
-              <a:rPr lang="en-US" smtClean="0"/>
-              <a:t>1/2/22</a:t>
+            <a:fld id="{1D8BD707-D9CF-40AE-B4C6-C98DA3205C09}" type="datetimeFigureOut">
+              <a:rPr lang="en-US" smtClean="0"/>
+              <a:pPr/>
+              <a:t>8/1/2011</a:t>
             </a:fld>
             <a:endParaRPr lang="en-US"/>
           </a:p>
@@ -912,20 +334,102 @@
           <a:bodyPr/>
           <a:lstStyle/>
           <a:p>
-            <a:fld id="{C5EF2332-01BF-834F-8236-50238282D533}" type="slidenum">
-              <a:rPr lang="en-US" smtClean="0"/>
+            <a:fld id="{B6F15528-21DE-4FAA-801E-634DDDAF4B2B}" type="slidenum">
+              <a:rPr lang="en-US" smtClean="0"/>
+              <a:pPr/>
               <a:t>‹#›</a:t>
             </a:fld>
             <a:endParaRPr lang="en-US"/>
           </a:p>
         </p:txBody>
       </p:sp>
+      <p:pic>
+        <p:nvPicPr>
+          <p:cNvPr name="Picture 7" id="10010"/>
+          <p:cNvPicPr>
+            <a:picLocks noChangeAspect="true"/>
+          </p:cNvPicPr>
+          <p:nvPr/>
+        </p:nvPicPr>
+        <p:blipFill>
+          <a:blip r:embed="rId2"/>
+          <a:stretch>
+            <a:fillRect/>
+          </a:stretch>
+        </p:blipFill>
+        <p:spPr>
+          <a:xfrm>
+            <a:off x="0" y="0"/>
+            <a:ext cx="9144000" cy="6858000"/>
+          </a:xfrm>
+          <a:prstGeom prst="rect">
+            <a:avLst/>
+          </a:prstGeom>
+        </p:spPr>
+      </p:pic>
+      <p:sp>
+        <p:nvSpPr>
+          <p:cNvPr name="AutoShape 8" id="10011"/>
+          <p:cNvSpPr/>
+          <p:nvPr>
+            <p:ph type="sldNum"/>
+          </p:nvPr>
+        </p:nvSpPr>
+        <p:spPr>
+          <a:xfrm>
+            <a:off x="304800" y="6794500"/>
+            <a:ext cx="1270000" cy="254000"/>
+          </a:xfrm>
+          <a:prstGeom prst="rect">
+            <a:avLst/>
+          </a:prstGeom>
+        </p:spPr>
+        <p:txBody>
+          <a:p>
+            <a:fld type="slidenum">
+              <a:rPr sz="900">
+                <a:solidFill>
+                  <a:srgbClr val="003CD3"/>
+                </a:solidFill>
+                <a:latin typeface="Frutiger for ZKB Light"/>
+              </a:rPr>
+              <a:t>&lt;#&gt;</a:t>
+            </a:fld>
+          </a:p>
+        </p:txBody>
+      </p:sp>
+      <p:sp>
+        <p:nvSpPr>
+          <p:cNvPr name="AutoShape 9" id="10012"/>
+          <p:cNvSpPr/>
+          <p:nvPr>
+            <p:ph type="ftr"/>
+          </p:nvPr>
+        </p:nvSpPr>
+        <p:spPr>
+          <a:xfrm>
+            <a:off x="1905000" y="6794500"/>
+            <a:ext cx="7620000" cy="254000"/>
+          </a:xfrm>
+          <a:prstGeom prst="rect">
+            <a:avLst/>
+          </a:prstGeom>
+        </p:spPr>
+        <p:txBody>
+          <a:p>
+            <a:r>
+              <a:rPr lang="en-US" sz="900">
+                <a:solidFill>
+                  <a:srgbClr val="808080"/>
+                </a:solidFill>
+                <a:latin typeface="Frutiger for ZKB Light"/>
+              </a:rPr>
+              <a:t/>
+            </a:r>
+          </a:p>
+        </p:txBody>
+      </p:sp>
     </p:spTree>
-    <p:extLst>
-      <p:ext uri="{BB962C8B-B14F-4D97-AF65-F5344CB8AC3E}">
-        <p14:creationId xmlns:p14="http://schemas.microsoft.com/office/powerpoint/2010/main" val="1444357513"/>
-      </p:ext>
-    </p:extLst>
   </p:cSld>
   <p:clrMapOvr>
     <a:masterClrMapping/>
@@ -952,7 +456,7 @@
       </p:grpSpPr>
       <p:sp>
         <p:nvSpPr>
-          <p:cNvPr id="10016" name="Title 1"/>
+          <p:cNvPr id="10021" name="Title 1"/>
           <p:cNvSpPr>
             <a:spLocks noGrp="1"/>
           </p:cNvSpPr>
@@ -966,15 +470,16 @@
           <a:lstStyle/>
           <a:p>
             <a:r>
-              <a:rPr lang="en-US"/>
+              <a:rPr lang="en-US" smtClean="0"/>
               <a:t>Click to edit Master title style</a:t>
             </a:r>
-          </a:p>
-        </p:txBody>
-      </p:sp>
-      <p:sp>
-        <p:nvSpPr>
-          <p:cNvPr id="10017" name="Vertical Text Placeholder 2"/>
+            <a:endParaRPr lang="en-US"/>
+          </a:p>
+        </p:txBody>
+      </p:sp>
+      <p:sp>
+        <p:nvSpPr>
+          <p:cNvPr id="10022" name="Vertical Text Placeholder 2"/>
           <p:cNvSpPr>
             <a:spLocks noGrp="1"/>
           </p:cNvSpPr>
@@ -989,43 +494,44 @@
           <a:p>
             <a:pPr lvl="0"/>
             <a:r>
-              <a:rPr lang="en-US"/>
+              <a:rPr lang="en-US" smtClean="0"/>
               <a:t>Click to edit Master text styles</a:t>
             </a:r>
           </a:p>
           <a:p>
             <a:pPr lvl="1"/>
             <a:r>
-              <a:rPr lang="en-US"/>
+              <a:rPr lang="en-US" smtClean="0"/>
               <a:t>Second level</a:t>
             </a:r>
           </a:p>
           <a:p>
             <a:pPr lvl="2"/>
             <a:r>
-              <a:rPr lang="en-US"/>
+              <a:rPr lang="en-US" smtClean="0"/>
               <a:t>Third level</a:t>
             </a:r>
           </a:p>
           <a:p>
             <a:pPr lvl="3"/>
             <a:r>
-              <a:rPr lang="en-US"/>
+              <a:rPr lang="en-US" smtClean="0"/>
               <a:t>Fourth level</a:t>
             </a:r>
           </a:p>
           <a:p>
             <a:pPr lvl="4"/>
             <a:r>
-              <a:rPr lang="en-US"/>
+              <a:rPr lang="en-US" smtClean="0"/>
               <a:t>Fifth level</a:t>
             </a:r>
-          </a:p>
-        </p:txBody>
-      </p:sp>
-      <p:sp>
-        <p:nvSpPr>
-          <p:cNvPr id="10018" name="Date Placeholder 3"/>
+            <a:endParaRPr lang="en-US"/>
+          </a:p>
+        </p:txBody>
+      </p:sp>
+      <p:sp>
+        <p:nvSpPr>
+          <p:cNvPr id="10023" name="Date Placeholder 3"/>
           <p:cNvSpPr>
             <a:spLocks noGrp="1"/>
           </p:cNvSpPr>
@@ -1038,9 +544,10 @@
           <a:bodyPr/>
           <a:lstStyle/>
           <a:p>
-            <a:fld id="{241EB5C9-1307-BA42-ABA2-0BC069CD8E7F}" type="datetimeFigureOut">
-              <a:rPr lang="en-US" smtClean="0"/>
-              <a:t>1/2/22</a:t>
+            <a:fld id="{1D8BD707-D9CF-40AE-B4C6-C98DA3205C09}" type="datetimeFigureOut">
+              <a:rPr lang="en-US" smtClean="0"/>
+              <a:pPr/>
+              <a:t>8/1/2011</a:t>
             </a:fld>
             <a:endParaRPr lang="en-US"/>
           </a:p>
@@ -1048,7 +555,7 @@
       </p:sp>
       <p:sp>
         <p:nvSpPr>
-          <p:cNvPr id="10019" name="Footer Placeholder 4"/>
+          <p:cNvPr id="10024" name="Footer Placeholder 4"/>
           <p:cNvSpPr>
             <a:spLocks noGrp="1"/>
           </p:cNvSpPr>
@@ -1067,7 +574,7 @@
       </p:sp>
       <p:sp>
         <p:nvSpPr>
-          <p:cNvPr id="10020" name="Slide Number Placeholder 5"/>
+          <p:cNvPr id="10025" name="Slide Number Placeholder 5"/>
           <p:cNvSpPr>
             <a:spLocks noGrp="1"/>
           </p:cNvSpPr>
@@ -1080,20 +587,78 @@
           <a:bodyPr/>
           <a:lstStyle/>
           <a:p>
-            <a:fld id="{C5EF2332-01BF-834F-8236-50238282D533}" type="slidenum">
-              <a:rPr lang="en-US" smtClean="0"/>
+            <a:fld id="{B6F15528-21DE-4FAA-801E-634DDDAF4B2B}" type="slidenum">
+              <a:rPr lang="en-US" smtClean="0"/>
+              <a:pPr/>
               <a:t>‹#›</a:t>
             </a:fld>
             <a:endParaRPr lang="en-US"/>
           </a:p>
         </p:txBody>
       </p:sp>
+      <p:sp>
+        <p:nvSpPr>
+          <p:cNvPr name="AutoShape 7" id="10026"/>
+          <p:cNvSpPr/>
+          <p:nvPr>
+            <p:ph type="sldNum"/>
+          </p:nvPr>
+        </p:nvSpPr>
+        <p:spPr>
+          <a:xfrm>
+            <a:off x="304800" y="6794500"/>
+            <a:ext cx="1270000" cy="254000"/>
+          </a:xfrm>
+          <a:prstGeom prst="rect">
+            <a:avLst/>
+          </a:prstGeom>
+        </p:spPr>
+        <p:txBody>
+          <a:p>
+            <a:fld type="slidenum">
+              <a:rPr sz="900">
+                <a:solidFill>
+                  <a:srgbClr val="003CD3"/>
+                </a:solidFill>
+                <a:latin typeface="Frutiger for ZKB Light"/>
+              </a:rPr>
+              <a:t>&lt;#&gt;</a:t>
+            </a:fld>
+          </a:p>
+        </p:txBody>
+      </p:sp>
+      <p:sp>
+        <p:nvSpPr>
+          <p:cNvPr name="AutoShape 8" id="10027"/>
+          <p:cNvSpPr/>
+          <p:nvPr>
+            <p:ph type="ftr"/>
+          </p:nvPr>
+        </p:nvSpPr>
+        <p:spPr>
+          <a:xfrm>
+            <a:off x="1905000" y="6794500"/>
+            <a:ext cx="7620000" cy="254000"/>
+          </a:xfrm>
+          <a:prstGeom prst="rect">
+            <a:avLst/>
+          </a:prstGeom>
+        </p:spPr>
+        <p:txBody>
+          <a:p>
+            <a:r>
+              <a:rPr lang="en-US" sz="900">
+                <a:solidFill>
+                  <a:srgbClr val="808080"/>
+                </a:solidFill>
+                <a:latin typeface="Frutiger for ZKB Light"/>
+              </a:rPr>
+              <a:t/>
+            </a:r>
+          </a:p>
+        </p:txBody>
+      </p:sp>
     </p:spTree>
-    <p:extLst>
-      <p:ext uri="{BB962C8B-B14F-4D97-AF65-F5344CB8AC3E}">
-        <p14:creationId xmlns:p14="http://schemas.microsoft.com/office/powerpoint/2010/main" val="313914798"/>
-      </p:ext>
-    </p:extLst>
   </p:cSld>
   <p:clrMapOvr>
     <a:masterClrMapping/>
@@ -1120,7 +685,7 @@
       </p:grpSpPr>
       <p:sp>
         <p:nvSpPr>
-          <p:cNvPr id="10032" name="Vertical Title 1"/>
+          <p:cNvPr id="10043" name="Vertical Title 1"/>
           <p:cNvSpPr>
             <a:spLocks noGrp="1"/>
           </p:cNvSpPr>
@@ -1130,8 +695,8 @@
         </p:nvSpPr>
         <p:spPr>
           <a:xfrm>
-            <a:off x="6629400" y="205979"/>
-            <a:ext cx="2057400" cy="4388644"/>
+            <a:off x="6629400" y="274638"/>
+            <a:ext cx="2057400" cy="5851525"/>
           </a:xfrm>
         </p:spPr>
         <p:txBody>
@@ -1139,15 +704,16 @@
           <a:lstStyle/>
           <a:p>
             <a:r>
-              <a:rPr lang="en-US"/>
+              <a:rPr lang="en-US" smtClean="0"/>
               <a:t>Click to edit Master title style</a:t>
             </a:r>
-          </a:p>
-        </p:txBody>
-      </p:sp>
-      <p:sp>
-        <p:nvSpPr>
-          <p:cNvPr id="10033" name="Vertical Text Placeholder 2"/>
+            <a:endParaRPr lang="en-US"/>
+          </a:p>
+        </p:txBody>
+      </p:sp>
+      <p:sp>
+        <p:nvSpPr>
+          <p:cNvPr id="10044" name="Vertical Text Placeholder 2"/>
           <p:cNvSpPr>
             <a:spLocks noGrp="1"/>
           </p:cNvSpPr>
@@ -1157,8 +723,8 @@
         </p:nvSpPr>
         <p:spPr>
           <a:xfrm>
-            <a:off x="457200" y="205979"/>
-            <a:ext cx="6019800" cy="4388644"/>
+            <a:off x="457200" y="274638"/>
+            <a:ext cx="6019800" cy="5851525"/>
           </a:xfrm>
         </p:spPr>
         <p:txBody>
@@ -1167,43 +733,44 @@
           <a:p>
             <a:pPr lvl="0"/>
             <a:r>
-              <a:rPr lang="en-US"/>
+              <a:rPr lang="en-US" smtClean="0"/>
               <a:t>Click to edit Master text styles</a:t>
             </a:r>
           </a:p>
           <a:p>
             <a:pPr lvl="1"/>
             <a:r>
-              <a:rPr lang="en-US"/>
+              <a:rPr lang="en-US" smtClean="0"/>
               <a:t>Second level</a:t>
             </a:r>
           </a:p>
           <a:p>
             <a:pPr lvl="2"/>
             <a:r>
-              <a:rPr lang="en-US"/>
+              <a:rPr lang="en-US" smtClean="0"/>
               <a:t>Third level</a:t>
             </a:r>
           </a:p>
           <a:p>
             <a:pPr lvl="3"/>
             <a:r>
-              <a:rPr lang="en-US"/>
+              <a:rPr lang="en-US" smtClean="0"/>
               <a:t>Fourth level</a:t>
             </a:r>
           </a:p>
           <a:p>
             <a:pPr lvl="4"/>
             <a:r>
-              <a:rPr lang="en-US"/>
+              <a:rPr lang="en-US" smtClean="0"/>
               <a:t>Fifth level</a:t>
             </a:r>
-          </a:p>
-        </p:txBody>
-      </p:sp>
-      <p:sp>
-        <p:nvSpPr>
-          <p:cNvPr id="10034" name="Date Placeholder 3"/>
+            <a:endParaRPr lang="en-US"/>
+          </a:p>
+        </p:txBody>
+      </p:sp>
+      <p:sp>
+        <p:nvSpPr>
+          <p:cNvPr id="10045" name="Date Placeholder 3"/>
           <p:cNvSpPr>
             <a:spLocks noGrp="1"/>
           </p:cNvSpPr>
@@ -1216,9 +783,10 @@
           <a:bodyPr/>
           <a:lstStyle/>
           <a:p>
-            <a:fld id="{241EB5C9-1307-BA42-ABA2-0BC069CD8E7F}" type="datetimeFigureOut">
-              <a:rPr lang="en-US" smtClean="0"/>
-              <a:t>1/2/22</a:t>
+            <a:fld id="{1D8BD707-D9CF-40AE-B4C6-C98DA3205C09}" type="datetimeFigureOut">
+              <a:rPr lang="en-US" smtClean="0"/>
+              <a:pPr/>
+              <a:t>8/1/2011</a:t>
             </a:fld>
             <a:endParaRPr lang="en-US"/>
           </a:p>
@@ -1226,7 +794,7 @@
       </p:sp>
       <p:sp>
         <p:nvSpPr>
-          <p:cNvPr id="10035" name="Footer Placeholder 4"/>
+          <p:cNvPr id="10046" name="Footer Placeholder 4"/>
           <p:cNvSpPr>
             <a:spLocks noGrp="1"/>
           </p:cNvSpPr>
@@ -1245,7 +813,7 @@
       </p:sp>
       <p:sp>
         <p:nvSpPr>
-          <p:cNvPr id="10036" name="Slide Number Placeholder 5"/>
+          <p:cNvPr id="10047" name="Slide Number Placeholder 5"/>
           <p:cNvSpPr>
             <a:spLocks noGrp="1"/>
           </p:cNvSpPr>
@@ -1258,20 +826,78 @@
           <a:bodyPr/>
           <a:lstStyle/>
           <a:p>
-            <a:fld id="{C5EF2332-01BF-834F-8236-50238282D533}" type="slidenum">
-              <a:rPr lang="en-US" smtClean="0"/>
+            <a:fld id="{B6F15528-21DE-4FAA-801E-634DDDAF4B2B}" type="slidenum">
+              <a:rPr lang="en-US" smtClean="0"/>
+              <a:pPr/>
               <a:t>‹#›</a:t>
             </a:fld>
             <a:endParaRPr lang="en-US"/>
           </a:p>
         </p:txBody>
       </p:sp>
+      <p:sp>
+        <p:nvSpPr>
+          <p:cNvPr name="AutoShape 7" id="10048"/>
+          <p:cNvSpPr/>
+          <p:nvPr>
+            <p:ph type="sldNum"/>
+          </p:nvPr>
+        </p:nvSpPr>
+        <p:spPr>
+          <a:xfrm>
+            <a:off x="304800" y="6794500"/>
+            <a:ext cx="1270000" cy="254000"/>
+          </a:xfrm>
+          <a:prstGeom prst="rect">
+            <a:avLst/>
+          </a:prstGeom>
+        </p:spPr>
+        <p:txBody>
+          <a:p>
+            <a:fld type="slidenum">
+              <a:rPr sz="900">
+                <a:solidFill>
+                  <a:srgbClr val="003CD3"/>
+                </a:solidFill>
+                <a:latin typeface="Frutiger for ZKB Light"/>
+              </a:rPr>
+              <a:t>&lt;#&gt;</a:t>
+            </a:fld>
+          </a:p>
+        </p:txBody>
+      </p:sp>
+      <p:sp>
+        <p:nvSpPr>
+          <p:cNvPr name="AutoShape 8" id="10049"/>
+          <p:cNvSpPr/>
+          <p:nvPr>
+            <p:ph type="ftr"/>
+          </p:nvPr>
+        </p:nvSpPr>
+        <p:spPr>
+          <a:xfrm>
+            <a:off x="1905000" y="6794500"/>
+            <a:ext cx="7620000" cy="254000"/>
+          </a:xfrm>
+          <a:prstGeom prst="rect">
+            <a:avLst/>
+          </a:prstGeom>
+        </p:spPr>
+        <p:txBody>
+          <a:p>
+            <a:r>
+              <a:rPr lang="en-US" sz="900">
+                <a:solidFill>
+                  <a:srgbClr val="808080"/>
+                </a:solidFill>
+                <a:latin typeface="Frutiger for ZKB Light"/>
+              </a:rPr>
+              <a:t/>
+            </a:r>
+          </a:p>
+        </p:txBody>
+      </p:sp>
     </p:spTree>
-    <p:extLst>
-      <p:ext uri="{BB962C8B-B14F-4D97-AF65-F5344CB8AC3E}">
-        <p14:creationId xmlns:p14="http://schemas.microsoft.com/office/powerpoint/2010/main" val="2581529045"/>
-      </p:ext>
-    </p:extLst>
   </p:cSld>
   <p:clrMapOvr>
     <a:masterClrMapping/>
@@ -1298,7 +924,7 @@
       </p:grpSpPr>
       <p:sp>
         <p:nvSpPr>
-          <p:cNvPr id="10037" name="Title 1"/>
+          <p:cNvPr id="10050" name="Title 1"/>
           <p:cNvSpPr>
             <a:spLocks noGrp="1"/>
           </p:cNvSpPr>
@@ -1318,13 +944,14 @@
                 </a:solidFill>
                 <a:latin typeface="Frutiger for ZKB Light"/>
               </a:rPr>
-            </a:r>
-          </a:p>
-        </p:txBody>
-      </p:sp>
-      <p:sp>
-        <p:nvSpPr>
-          <p:cNvPr id="10038" name="Content Placeholder 2"/>
+              <a:t/>
+            </a:r>
+          </a:p>
+        </p:txBody>
+      </p:sp>
+      <p:sp>
+        <p:nvSpPr>
+          <p:cNvPr id="10051" name="Content Placeholder 2"/>
           <p:cNvSpPr>
             <a:spLocks noGrp="1"/>
           </p:cNvSpPr>
@@ -1338,19 +965,20 @@
           <a:lstStyle/>
           <a:p>
             <a:r>
-              <a:rPr lang="en-US" sz="1800" b="false">
+              <a:rPr lang="en-US" sz="1800">
                 <a:solidFill>
                   <a:srgbClr val="000000"/>
                 </a:solidFill>
                 <a:latin typeface="Frutiger for ZKB Light"/>
               </a:rPr>
-            </a:r>
-          </a:p>
-        </p:txBody>
-      </p:sp>
-      <p:sp>
-        <p:nvSpPr>
-          <p:cNvPr id="10039" name="Date Placeholder 3"/>
+              <a:t/>
+            </a:r>
+          </a:p>
+        </p:txBody>
+      </p:sp>
+      <p:sp>
+        <p:nvSpPr>
+          <p:cNvPr id="10052" name="Date Placeholder 3"/>
           <p:cNvSpPr>
             <a:spLocks noGrp="1"/>
           </p:cNvSpPr>
@@ -1363,9 +991,10 @@
           <a:bodyPr/>
           <a:lstStyle/>
           <a:p>
-            <a:fld id="{241EB5C9-1307-BA42-ABA2-0BC069CD8E7F}" type="datetimeFigureOut">
-              <a:rPr lang="en-US" smtClean="0"/>
-              <a:t>1/2/22</a:t>
+            <a:fld id="{1D8BD707-D9CF-40AE-B4C6-C98DA3205C09}" type="datetimeFigureOut">
+              <a:rPr lang="en-US" smtClean="0"/>
+              <a:pPr/>
+              <a:t>8/1/2011</a:t>
             </a:fld>
             <a:endParaRPr lang="en-US"/>
           </a:p>
@@ -1373,7 +1002,7 @@
       </p:sp>
       <p:sp>
         <p:nvSpPr>
-          <p:cNvPr id="10040" name="Footer Placeholder 4"/>
+          <p:cNvPr id="10053" name="Footer Placeholder 4"/>
           <p:cNvSpPr>
             <a:spLocks noGrp="1"/>
           </p:cNvSpPr>
@@ -1392,7 +1021,7 @@
       </p:sp>
       <p:sp>
         <p:nvSpPr>
-          <p:cNvPr id="10041" name="Slide Number Placeholder 5"/>
+          <p:cNvPr id="10054" name="Slide Number Placeholder 5"/>
           <p:cNvSpPr>
             <a:spLocks noGrp="1"/>
           </p:cNvSpPr>
@@ -1416,12 +1045,69 @@
           </a:p>
         </p:txBody>
       </p:sp>
+      <p:sp>
+        <p:nvSpPr>
+          <p:cNvPr name="AutoShape 7" id="10055"/>
+          <p:cNvSpPr/>
+          <p:nvPr>
+            <p:ph type="sldNum"/>
+          </p:nvPr>
+        </p:nvSpPr>
+        <p:spPr>
+          <a:xfrm>
+            <a:off x="304800" y="6794500"/>
+            <a:ext cx="1270000" cy="254000"/>
+          </a:xfrm>
+          <a:prstGeom prst="rect">
+            <a:avLst/>
+          </a:prstGeom>
+        </p:spPr>
+        <p:txBody>
+          <a:p>
+            <a:fld type="slidenum">
+              <a:rPr sz="900">
+                <a:solidFill>
+                  <a:srgbClr val="003CD3"/>
+                </a:solidFill>
+                <a:latin typeface="Frutiger for ZKB Light"/>
+              </a:rPr>
+              <a:t>&lt;#&gt;</a:t>
+            </a:fld>
+          </a:p>
+        </p:txBody>
+      </p:sp>
+      <p:sp>
+        <p:nvSpPr>
+          <p:cNvPr name="AutoShape 8" id="10056"/>
+          <p:cNvSpPr/>
+          <p:nvPr>
+            <p:ph type="ftr"/>
+          </p:nvPr>
+        </p:nvSpPr>
+        <p:spPr>
+          <a:xfrm>
+            <a:off x="1905000" y="6794500"/>
+            <a:ext cx="7620000" cy="254000"/>
+          </a:xfrm>
+          <a:prstGeom prst="rect">
+            <a:avLst/>
+          </a:prstGeom>
+        </p:spPr>
+        <p:txBody>
+          <a:p>
+            <a:r>
+              <a:rPr lang="en-US" sz="900">
+                <a:solidFill>
+                  <a:srgbClr val="808080"/>
+                </a:solidFill>
+                <a:latin typeface="Frutiger for ZKB Light"/>
+              </a:rPr>
+              <a:t/>
+            </a:r>
+          </a:p>
+        </p:txBody>
+      </p:sp>
     </p:spTree>
-    <p:extLst>
-      <p:ext uri="{BB962C8B-B14F-4D97-AF65-F5344CB8AC3E}">
-        <p14:creationId xmlns:p14="http://schemas.microsoft.com/office/powerpoint/2010/main" val="338346009"/>
-      </p:ext>
-    </p:extLst>
   </p:cSld>
   <p:clrMapOvr>
     <a:masterClrMapping/>
@@ -1448,7 +1134,7 @@
       </p:grpSpPr>
       <p:sp>
         <p:nvSpPr>
-          <p:cNvPr id="10046" name="Title 1"/>
+          <p:cNvPr id="10063" name="Title 1"/>
           <p:cNvSpPr>
             <a:spLocks noGrp="1"/>
           </p:cNvSpPr>
@@ -1458,28 +1144,29 @@
         </p:nvSpPr>
         <p:spPr>
           <a:xfrm>
-            <a:off x="722313" y="3305176"/>
-            <a:ext cx="7772400" cy="1021556"/>
+            <a:off x="722313" y="4406900"/>
+            <a:ext cx="7772400" cy="1362075"/>
           </a:xfrm>
         </p:spPr>
         <p:txBody>
           <a:bodyPr anchor="t"/>
           <a:lstStyle>
             <a:lvl1pPr algn="l">
-              <a:defRPr sz="3000" b="1" cap="all"/>
+              <a:defRPr sz="4000" b="1" cap="all"/>
             </a:lvl1pPr>
           </a:lstStyle>
           <a:p>
             <a:r>
-              <a:rPr lang="en-US"/>
+              <a:rPr lang="en-US" smtClean="0"/>
               <a:t>Click to edit Master title style</a:t>
             </a:r>
-          </a:p>
-        </p:txBody>
-      </p:sp>
-      <p:sp>
-        <p:nvSpPr>
-          <p:cNvPr id="10047" name="Text Placeholder 2"/>
+            <a:endParaRPr lang="en-US"/>
+          </a:p>
+        </p:txBody>
+      </p:sp>
+      <p:sp>
+        <p:nvSpPr>
+          <p:cNvPr id="10064" name="Text Placeholder 2"/>
           <p:cNvSpPr>
             <a:spLocks noGrp="1"/>
           </p:cNvSpPr>
@@ -1489,8 +1176,8 @@
         </p:nvSpPr>
         <p:spPr>
           <a:xfrm>
-            <a:off x="722313" y="2180035"/>
-            <a:ext cx="7772400" cy="1125140"/>
+            <a:off x="722313" y="2906713"/>
+            <a:ext cx="7772400" cy="1500187"/>
           </a:xfrm>
         </p:spPr>
         <p:txBody>
@@ -1498,7 +1185,7 @@
           <a:lstStyle>
             <a:lvl1pPr marL="0" indent="0">
               <a:buNone/>
-              <a:defRPr sz="1500">
+              <a:defRPr sz="2000">
                 <a:solidFill>
                   <a:schemeClr val="tx1">
                     <a:tint val="75000"/>
@@ -1506,9 +1193,9 @@
                 </a:solidFill>
               </a:defRPr>
             </a:lvl1pPr>
-            <a:lvl2pPr marL="342900" indent="0">
-              <a:buNone/>
-              <a:defRPr sz="1350">
+            <a:lvl2pPr marL="457200" indent="0">
+              <a:buNone/>
+              <a:defRPr sz="1800">
                 <a:solidFill>
                   <a:schemeClr val="tx1">
                     <a:tint val="75000"/>
@@ -1516,9 +1203,9 @@
                 </a:solidFill>
               </a:defRPr>
             </a:lvl2pPr>
-            <a:lvl3pPr marL="685800" indent="0">
-              <a:buNone/>
-              <a:defRPr sz="1200">
+            <a:lvl3pPr marL="914400" indent="0">
+              <a:buNone/>
+              <a:defRPr sz="1600">
                 <a:solidFill>
                   <a:schemeClr val="tx1">
                     <a:tint val="75000"/>
@@ -1526,9 +1213,9 @@
                 </a:solidFill>
               </a:defRPr>
             </a:lvl3pPr>
-            <a:lvl4pPr marL="1028700" indent="0">
-              <a:buNone/>
-              <a:defRPr sz="1050">
+            <a:lvl4pPr marL="1371600" indent="0">
+              <a:buNone/>
+              <a:defRPr sz="1400">
                 <a:solidFill>
                   <a:schemeClr val="tx1">
                     <a:tint val="75000"/>
@@ -1536,9 +1223,9 @@
                 </a:solidFill>
               </a:defRPr>
             </a:lvl4pPr>
-            <a:lvl5pPr marL="1371600" indent="0">
-              <a:buNone/>
-              <a:defRPr sz="1050">
+            <a:lvl5pPr marL="1828800" indent="0">
+              <a:buNone/>
+              <a:defRPr sz="1400">
                 <a:solidFill>
                   <a:schemeClr val="tx1">
                     <a:tint val="75000"/>
@@ -1546,9 +1233,9 @@
                 </a:solidFill>
               </a:defRPr>
             </a:lvl5pPr>
-            <a:lvl6pPr marL="1714500" indent="0">
-              <a:buNone/>
-              <a:defRPr sz="1050">
+            <a:lvl6pPr marL="2286000" indent="0">
+              <a:buNone/>
+              <a:defRPr sz="1400">
                 <a:solidFill>
                   <a:schemeClr val="tx1">
                     <a:tint val="75000"/>
@@ -1556,9 +1243,9 @@
                 </a:solidFill>
               </a:defRPr>
             </a:lvl6pPr>
-            <a:lvl7pPr marL="2057400" indent="0">
-              <a:buNone/>
-              <a:defRPr sz="1050">
+            <a:lvl7pPr marL="2743200" indent="0">
+              <a:buNone/>
+              <a:defRPr sz="1400">
                 <a:solidFill>
                   <a:schemeClr val="tx1">
                     <a:tint val="75000"/>
@@ -1566,9 +1253,9 @@
                 </a:solidFill>
               </a:defRPr>
             </a:lvl7pPr>
-            <a:lvl8pPr marL="2400300" indent="0">
-              <a:buNone/>
-              <a:defRPr sz="1050">
+            <a:lvl8pPr marL="3200400" indent="0">
+              <a:buNone/>
+              <a:defRPr sz="1400">
                 <a:solidFill>
                   <a:schemeClr val="tx1">
                     <a:tint val="75000"/>
@@ -1576,9 +1263,9 @@
                 </a:solidFill>
               </a:defRPr>
             </a:lvl8pPr>
-            <a:lvl9pPr marL="2743200" indent="0">
-              <a:buNone/>
-              <a:defRPr sz="1050">
+            <a:lvl9pPr marL="3657600" indent="0">
+              <a:buNone/>
+              <a:defRPr sz="1400">
                 <a:solidFill>
                   <a:schemeClr val="tx1">
                     <a:tint val="75000"/>
@@ -1590,7 +1277,7 @@
           <a:p>
             <a:pPr lvl="0"/>
             <a:r>
-              <a:rPr lang="en-US"/>
+              <a:rPr lang="en-US" smtClean="0"/>
               <a:t>Click to edit Master text styles</a:t>
             </a:r>
           </a:p>
@@ -1598,7 +1285,7 @@
       </p:sp>
       <p:sp>
         <p:nvSpPr>
-          <p:cNvPr id="10048" name="Date Placeholder 3"/>
+          <p:cNvPr id="10065" name="Date Placeholder 3"/>
           <p:cNvSpPr>
             <a:spLocks noGrp="1"/>
           </p:cNvSpPr>
@@ -1611,9 +1298,10 @@
           <a:bodyPr/>
           <a:lstStyle/>
           <a:p>
-            <a:fld id="{241EB5C9-1307-BA42-ABA2-0BC069CD8E7F}" type="datetimeFigureOut">
-              <a:rPr lang="en-US" smtClean="0"/>
-              <a:t>1/2/22</a:t>
+            <a:fld id="{1D8BD707-D9CF-40AE-B4C6-C98DA3205C09}" type="datetimeFigureOut">
+              <a:rPr lang="en-US" smtClean="0"/>
+              <a:pPr/>
+              <a:t>8/1/2011</a:t>
             </a:fld>
             <a:endParaRPr lang="en-US"/>
           </a:p>
@@ -1621,7 +1309,7 @@
       </p:sp>
       <p:sp>
         <p:nvSpPr>
-          <p:cNvPr id="10049" name="Footer Placeholder 4"/>
+          <p:cNvPr id="10066" name="Footer Placeholder 4"/>
           <p:cNvSpPr>
             <a:spLocks noGrp="1"/>
           </p:cNvSpPr>
@@ -1640,7 +1328,7 @@
       </p:sp>
       <p:sp>
         <p:nvSpPr>
-          <p:cNvPr id="10050" name="Slide Number Placeholder 5"/>
+          <p:cNvPr id="10067" name="Slide Number Placeholder 5"/>
           <p:cNvSpPr>
             <a:spLocks noGrp="1"/>
           </p:cNvSpPr>
@@ -1653,20 +1341,78 @@
           <a:bodyPr/>
           <a:lstStyle/>
           <a:p>
-            <a:fld id="{C5EF2332-01BF-834F-8236-50238282D533}" type="slidenum">
-              <a:rPr lang="en-US" smtClean="0"/>
+            <a:fld id="{B6F15528-21DE-4FAA-801E-634DDDAF4B2B}" type="slidenum">
+              <a:rPr lang="en-US" smtClean="0"/>
+              <a:pPr/>
               <a:t>‹#›</a:t>
             </a:fld>
             <a:endParaRPr lang="en-US"/>
           </a:p>
         </p:txBody>
       </p:sp>
+      <p:sp>
+        <p:nvSpPr>
+          <p:cNvPr name="AutoShape 7" id="10068"/>
+          <p:cNvSpPr/>
+          <p:nvPr>
+            <p:ph type="sldNum"/>
+          </p:nvPr>
+        </p:nvSpPr>
+        <p:spPr>
+          <a:xfrm>
+            <a:off x="304800" y="6794500"/>
+            <a:ext cx="1270000" cy="254000"/>
+          </a:xfrm>
+          <a:prstGeom prst="rect">
+            <a:avLst/>
+          </a:prstGeom>
+        </p:spPr>
+        <p:txBody>
+          <a:p>
+            <a:fld type="slidenum">
+              <a:rPr sz="900">
+                <a:solidFill>
+                  <a:srgbClr val="003CD3"/>
+                </a:solidFill>
+                <a:latin typeface="Frutiger for ZKB Light"/>
+              </a:rPr>
+              <a:t>&lt;#&gt;</a:t>
+            </a:fld>
+          </a:p>
+        </p:txBody>
+      </p:sp>
+      <p:sp>
+        <p:nvSpPr>
+          <p:cNvPr name="AutoShape 8" id="10069"/>
+          <p:cNvSpPr/>
+          <p:nvPr>
+            <p:ph type="ftr"/>
+          </p:nvPr>
+        </p:nvSpPr>
+        <p:spPr>
+          <a:xfrm>
+            <a:off x="1905000" y="6794500"/>
+            <a:ext cx="7620000" cy="254000"/>
+          </a:xfrm>
+          <a:prstGeom prst="rect">
+            <a:avLst/>
+          </a:prstGeom>
+        </p:spPr>
+        <p:txBody>
+          <a:p>
+            <a:r>
+              <a:rPr lang="en-US" sz="900">
+                <a:solidFill>
+                  <a:srgbClr val="808080"/>
+                </a:solidFill>
+                <a:latin typeface="Frutiger for ZKB Light"/>
+              </a:rPr>
+              <a:t/>
+            </a:r>
+          </a:p>
+        </p:txBody>
+      </p:sp>
     </p:spTree>
-    <p:extLst>
-      <p:ext uri="{BB962C8B-B14F-4D97-AF65-F5344CB8AC3E}">
-        <p14:creationId xmlns:p14="http://schemas.microsoft.com/office/powerpoint/2010/main" val="1073069076"/>
-      </p:ext>
-    </p:extLst>
   </p:cSld>
   <p:clrMapOvr>
     <a:masterClrMapping/>
@@ -1693,7 +1439,7 @@
       </p:grpSpPr>
       <p:sp>
         <p:nvSpPr>
-          <p:cNvPr id="10051" name="Title 1"/>
+          <p:cNvPr id="10070" name="Title 1"/>
           <p:cNvSpPr>
             <a:spLocks noGrp="1"/>
           </p:cNvSpPr>
@@ -1713,13 +1459,14 @@
                 </a:solidFill>
                 <a:latin typeface="Frutiger for ZKB Light"/>
               </a:rPr>
-            </a:r>
-          </a:p>
-        </p:txBody>
-      </p:sp>
-      <p:sp>
-        <p:nvSpPr>
-          <p:cNvPr id="10052" name="Content Placeholder 2"/>
+              <a:t/>
+            </a:r>
+          </a:p>
+        </p:txBody>
+      </p:sp>
+      <p:sp>
+        <p:nvSpPr>
+          <p:cNvPr id="10071" name="Content Placeholder 2"/>
           <p:cNvSpPr>
             <a:spLocks noGrp="1"/>
           </p:cNvSpPr>
@@ -1737,48 +1484,49 @@
           <a:bodyPr/>
           <a:lstStyle>
             <a:lvl1pPr>
-              <a:defRPr sz="2100"/>
+              <a:defRPr sz="2800"/>
             </a:lvl1pPr>
             <a:lvl2pPr>
-              <a:defRPr sz="1800"/>
+              <a:defRPr sz="2400"/>
             </a:lvl2pPr>
             <a:lvl3pPr>
-              <a:defRPr sz="1500"/>
+              <a:defRPr sz="2000"/>
             </a:lvl3pPr>
             <a:lvl4pPr>
-              <a:defRPr sz="1350"/>
+              <a:defRPr sz="1800"/>
             </a:lvl4pPr>
             <a:lvl5pPr>
-              <a:defRPr sz="1350"/>
+              <a:defRPr sz="1800"/>
             </a:lvl5pPr>
             <a:lvl6pPr>
-              <a:defRPr sz="1350"/>
+              <a:defRPr sz="1800"/>
             </a:lvl6pPr>
             <a:lvl7pPr>
-              <a:defRPr sz="1350"/>
+              <a:defRPr sz="1800"/>
             </a:lvl7pPr>
             <a:lvl8pPr>
-              <a:defRPr sz="1350"/>
+              <a:defRPr sz="1800"/>
             </a:lvl8pPr>
             <a:lvl9pPr>
-              <a:defRPr sz="1350"/>
+              <a:defRPr sz="1800"/>
             </a:lvl9pPr>
           </a:lstStyle>
           <a:p>
             <a:r>
-              <a:rPr lang="en-US" sz="1800" b="false">
+              <a:rPr lang="en-US" sz="1800">
                 <a:solidFill>
                   <a:srgbClr val="000000"/>
                 </a:solidFill>
                 <a:latin typeface="Frutiger for ZKB Light"/>
               </a:rPr>
-            </a:r>
-          </a:p>
-        </p:txBody>
-      </p:sp>
-      <p:sp>
-        <p:nvSpPr>
-          <p:cNvPr id="10053" name="Content Placeholder 3"/>
+              <a:t/>
+            </a:r>
+          </a:p>
+        </p:txBody>
+      </p:sp>
+      <p:sp>
+        <p:nvSpPr>
+          <p:cNvPr id="10072" name="Content Placeholder 3"/>
           <p:cNvSpPr>
             <a:spLocks noGrp="1"/>
           </p:cNvSpPr>
@@ -1796,48 +1544,49 @@
           <a:bodyPr/>
           <a:lstStyle>
             <a:lvl1pPr>
-              <a:defRPr sz="2100"/>
+              <a:defRPr sz="2800"/>
             </a:lvl1pPr>
             <a:lvl2pPr>
-              <a:defRPr sz="1800"/>
+              <a:defRPr sz="2400"/>
             </a:lvl2pPr>
             <a:lvl3pPr>
-              <a:defRPr sz="1500"/>
+              <a:defRPr sz="2000"/>
             </a:lvl3pPr>
             <a:lvl4pPr>
-              <a:defRPr sz="1350"/>
+              <a:defRPr sz="1800"/>
             </a:lvl4pPr>
             <a:lvl5pPr>
-              <a:defRPr sz="1350"/>
+              <a:defRPr sz="1800"/>
             </a:lvl5pPr>
             <a:lvl6pPr>
-              <a:defRPr sz="1350"/>
+              <a:defRPr sz="1800"/>
             </a:lvl6pPr>
             <a:lvl7pPr>
-              <a:defRPr sz="1350"/>
+              <a:defRPr sz="1800"/>
             </a:lvl7pPr>
             <a:lvl8pPr>
-              <a:defRPr sz="1350"/>
+              <a:defRPr sz="1800"/>
             </a:lvl8pPr>
             <a:lvl9pPr>
-              <a:defRPr sz="1350"/>
+              <a:defRPr sz="1800"/>
             </a:lvl9pPr>
           </a:lstStyle>
           <a:p>
             <a:r>
-              <a:rPr lang="en-US" sz="1800" b="false">
+              <a:rPr lang="en-US" sz="1800">
                 <a:solidFill>
                   <a:srgbClr val="000000"/>
                 </a:solidFill>
                 <a:latin typeface="Frutiger for ZKB Light"/>
               </a:rPr>
-            </a:r>
-          </a:p>
-        </p:txBody>
-      </p:sp>
-      <p:sp>
-        <p:nvSpPr>
-          <p:cNvPr id="10054" name="Date Placeholder 4"/>
+              <a:t/>
+            </a:r>
+          </a:p>
+        </p:txBody>
+      </p:sp>
+      <p:sp>
+        <p:nvSpPr>
+          <p:cNvPr id="10073" name="Date Placeholder 4"/>
           <p:cNvSpPr>
             <a:spLocks noGrp="1"/>
           </p:cNvSpPr>
@@ -1850,9 +1599,10 @@
           <a:bodyPr/>
           <a:lstStyle/>
           <a:p>
-            <a:fld id="{241EB5C9-1307-BA42-ABA2-0BC069CD8E7F}" type="datetimeFigureOut">
-              <a:rPr lang="en-US" smtClean="0"/>
-              <a:t>1/2/22</a:t>
+            <a:fld id="{1D8BD707-D9CF-40AE-B4C6-C98DA3205C09}" type="datetimeFigureOut">
+              <a:rPr lang="en-US" smtClean="0"/>
+              <a:pPr/>
+              <a:t>8/1/2011</a:t>
             </a:fld>
             <a:endParaRPr lang="en-US"/>
           </a:p>
@@ -1860,7 +1610,7 @@
       </p:sp>
       <p:sp>
         <p:nvSpPr>
-          <p:cNvPr id="10055" name="Footer Placeholder 5"/>
+          <p:cNvPr id="10074" name="Footer Placeholder 5"/>
           <p:cNvSpPr>
             <a:spLocks noGrp="1"/>
           </p:cNvSpPr>
@@ -1879,7 +1629,7 @@
       </p:sp>
       <p:sp>
         <p:nvSpPr>
-          <p:cNvPr id="10056" name="Slide Number Placeholder 6"/>
+          <p:cNvPr id="10075" name="Slide Number Placeholder 6"/>
           <p:cNvSpPr>
             <a:spLocks noGrp="1"/>
           </p:cNvSpPr>
@@ -1903,12 +1653,69 @@
           </a:p>
         </p:txBody>
       </p:sp>
+      <p:sp>
+        <p:nvSpPr>
+          <p:cNvPr name="AutoShape 8" id="10076"/>
+          <p:cNvSpPr/>
+          <p:nvPr>
+            <p:ph type="sldNum"/>
+          </p:nvPr>
+        </p:nvSpPr>
+        <p:spPr>
+          <a:xfrm>
+            <a:off x="304800" y="6794500"/>
+            <a:ext cx="1270000" cy="254000"/>
+          </a:xfrm>
+          <a:prstGeom prst="rect">
+            <a:avLst/>
+          </a:prstGeom>
+        </p:spPr>
+        <p:txBody>
+          <a:p>
+            <a:fld type="slidenum">
+              <a:rPr sz="900">
+                <a:solidFill>
+                  <a:srgbClr val="003CD3"/>
+                </a:solidFill>
+                <a:latin typeface="Frutiger for ZKB Light"/>
+              </a:rPr>
+              <a:t>&lt;#&gt;</a:t>
+            </a:fld>
+          </a:p>
+        </p:txBody>
+      </p:sp>
+      <p:sp>
+        <p:nvSpPr>
+          <p:cNvPr name="AutoShape 9" id="10077"/>
+          <p:cNvSpPr/>
+          <p:nvPr>
+            <p:ph type="ftr"/>
+          </p:nvPr>
+        </p:nvSpPr>
+        <p:spPr>
+          <a:xfrm>
+            <a:off x="1905000" y="6794500"/>
+            <a:ext cx="7620000" cy="254000"/>
+          </a:xfrm>
+          <a:prstGeom prst="rect">
+            <a:avLst/>
+          </a:prstGeom>
+        </p:spPr>
+        <p:txBody>
+          <a:p>
+            <a:r>
+              <a:rPr lang="en-US" sz="900">
+                <a:solidFill>
+                  <a:srgbClr val="808080"/>
+                </a:solidFill>
+                <a:latin typeface="Frutiger for ZKB Light"/>
+              </a:rPr>
+              <a:t/>
+            </a:r>
+          </a:p>
+        </p:txBody>
+      </p:sp>
     </p:spTree>
-    <p:extLst>
-      <p:ext uri="{BB962C8B-B14F-4D97-AF65-F5344CB8AC3E}">
-        <p14:creationId xmlns:p14="http://schemas.microsoft.com/office/powerpoint/2010/main" val="2619886245"/>
-      </p:ext>
-    </p:extLst>
   </p:cSld>
   <p:clrMapOvr>
     <a:masterClrMapping/>
@@ -1935,7 +1742,7 @@
       </p:grpSpPr>
       <p:sp>
         <p:nvSpPr>
-          <p:cNvPr id="10021" name="Title 1"/>
+          <p:cNvPr id="10028" name="Title 1"/>
           <p:cNvSpPr>
             <a:spLocks noGrp="1"/>
           </p:cNvSpPr>
@@ -1953,15 +1760,16 @@
           </a:lstStyle>
           <a:p>
             <a:r>
-              <a:rPr lang="en-US"/>
+              <a:rPr lang="en-US" smtClean="0"/>
               <a:t>Click to edit Master title style</a:t>
             </a:r>
-          </a:p>
-        </p:txBody>
-      </p:sp>
-      <p:sp>
-        <p:nvSpPr>
-          <p:cNvPr id="10022" name="Text Placeholder 2"/>
+            <a:endParaRPr lang="en-US"/>
+          </a:p>
+        </p:txBody>
+      </p:sp>
+      <p:sp>
+        <p:nvSpPr>
+          <p:cNvPr id="10029" name="Text Placeholder 2"/>
           <p:cNvSpPr>
             <a:spLocks noGrp="1"/>
           </p:cNvSpPr>
@@ -1971,8 +1779,8 @@
         </p:nvSpPr>
         <p:spPr>
           <a:xfrm>
-            <a:off x="457200" y="1151335"/>
-            <a:ext cx="4040188" cy="479822"/>
+            <a:off x="457200" y="1535113"/>
+            <a:ext cx="4040188" cy="639762"/>
           </a:xfrm>
         </p:spPr>
         <p:txBody>
@@ -1980,45 +1788,45 @@
           <a:lstStyle>
             <a:lvl1pPr marL="0" indent="0">
               <a:buNone/>
+              <a:defRPr sz="2400" b="1"/>
+            </a:lvl1pPr>
+            <a:lvl2pPr marL="457200" indent="0">
+              <a:buNone/>
+              <a:defRPr sz="2000" b="1"/>
+            </a:lvl2pPr>
+            <a:lvl3pPr marL="914400" indent="0">
+              <a:buNone/>
               <a:defRPr sz="1800" b="1"/>
-            </a:lvl1pPr>
-            <a:lvl2pPr marL="342900" indent="0">
-              <a:buNone/>
-              <a:defRPr sz="1500" b="1"/>
-            </a:lvl2pPr>
-            <a:lvl3pPr marL="685800" indent="0">
-              <a:buNone/>
-              <a:defRPr sz="1350" b="1"/>
             </a:lvl3pPr>
-            <a:lvl4pPr marL="1028700" indent="0">
-              <a:buNone/>
-              <a:defRPr sz="1200" b="1"/>
+            <a:lvl4pPr marL="1371600" indent="0">
+              <a:buNone/>
+              <a:defRPr sz="1600" b="1"/>
             </a:lvl4pPr>
-            <a:lvl5pPr marL="1371600" indent="0">
-              <a:buNone/>
-              <a:defRPr sz="1200" b="1"/>
+            <a:lvl5pPr marL="1828800" indent="0">
+              <a:buNone/>
+              <a:defRPr sz="1600" b="1"/>
             </a:lvl5pPr>
-            <a:lvl6pPr marL="1714500" indent="0">
-              <a:buNone/>
-              <a:defRPr sz="1200" b="1"/>
+            <a:lvl6pPr marL="2286000" indent="0">
+              <a:buNone/>
+              <a:defRPr sz="1600" b="1"/>
             </a:lvl6pPr>
-            <a:lvl7pPr marL="2057400" indent="0">
-              <a:buNone/>
-              <a:defRPr sz="1200" b="1"/>
+            <a:lvl7pPr marL="2743200" indent="0">
+              <a:buNone/>
+              <a:defRPr sz="1600" b="1"/>
             </a:lvl7pPr>
-            <a:lvl8pPr marL="2400300" indent="0">
-              <a:buNone/>
-              <a:defRPr sz="1200" b="1"/>
+            <a:lvl8pPr marL="3200400" indent="0">
+              <a:buNone/>
+              <a:defRPr sz="1600" b="1"/>
             </a:lvl8pPr>
-            <a:lvl9pPr marL="2743200" indent="0">
-              <a:buNone/>
-              <a:defRPr sz="1200" b="1"/>
+            <a:lvl9pPr marL="3657600" indent="0">
+              <a:buNone/>
+              <a:defRPr sz="1600" b="1"/>
             </a:lvl9pPr>
           </a:lstStyle>
           <a:p>
             <a:pPr lvl="0"/>
             <a:r>
-              <a:rPr lang="en-US"/>
+              <a:rPr lang="en-US" smtClean="0"/>
               <a:t>Click to edit Master text styles</a:t>
             </a:r>
           </a:p>
@@ -2026,7 +1834,7 @@
       </p:sp>
       <p:sp>
         <p:nvSpPr>
-          <p:cNvPr id="10023" name="Content Placeholder 3"/>
+          <p:cNvPr id="10030" name="Content Placeholder 3"/>
           <p:cNvSpPr>
             <a:spLocks noGrp="1"/>
           </p:cNvSpPr>
@@ -2036,81 +1844,82 @@
         </p:nvSpPr>
         <p:spPr>
           <a:xfrm>
-            <a:off x="457200" y="1631156"/>
-            <a:ext cx="4040188" cy="2963466"/>
+            <a:off x="457200" y="2174875"/>
+            <a:ext cx="4040188" cy="3951288"/>
           </a:xfrm>
         </p:spPr>
         <p:txBody>
           <a:bodyPr/>
           <a:lstStyle>
             <a:lvl1pPr>
-              <a:defRPr sz="1800"/>
+              <a:defRPr sz="2400"/>
             </a:lvl1pPr>
             <a:lvl2pPr>
-              <a:defRPr sz="1500"/>
+              <a:defRPr sz="2000"/>
             </a:lvl2pPr>
             <a:lvl3pPr>
-              <a:defRPr sz="1350"/>
+              <a:defRPr sz="1800"/>
             </a:lvl3pPr>
             <a:lvl4pPr>
-              <a:defRPr sz="1200"/>
+              <a:defRPr sz="1600"/>
             </a:lvl4pPr>
             <a:lvl5pPr>
-              <a:defRPr sz="1200"/>
+              <a:defRPr sz="1600"/>
             </a:lvl5pPr>
             <a:lvl6pPr>
-              <a:defRPr sz="1200"/>
+              <a:defRPr sz="1600"/>
             </a:lvl6pPr>
             <a:lvl7pPr>
-              <a:defRPr sz="1200"/>
+              <a:defRPr sz="1600"/>
             </a:lvl7pPr>
             <a:lvl8pPr>
-              <a:defRPr sz="1200"/>
+              <a:defRPr sz="1600"/>
             </a:lvl8pPr>
             <a:lvl9pPr>
-              <a:defRPr sz="1200"/>
+              <a:defRPr sz="1600"/>
             </a:lvl9pPr>
           </a:lstStyle>
           <a:p>
             <a:pPr lvl="0"/>
             <a:r>
-              <a:rPr lang="en-US"/>
+              <a:rPr lang="en-US" smtClean="0"/>
               <a:t>Click to edit Master text styles</a:t>
             </a:r>
           </a:p>
           <a:p>
             <a:pPr lvl="1"/>
             <a:r>
-              <a:rPr lang="en-US"/>
+              <a:rPr lang="en-US" smtClean="0"/>
               <a:t>Second level</a:t>
             </a:r>
           </a:p>
           <a:p>
             <a:pPr lvl="2"/>
             <a:r>
-              <a:rPr lang="en-US"/>
+              <a:rPr lang="en-US" smtClean="0"/>
               <a:t>Third level</a:t>
             </a:r>
           </a:p>
           <a:p>
             <a:pPr lvl="3"/>
             <a:r>
-              <a:rPr lang="en-US"/>
+              <a:rPr lang="en-US" smtClean="0"/>
               <a:t>Fourth level</a:t>
             </a:r>
           </a:p>
           <a:p>
             <a:pPr lvl="4"/>
             <a:r>
-              <a:rPr lang="en-US"/>
+              <a:rPr lang="en-US" smtClean="0"/>
               <a:t>Fifth level</a:t>
             </a:r>
-          </a:p>
-        </p:txBody>
-      </p:sp>
-      <p:sp>
-        <p:nvSpPr>
-          <p:cNvPr id="10024" name="Text Placeholder 4"/>
+            <a:endParaRPr lang="en-US"/>
+          </a:p>
+        </p:txBody>
+      </p:sp>
+      <p:sp>
+        <p:nvSpPr>
+          <p:cNvPr id="10031" name="Text Placeholder 4"/>
           <p:cNvSpPr>
             <a:spLocks noGrp="1"/>
           </p:cNvSpPr>
@@ -2120,8 +1929,8 @@
         </p:nvSpPr>
         <p:spPr>
           <a:xfrm>
-            <a:off x="4645026" y="1151335"/>
-            <a:ext cx="4041775" cy="479822"/>
+            <a:off x="4645025" y="1535113"/>
+            <a:ext cx="4041775" cy="639762"/>
           </a:xfrm>
         </p:spPr>
         <p:txBody>
@@ -2129,45 +1938,45 @@
           <a:lstStyle>
             <a:lvl1pPr marL="0" indent="0">
               <a:buNone/>
+              <a:defRPr sz="2400" b="1"/>
+            </a:lvl1pPr>
+            <a:lvl2pPr marL="457200" indent="0">
+              <a:buNone/>
+              <a:defRPr sz="2000" b="1"/>
+            </a:lvl2pPr>
+            <a:lvl3pPr marL="914400" indent="0">
+              <a:buNone/>
               <a:defRPr sz="1800" b="1"/>
-            </a:lvl1pPr>
-            <a:lvl2pPr marL="342900" indent="0">
-              <a:buNone/>
-              <a:defRPr sz="1500" b="1"/>
-            </a:lvl2pPr>
-            <a:lvl3pPr marL="685800" indent="0">
-              <a:buNone/>
-              <a:defRPr sz="1350" b="1"/>
             </a:lvl3pPr>
-            <a:lvl4pPr marL="1028700" indent="0">
-              <a:buNone/>
-              <a:defRPr sz="1200" b="1"/>
+            <a:lvl4pPr marL="1371600" indent="0">
+              <a:buNone/>
+              <a:defRPr sz="1600" b="1"/>
             </a:lvl4pPr>
-            <a:lvl5pPr marL="1371600" indent="0">
-              <a:buNone/>
-              <a:defRPr sz="1200" b="1"/>
+            <a:lvl5pPr marL="1828800" indent="0">
+              <a:buNone/>
+              <a:defRPr sz="1600" b="1"/>
             </a:lvl5pPr>
-            <a:lvl6pPr marL="1714500" indent="0">
-              <a:buNone/>
-              <a:defRPr sz="1200" b="1"/>
+            <a:lvl6pPr marL="2286000" indent="0">
+              <a:buNone/>
+              <a:defRPr sz="1600" b="1"/>
             </a:lvl6pPr>
-            <a:lvl7pPr marL="2057400" indent="0">
-              <a:buNone/>
-              <a:defRPr sz="1200" b="1"/>
+            <a:lvl7pPr marL="2743200" indent="0">
+              <a:buNone/>
+              <a:defRPr sz="1600" b="1"/>
             </a:lvl7pPr>
-            <a:lvl8pPr marL="2400300" indent="0">
-              <a:buNone/>
-              <a:defRPr sz="1200" b="1"/>
+            <a:lvl8pPr marL="3200400" indent="0">
+              <a:buNone/>
+              <a:defRPr sz="1600" b="1"/>
             </a:lvl8pPr>
-            <a:lvl9pPr marL="2743200" indent="0">
-              <a:buNone/>
-              <a:defRPr sz="1200" b="1"/>
+            <a:lvl9pPr marL="3657600" indent="0">
+              <a:buNone/>
+              <a:defRPr sz="1600" b="1"/>
             </a:lvl9pPr>
           </a:lstStyle>
           <a:p>
             <a:pPr lvl="0"/>
             <a:r>
-              <a:rPr lang="en-US"/>
+              <a:rPr lang="en-US" smtClean="0"/>
               <a:t>Click to edit Master text styles</a:t>
             </a:r>
           </a:p>
@@ -2175,7 +1984,7 @@
       </p:sp>
       <p:sp>
         <p:nvSpPr>
-          <p:cNvPr id="10025" name="Content Placeholder 5"/>
+          <p:cNvPr id="10032" name="Content Placeholder 5"/>
           <p:cNvSpPr>
             <a:spLocks noGrp="1"/>
           </p:cNvSpPr>
@@ -2185,81 +1994,82 @@
         </p:nvSpPr>
         <p:spPr>
           <a:xfrm>
-            <a:off x="4645026" y="1631156"/>
-            <a:ext cx="4041775" cy="2963466"/>
+            <a:off x="4645025" y="2174875"/>
+            <a:ext cx="4041775" cy="3951288"/>
           </a:xfrm>
         </p:spPr>
         <p:txBody>
           <a:bodyPr/>
           <a:lstStyle>
             <a:lvl1pPr>
-              <a:defRPr sz="1800"/>
+              <a:defRPr sz="2400"/>
             </a:lvl1pPr>
             <a:lvl2pPr>
-              <a:defRPr sz="1500"/>
+              <a:defRPr sz="2000"/>
             </a:lvl2pPr>
             <a:lvl3pPr>
-              <a:defRPr sz="1350"/>
+              <a:defRPr sz="1800"/>
             </a:lvl3pPr>
             <a:lvl4pPr>
-              <a:defRPr sz="1200"/>
+              <a:defRPr sz="1600"/>
             </a:lvl4pPr>
             <a:lvl5pPr>
-              <a:defRPr sz="1200"/>
+              <a:defRPr sz="1600"/>
             </a:lvl5pPr>
             <a:lvl6pPr>
-              <a:defRPr sz="1200"/>
+              <a:defRPr sz="1600"/>
             </a:lvl6pPr>
             <a:lvl7pPr>
-              <a:defRPr sz="1200"/>
+              <a:defRPr sz="1600"/>
             </a:lvl7pPr>
             <a:lvl8pPr>
-              <a:defRPr sz="1200"/>
+              <a:defRPr sz="1600"/>
             </a:lvl8pPr>
             <a:lvl9pPr>
-              <a:defRPr sz="1200"/>
+              <a:defRPr sz="1600"/>
             </a:lvl9pPr>
           </a:lstStyle>
           <a:p>
             <a:pPr lvl="0"/>
             <a:r>
-              <a:rPr lang="en-US"/>
+              <a:rPr lang="en-US" smtClean="0"/>
               <a:t>Click to edit Master text styles</a:t>
             </a:r>
           </a:p>
           <a:p>
             <a:pPr lvl="1"/>
             <a:r>
-              <a:rPr lang="en-US"/>
+              <a:rPr lang="en-US" smtClean="0"/>
               <a:t>Second level</a:t>
             </a:r>
           </a:p>
           <a:p>
             <a:pPr lvl="2"/>
             <a:r>
-              <a:rPr lang="en-US"/>
+              <a:rPr lang="en-US" smtClean="0"/>
               <a:t>Third level</a:t>
             </a:r>
           </a:p>
           <a:p>
             <a:pPr lvl="3"/>
             <a:r>
-              <a:rPr lang="en-US"/>
+              <a:rPr lang="en-US" smtClean="0"/>
               <a:t>Fourth level</a:t>
             </a:r>
           </a:p>
           <a:p>
             <a:pPr lvl="4"/>
             <a:r>
-              <a:rPr lang="en-US"/>
+              <a:rPr lang="en-US" smtClean="0"/>
               <a:t>Fifth level</a:t>
             </a:r>
-          </a:p>
-        </p:txBody>
-      </p:sp>
-      <p:sp>
-        <p:nvSpPr>
-          <p:cNvPr id="10026" name="Date Placeholder 6"/>
+            <a:endParaRPr lang="en-US"/>
+          </a:p>
+        </p:txBody>
+      </p:sp>
+      <p:sp>
+        <p:nvSpPr>
+          <p:cNvPr id="10033" name="Date Placeholder 6"/>
           <p:cNvSpPr>
             <a:spLocks noGrp="1"/>
           </p:cNvSpPr>
@@ -2272,9 +2082,10 @@
           <a:bodyPr/>
           <a:lstStyle/>
           <a:p>
-            <a:fld id="{241EB5C9-1307-BA42-ABA2-0BC069CD8E7F}" type="datetimeFigureOut">
-              <a:rPr lang="en-US" smtClean="0"/>
-              <a:t>1/2/22</a:t>
+            <a:fld id="{1D8BD707-D9CF-40AE-B4C6-C98DA3205C09}" type="datetimeFigureOut">
+              <a:rPr lang="en-US" smtClean="0"/>
+              <a:pPr/>
+              <a:t>8/1/2011</a:t>
             </a:fld>
             <a:endParaRPr lang="en-US"/>
           </a:p>
@@ -2282,7 +2093,7 @@
       </p:sp>
       <p:sp>
         <p:nvSpPr>
-          <p:cNvPr id="10027" name="Footer Placeholder 7"/>
+          <p:cNvPr id="10034" name="Footer Placeholder 7"/>
           <p:cNvSpPr>
             <a:spLocks noGrp="1"/>
           </p:cNvSpPr>
@@ -2301,7 +2112,7 @@
       </p:sp>
       <p:sp>
         <p:nvSpPr>
-          <p:cNvPr id="10028" name="Slide Number Placeholder 8"/>
+          <p:cNvPr id="10035" name="Slide Number Placeholder 8"/>
           <p:cNvSpPr>
             <a:spLocks noGrp="1"/>
           </p:cNvSpPr>
@@ -2314,20 +2125,78 @@
           <a:bodyPr/>
           <a:lstStyle/>
           <a:p>
-            <a:fld id="{C5EF2332-01BF-834F-8236-50238282D533}" type="slidenum">
-              <a:rPr lang="en-US" smtClean="0"/>
+            <a:fld id="{B6F15528-21DE-4FAA-801E-634DDDAF4B2B}" type="slidenum">
+              <a:rPr lang="en-US" smtClean="0"/>
+              <a:pPr/>
               <a:t>‹#›</a:t>
             </a:fld>
             <a:endParaRPr lang="en-US"/>
           </a:p>
         </p:txBody>
       </p:sp>
+      <p:sp>
+        <p:nvSpPr>
+          <p:cNvPr name="AutoShape 10" id="10036"/>
+          <p:cNvSpPr/>
+          <p:nvPr>
+            <p:ph type="sldNum"/>
+          </p:nvPr>
+        </p:nvSpPr>
+        <p:spPr>
+          <a:xfrm>
+            <a:off x="304800" y="6794500"/>
+            <a:ext cx="1270000" cy="254000"/>
+          </a:xfrm>
+          <a:prstGeom prst="rect">
+            <a:avLst/>
+          </a:prstGeom>
+        </p:spPr>
+        <p:txBody>
+          <a:p>
+            <a:fld type="slidenum">
+              <a:rPr sz="900">
+                <a:solidFill>
+                  <a:srgbClr val="003CD3"/>
+                </a:solidFill>
+                <a:latin typeface="Frutiger for ZKB Light"/>
+              </a:rPr>
+              <a:t>&lt;#&gt;</a:t>
+            </a:fld>
+          </a:p>
+        </p:txBody>
+      </p:sp>
+      <p:sp>
+        <p:nvSpPr>
+          <p:cNvPr name="AutoShape 11" id="10037"/>
+          <p:cNvSpPr/>
+          <p:nvPr>
+            <p:ph type="ftr"/>
+          </p:nvPr>
+        </p:nvSpPr>
+        <p:spPr>
+          <a:xfrm>
+            <a:off x="1905000" y="6794500"/>
+            <a:ext cx="7620000" cy="254000"/>
+          </a:xfrm>
+          <a:prstGeom prst="rect">
+            <a:avLst/>
+          </a:prstGeom>
+        </p:spPr>
+        <p:txBody>
+          <a:p>
+            <a:r>
+              <a:rPr lang="en-US" sz="900">
+                <a:solidFill>
+                  <a:srgbClr val="808080"/>
+                </a:solidFill>
+                <a:latin typeface="Frutiger for ZKB Light"/>
+              </a:rPr>
+              <a:t/>
+            </a:r>
+          </a:p>
+        </p:txBody>
+      </p:sp>
     </p:spTree>
-    <p:extLst>
-      <p:ext uri="{BB962C8B-B14F-4D97-AF65-F5344CB8AC3E}">
-        <p14:creationId xmlns:p14="http://schemas.microsoft.com/office/powerpoint/2010/main" val="2535793967"/>
-      </p:ext>
-    </p:extLst>
   </p:cSld>
   <p:clrMapOvr>
     <a:masterClrMapping/>
@@ -2354,7 +2223,7 @@
       </p:grpSpPr>
       <p:sp>
         <p:nvSpPr>
-          <p:cNvPr id="10042" name="Title 1"/>
+          <p:cNvPr id="10057" name="Title 1"/>
           <p:cNvSpPr>
             <a:spLocks noGrp="1"/>
           </p:cNvSpPr>
@@ -2368,15 +2237,16 @@
           <a:lstStyle/>
           <a:p>
             <a:r>
-              <a:rPr lang="en-US"/>
+              <a:rPr lang="en-US" smtClean="0"/>
               <a:t>Click to edit Master title style</a:t>
             </a:r>
-          </a:p>
-        </p:txBody>
-      </p:sp>
-      <p:sp>
-        <p:nvSpPr>
-          <p:cNvPr id="10043" name="Date Placeholder 2"/>
+            <a:endParaRPr lang="en-US"/>
+          </a:p>
+        </p:txBody>
+      </p:sp>
+      <p:sp>
+        <p:nvSpPr>
+          <p:cNvPr id="10058" name="Date Placeholder 2"/>
           <p:cNvSpPr>
             <a:spLocks noGrp="1"/>
           </p:cNvSpPr>
@@ -2389,9 +2259,10 @@
           <a:bodyPr/>
           <a:lstStyle/>
           <a:p>
-            <a:fld id="{241EB5C9-1307-BA42-ABA2-0BC069CD8E7F}" type="datetimeFigureOut">
-              <a:rPr lang="en-US" smtClean="0"/>
-              <a:t>1/2/22</a:t>
+            <a:fld id="{1D8BD707-D9CF-40AE-B4C6-C98DA3205C09}" type="datetimeFigureOut">
+              <a:rPr lang="en-US" smtClean="0"/>
+              <a:pPr/>
+              <a:t>8/1/2011</a:t>
             </a:fld>
             <a:endParaRPr lang="en-US"/>
           </a:p>
@@ -2399,7 +2270,7 @@
       </p:sp>
       <p:sp>
         <p:nvSpPr>
-          <p:cNvPr id="10044" name="Footer Placeholder 3"/>
+          <p:cNvPr id="10059" name="Footer Placeholder 3"/>
           <p:cNvSpPr>
             <a:spLocks noGrp="1"/>
           </p:cNvSpPr>
@@ -2418,7 +2289,7 @@
       </p:sp>
       <p:sp>
         <p:nvSpPr>
-          <p:cNvPr id="10045" name="Slide Number Placeholder 4"/>
+          <p:cNvPr id="10060" name="Slide Number Placeholder 4"/>
           <p:cNvSpPr>
             <a:spLocks noGrp="1"/>
           </p:cNvSpPr>
@@ -2431,20 +2302,78 @@
           <a:bodyPr/>
           <a:lstStyle/>
           <a:p>
-            <a:fld id="{C5EF2332-01BF-834F-8236-50238282D533}" type="slidenum">
-              <a:rPr lang="en-US" smtClean="0"/>
+            <a:fld id="{B6F15528-21DE-4FAA-801E-634DDDAF4B2B}" type="slidenum">
+              <a:rPr lang="en-US" smtClean="0"/>
+              <a:pPr/>
               <a:t>‹#›</a:t>
             </a:fld>
             <a:endParaRPr lang="en-US"/>
           </a:p>
         </p:txBody>
       </p:sp>
+      <p:sp>
+        <p:nvSpPr>
+          <p:cNvPr name="AutoShape 6" id="10061"/>
+          <p:cNvSpPr/>
+          <p:nvPr>
+            <p:ph type="sldNum"/>
+          </p:nvPr>
+        </p:nvSpPr>
+        <p:spPr>
+          <a:xfrm>
+            <a:off x="304800" y="6794500"/>
+            <a:ext cx="1270000" cy="254000"/>
+          </a:xfrm>
+          <a:prstGeom prst="rect">
+            <a:avLst/>
+          </a:prstGeom>
+        </p:spPr>
+        <p:txBody>
+          <a:p>
+            <a:fld type="slidenum">
+              <a:rPr sz="900">
+                <a:solidFill>
+                  <a:srgbClr val="003CD3"/>
+                </a:solidFill>
+                <a:latin typeface="Frutiger for ZKB Light"/>
+              </a:rPr>
+              <a:t>&lt;#&gt;</a:t>
+            </a:fld>
+          </a:p>
+        </p:txBody>
+      </p:sp>
+      <p:sp>
+        <p:nvSpPr>
+          <p:cNvPr name="AutoShape 7" id="10062"/>
+          <p:cNvSpPr/>
+          <p:nvPr>
+            <p:ph type="ftr"/>
+          </p:nvPr>
+        </p:nvSpPr>
+        <p:spPr>
+          <a:xfrm>
+            <a:off x="1905000" y="6794500"/>
+            <a:ext cx="7620000" cy="254000"/>
+          </a:xfrm>
+          <a:prstGeom prst="rect">
+            <a:avLst/>
+          </a:prstGeom>
+        </p:spPr>
+        <p:txBody>
+          <a:p>
+            <a:r>
+              <a:rPr lang="en-US" sz="900">
+                <a:solidFill>
+                  <a:srgbClr val="808080"/>
+                </a:solidFill>
+                <a:latin typeface="Frutiger for ZKB Light"/>
+              </a:rPr>
+              <a:t/>
+            </a:r>
+          </a:p>
+        </p:txBody>
+      </p:sp>
     </p:spTree>
-    <p:extLst>
-      <p:ext uri="{BB962C8B-B14F-4D97-AF65-F5344CB8AC3E}">
-        <p14:creationId xmlns:p14="http://schemas.microsoft.com/office/powerpoint/2010/main" val="3472721253"/>
-      </p:ext>
-    </p:extLst>
   </p:cSld>
   <p:clrMapOvr>
     <a:masterClrMapping/>
@@ -2471,7 +2400,7 @@
       </p:grpSpPr>
       <p:sp>
         <p:nvSpPr>
-          <p:cNvPr id="10029" name="Date Placeholder 1"/>
+          <p:cNvPr id="10038" name="Date Placeholder 1"/>
           <p:cNvSpPr>
             <a:spLocks noGrp="1"/>
           </p:cNvSpPr>
@@ -2484,9 +2413,10 @@
           <a:bodyPr/>
           <a:lstStyle/>
           <a:p>
-            <a:fld id="{241EB5C9-1307-BA42-ABA2-0BC069CD8E7F}" type="datetimeFigureOut">
-              <a:rPr lang="en-US" smtClean="0"/>
-              <a:t>1/2/22</a:t>
+            <a:fld id="{1D8BD707-D9CF-40AE-B4C6-C98DA3205C09}" type="datetimeFigureOut">
+              <a:rPr lang="en-US" smtClean="0"/>
+              <a:pPr/>
+              <a:t>8/1/2011</a:t>
             </a:fld>
             <a:endParaRPr lang="en-US"/>
           </a:p>
@@ -2494,7 +2424,7 @@
       </p:sp>
       <p:sp>
         <p:nvSpPr>
-          <p:cNvPr id="10030" name="Footer Placeholder 2"/>
+          <p:cNvPr id="10039" name="Footer Placeholder 2"/>
           <p:cNvSpPr>
             <a:spLocks noGrp="1"/>
           </p:cNvSpPr>
@@ -2513,7 +2443,7 @@
       </p:sp>
       <p:sp>
         <p:nvSpPr>
-          <p:cNvPr id="10031" name="Slide Number Placeholder 3"/>
+          <p:cNvPr id="10040" name="Slide Number Placeholder 3"/>
           <p:cNvSpPr>
             <a:spLocks noGrp="1"/>
           </p:cNvSpPr>
@@ -2526,20 +2456,78 @@
           <a:bodyPr/>
           <a:lstStyle/>
           <a:p>
-            <a:fld id="{C5EF2332-01BF-834F-8236-50238282D533}" type="slidenum">
-              <a:rPr lang="en-US" smtClean="0"/>
+            <a:fld id="{B6F15528-21DE-4FAA-801E-634DDDAF4B2B}" type="slidenum">
+              <a:rPr lang="en-US" smtClean="0"/>
+              <a:pPr/>
               <a:t>‹#›</a:t>
             </a:fld>
             <a:endParaRPr lang="en-US"/>
           </a:p>
         </p:txBody>
       </p:sp>
+      <p:sp>
+        <p:nvSpPr>
+          <p:cNvPr name="AutoShape 5" id="10041"/>
+          <p:cNvSpPr/>
+          <p:nvPr>
+            <p:ph type="sldNum"/>
+          </p:nvPr>
+        </p:nvSpPr>
+        <p:spPr>
+          <a:xfrm>
+            <a:off x="304800" y="6794500"/>
+            <a:ext cx="1270000" cy="254000"/>
+          </a:xfrm>
+          <a:prstGeom prst="rect">
+            <a:avLst/>
+          </a:prstGeom>
+        </p:spPr>
+        <p:txBody>
+          <a:p>
+            <a:fld type="slidenum">
+              <a:rPr sz="900">
+                <a:solidFill>
+                  <a:srgbClr val="003CD3"/>
+                </a:solidFill>
+                <a:latin typeface="Frutiger for ZKB Light"/>
+              </a:rPr>
+              <a:t>&lt;#&gt;</a:t>
+            </a:fld>
+          </a:p>
+        </p:txBody>
+      </p:sp>
+      <p:sp>
+        <p:nvSpPr>
+          <p:cNvPr name="AutoShape 6" id="10042"/>
+          <p:cNvSpPr/>
+          <p:nvPr>
+            <p:ph type="ftr"/>
+          </p:nvPr>
+        </p:nvSpPr>
+        <p:spPr>
+          <a:xfrm>
+            <a:off x="1905000" y="6794500"/>
+            <a:ext cx="7620000" cy="254000"/>
+          </a:xfrm>
+          <a:prstGeom prst="rect">
+            <a:avLst/>
+          </a:prstGeom>
+        </p:spPr>
+        <p:txBody>
+          <a:p>
+            <a:r>
+              <a:rPr lang="en-US" sz="900">
+                <a:solidFill>
+                  <a:srgbClr val="808080"/>
+                </a:solidFill>
+                <a:latin typeface="Frutiger for ZKB Light"/>
+              </a:rPr>
+              <a:t/>
+            </a:r>
+          </a:p>
+        </p:txBody>
+      </p:sp>
     </p:spTree>
-    <p:extLst>
-      <p:ext uri="{BB962C8B-B14F-4D97-AF65-F5344CB8AC3E}">
-        <p14:creationId xmlns:p14="http://schemas.microsoft.com/office/powerpoint/2010/main" val="2130901097"/>
-      </p:ext>
-    </p:extLst>
   </p:cSld>
   <p:clrMapOvr>
     <a:masterClrMapping/>
@@ -2566,7 +2554,7 @@
       </p:grpSpPr>
       <p:sp>
         <p:nvSpPr>
-          <p:cNvPr id="10057" name="Title 1"/>
+          <p:cNvPr id="10078" name="Title 1"/>
           <p:cNvSpPr>
             <a:spLocks noGrp="1"/>
           </p:cNvSpPr>
@@ -2576,28 +2564,29 @@
         </p:nvSpPr>
         <p:spPr>
           <a:xfrm>
-            <a:off x="457201" y="204787"/>
-            <a:ext cx="3008313" cy="871538"/>
+            <a:off x="457200" y="273050"/>
+            <a:ext cx="3008313" cy="1162050"/>
           </a:xfrm>
         </p:spPr>
         <p:txBody>
           <a:bodyPr anchor="b"/>
           <a:lstStyle>
             <a:lvl1pPr algn="l">
-              <a:defRPr sz="1500" b="1"/>
+              <a:defRPr sz="2000" b="1"/>
             </a:lvl1pPr>
           </a:lstStyle>
           <a:p>
             <a:r>
-              <a:rPr lang="en-US"/>
+              <a:rPr lang="en-US" smtClean="0"/>
               <a:t>Click to edit Master title style</a:t>
             </a:r>
-          </a:p>
-        </p:txBody>
-      </p:sp>
-      <p:sp>
-        <p:nvSpPr>
-          <p:cNvPr id="10058" name="Content Placeholder 2"/>
+            <a:endParaRPr lang="en-US"/>
+          </a:p>
+        </p:txBody>
+      </p:sp>
+      <p:sp>
+        <p:nvSpPr>
+          <p:cNvPr id="10079" name="Content Placeholder 2"/>
           <p:cNvSpPr>
             <a:spLocks noGrp="1"/>
           </p:cNvSpPr>
@@ -2607,81 +2596,82 @@
         </p:nvSpPr>
         <p:spPr>
           <a:xfrm>
-            <a:off x="3575050" y="204788"/>
-            <a:ext cx="5111750" cy="4389835"/>
+            <a:off x="3575050" y="273050"/>
+            <a:ext cx="5111750" cy="5853113"/>
           </a:xfrm>
         </p:spPr>
         <p:txBody>
           <a:bodyPr/>
           <a:lstStyle>
             <a:lvl1pPr>
-              <a:defRPr sz="2400"/>
+              <a:defRPr sz="3200"/>
             </a:lvl1pPr>
             <a:lvl2pPr>
-              <a:defRPr sz="2100"/>
+              <a:defRPr sz="2800"/>
             </a:lvl2pPr>
             <a:lvl3pPr>
-              <a:defRPr sz="1800"/>
+              <a:defRPr sz="2400"/>
             </a:lvl3pPr>
             <a:lvl4pPr>
-              <a:defRPr sz="1500"/>
+              <a:defRPr sz="2000"/>
             </a:lvl4pPr>
             <a:lvl5pPr>
-              <a:defRPr sz="1500"/>
+              <a:defRPr sz="2000"/>
             </a:lvl5pPr>
             <a:lvl6pPr>
-              <a:defRPr sz="1500"/>
+              <a:defRPr sz="2000"/>
             </a:lvl6pPr>
             <a:lvl7pPr>
-              <a:defRPr sz="1500"/>
+              <a:defRPr sz="2000"/>
             </a:lvl7pPr>
             <a:lvl8pPr>
-              <a:defRPr sz="1500"/>
+              <a:defRPr sz="2000"/>
             </a:lvl8pPr>
             <a:lvl9pPr>
-              <a:defRPr sz="1500"/>
+              <a:defRPr sz="2000"/>
             </a:lvl9pPr>
           </a:lstStyle>
           <a:p>
             <a:pPr lvl="0"/>
             <a:r>
-              <a:rPr lang="en-US"/>
+              <a:rPr lang="en-US" smtClean="0"/>
               <a:t>Click to edit Master text styles</a:t>
             </a:r>
           </a:p>
           <a:p>
             <a:pPr lvl="1"/>
             <a:r>
-              <a:rPr lang="en-US"/>
+              <a:rPr lang="en-US" smtClean="0"/>
               <a:t>Second level</a:t>
             </a:r>
           </a:p>
           <a:p>
             <a:pPr lvl="2"/>
             <a:r>
-              <a:rPr lang="en-US"/>
+              <a:rPr lang="en-US" smtClean="0"/>
               <a:t>Third level</a:t>
             </a:r>
           </a:p>
           <a:p>
             <a:pPr lvl="3"/>
             <a:r>
-              <a:rPr lang="en-US"/>
+              <a:rPr lang="en-US" smtClean="0"/>
               <a:t>Fourth level</a:t>
             </a:r>
           </a:p>
           <a:p>
             <a:pPr lvl="4"/>
             <a:r>
-              <a:rPr lang="en-US"/>
+              <a:rPr lang="en-US" smtClean="0"/>
               <a:t>Fifth level</a:t>
             </a:r>
-          </a:p>
-        </p:txBody>
-      </p:sp>
-      <p:sp>
-        <p:nvSpPr>
-          <p:cNvPr id="10059" name="Text Placeholder 3"/>
+            <a:endParaRPr lang="en-US"/>
+          </a:p>
+        </p:txBody>
+      </p:sp>
+      <p:sp>
+        <p:nvSpPr>
+          <p:cNvPr id="10080" name="Text Placeholder 3"/>
           <p:cNvSpPr>
             <a:spLocks noGrp="1"/>
           </p:cNvSpPr>
@@ -2691,8 +2681,8 @@
         </p:nvSpPr>
         <p:spPr>
           <a:xfrm>
-            <a:off x="457201" y="1076326"/>
-            <a:ext cx="3008313" cy="3518297"/>
+            <a:off x="457200" y="1435100"/>
+            <a:ext cx="3008313" cy="4691063"/>
           </a:xfrm>
         </p:spPr>
         <p:txBody>
@@ -2700,45 +2690,45 @@
           <a:lstStyle>
             <a:lvl1pPr marL="0" indent="0">
               <a:buNone/>
-              <a:defRPr sz="1050"/>
+              <a:defRPr sz="1400"/>
             </a:lvl1pPr>
-            <a:lvl2pPr marL="342900" indent="0">
+            <a:lvl2pPr marL="457200" indent="0">
+              <a:buNone/>
+              <a:defRPr sz="1200"/>
+            </a:lvl2pPr>
+            <a:lvl3pPr marL="914400" indent="0">
+              <a:buNone/>
+              <a:defRPr sz="1000"/>
+            </a:lvl3pPr>
+            <a:lvl4pPr marL="1371600" indent="0">
               <a:buNone/>
               <a:defRPr sz="900"/>
-            </a:lvl2pPr>
-            <a:lvl3pPr marL="685800" indent="0">
-              <a:buNone/>
-              <a:defRPr sz="750"/>
-            </a:lvl3pPr>
-            <a:lvl4pPr marL="1028700" indent="0">
-              <a:buNone/>
-              <a:defRPr sz="675"/>
             </a:lvl4pPr>
-            <a:lvl5pPr marL="1371600" indent="0">
-              <a:buNone/>
-              <a:defRPr sz="675"/>
+            <a:lvl5pPr marL="1828800" indent="0">
+              <a:buNone/>
+              <a:defRPr sz="900"/>
             </a:lvl5pPr>
-            <a:lvl6pPr marL="1714500" indent="0">
-              <a:buNone/>
-              <a:defRPr sz="675"/>
+            <a:lvl6pPr marL="2286000" indent="0">
+              <a:buNone/>
+              <a:defRPr sz="900"/>
             </a:lvl6pPr>
-            <a:lvl7pPr marL="2057400" indent="0">
-              <a:buNone/>
-              <a:defRPr sz="675"/>
+            <a:lvl7pPr marL="2743200" indent="0">
+              <a:buNone/>
+              <a:defRPr sz="900"/>
             </a:lvl7pPr>
-            <a:lvl8pPr marL="2400300" indent="0">
-              <a:buNone/>
-              <a:defRPr sz="675"/>
+            <a:lvl8pPr marL="3200400" indent="0">
+              <a:buNone/>
+              <a:defRPr sz="900"/>
             </a:lvl8pPr>
-            <a:lvl9pPr marL="2743200" indent="0">
-              <a:buNone/>
-              <a:defRPr sz="675"/>
+            <a:lvl9pPr marL="3657600" indent="0">
+              <a:buNone/>
+              <a:defRPr sz="900"/>
             </a:lvl9pPr>
           </a:lstStyle>
           <a:p>
             <a:pPr lvl="0"/>
             <a:r>
-              <a:rPr lang="en-US"/>
+              <a:rPr lang="en-US" smtClean="0"/>
               <a:t>Click to edit Master text styles</a:t>
             </a:r>
           </a:p>
@@ -2746,7 +2736,7 @@
       </p:sp>
       <p:sp>
         <p:nvSpPr>
-          <p:cNvPr id="10060" name="Date Placeholder 4"/>
+          <p:cNvPr id="10081" name="Date Placeholder 4"/>
           <p:cNvSpPr>
             <a:spLocks noGrp="1"/>
           </p:cNvSpPr>
@@ -2759,9 +2749,10 @@
           <a:bodyPr/>
           <a:lstStyle/>
           <a:p>
-            <a:fld id="{241EB5C9-1307-BA42-ABA2-0BC069CD8E7F}" type="datetimeFigureOut">
-              <a:rPr lang="en-US" smtClean="0"/>
-              <a:t>1/2/22</a:t>
+            <a:fld id="{1D8BD707-D9CF-40AE-B4C6-C98DA3205C09}" type="datetimeFigureOut">
+              <a:rPr lang="en-US" smtClean="0"/>
+              <a:pPr/>
+              <a:t>8/1/2011</a:t>
             </a:fld>
             <a:endParaRPr lang="en-US"/>
           </a:p>
@@ -2769,7 +2760,7 @@
       </p:sp>
       <p:sp>
         <p:nvSpPr>
-          <p:cNvPr id="10061" name="Footer Placeholder 5"/>
+          <p:cNvPr id="10082" name="Footer Placeholder 5"/>
           <p:cNvSpPr>
             <a:spLocks noGrp="1"/>
           </p:cNvSpPr>
@@ -2788,7 +2779,7 @@
       </p:sp>
       <p:sp>
         <p:nvSpPr>
-          <p:cNvPr id="10062" name="Slide Number Placeholder 6"/>
+          <p:cNvPr id="10083" name="Slide Number Placeholder 6"/>
           <p:cNvSpPr>
             <a:spLocks noGrp="1"/>
           </p:cNvSpPr>
@@ -2801,20 +2792,78 @@
           <a:bodyPr/>
           <a:lstStyle/>
           <a:p>
-            <a:fld id="{C5EF2332-01BF-834F-8236-50238282D533}" type="slidenum">
-              <a:rPr lang="en-US" smtClean="0"/>
+            <a:fld id="{B6F15528-21DE-4FAA-801E-634DDDAF4B2B}" type="slidenum">
+              <a:rPr lang="en-US" smtClean="0"/>
+              <a:pPr/>
               <a:t>‹#›</a:t>
             </a:fld>
             <a:endParaRPr lang="en-US"/>
           </a:p>
         </p:txBody>
       </p:sp>
+      <p:sp>
+        <p:nvSpPr>
+          <p:cNvPr name="AutoShape 8" id="10084"/>
+          <p:cNvSpPr/>
+          <p:nvPr>
+            <p:ph type="sldNum"/>
+          </p:nvPr>
+        </p:nvSpPr>
+        <p:spPr>
+          <a:xfrm>
+            <a:off x="304800" y="6794500"/>
+            <a:ext cx="1270000" cy="254000"/>
+          </a:xfrm>
+          <a:prstGeom prst="rect">
+            <a:avLst/>
+          </a:prstGeom>
+        </p:spPr>
+        <p:txBody>
+          <a:p>
+            <a:fld type="slidenum">
+              <a:rPr sz="900">
+                <a:solidFill>
+                  <a:srgbClr val="003CD3"/>
+                </a:solidFill>
+                <a:latin typeface="Frutiger for ZKB Light"/>
+              </a:rPr>
+              <a:t>&lt;#&gt;</a:t>
+            </a:fld>
+          </a:p>
+        </p:txBody>
+      </p:sp>
+      <p:sp>
+        <p:nvSpPr>
+          <p:cNvPr name="AutoShape 9" id="10085"/>
+          <p:cNvSpPr/>
+          <p:nvPr>
+            <p:ph type="ftr"/>
+          </p:nvPr>
+        </p:nvSpPr>
+        <p:spPr>
+          <a:xfrm>
+            <a:off x="1905000" y="6794500"/>
+            <a:ext cx="7620000" cy="254000"/>
+          </a:xfrm>
+          <a:prstGeom prst="rect">
+            <a:avLst/>
+          </a:prstGeom>
+        </p:spPr>
+        <p:txBody>
+          <a:p>
+            <a:r>
+              <a:rPr lang="en-US" sz="900">
+                <a:solidFill>
+                  <a:srgbClr val="808080"/>
+                </a:solidFill>
+                <a:latin typeface="Frutiger for ZKB Light"/>
+              </a:rPr>
+              <a:t/>
+            </a:r>
+          </a:p>
+        </p:txBody>
+      </p:sp>
     </p:spTree>
-    <p:extLst>
-      <p:ext uri="{BB962C8B-B14F-4D97-AF65-F5344CB8AC3E}">
-        <p14:creationId xmlns:p14="http://schemas.microsoft.com/office/powerpoint/2010/main" val="3540895647"/>
-      </p:ext>
-    </p:extLst>
   </p:cSld>
   <p:clrMapOvr>
     <a:masterClrMapping/>
@@ -2841,7 +2890,7 @@
       </p:grpSpPr>
       <p:sp>
         <p:nvSpPr>
-          <p:cNvPr id="10010" name="Title 1"/>
+          <p:cNvPr id="10013" name="Title 1"/>
           <p:cNvSpPr>
             <a:spLocks noGrp="1"/>
           </p:cNvSpPr>
@@ -2851,28 +2900,29 @@
         </p:nvSpPr>
         <p:spPr>
           <a:xfrm>
-            <a:off x="1792288" y="3600450"/>
-            <a:ext cx="5486400" cy="425054"/>
+            <a:off x="1792288" y="4800600"/>
+            <a:ext cx="5486400" cy="566738"/>
           </a:xfrm>
         </p:spPr>
         <p:txBody>
           <a:bodyPr anchor="b"/>
           <a:lstStyle>
             <a:lvl1pPr algn="l">
-              <a:defRPr sz="1500" b="1"/>
+              <a:defRPr sz="2000" b="1"/>
             </a:lvl1pPr>
           </a:lstStyle>
           <a:p>
             <a:r>
-              <a:rPr lang="en-US"/>
+              <a:rPr lang="en-US" smtClean="0"/>
               <a:t>Click to edit Master title style</a:t>
             </a:r>
-          </a:p>
-        </p:txBody>
-      </p:sp>
-      <p:sp>
-        <p:nvSpPr>
-          <p:cNvPr id="10011" name="Picture Placeholder 2"/>
+            <a:endParaRPr lang="en-US"/>
+          </a:p>
+        </p:txBody>
+      </p:sp>
+      <p:sp>
+        <p:nvSpPr>
+          <p:cNvPr id="10014" name="Picture Placeholder 2"/>
           <p:cNvSpPr>
             <a:spLocks noGrp="1"/>
           </p:cNvSpPr>
@@ -2882,8 +2932,8 @@
         </p:nvSpPr>
         <p:spPr>
           <a:xfrm>
-            <a:off x="1792288" y="459581"/>
-            <a:ext cx="5486400" cy="3086100"/>
+            <a:off x="1792288" y="612775"/>
+            <a:ext cx="5486400" cy="4114800"/>
           </a:xfrm>
         </p:spPr>
         <p:txBody>
@@ -2891,39 +2941,39 @@
           <a:lstStyle>
             <a:lvl1pPr marL="0" indent="0">
               <a:buNone/>
+              <a:defRPr sz="3200"/>
+            </a:lvl1pPr>
+            <a:lvl2pPr marL="457200" indent="0">
+              <a:buNone/>
+              <a:defRPr sz="2800"/>
+            </a:lvl2pPr>
+            <a:lvl3pPr marL="914400" indent="0">
+              <a:buNone/>
               <a:defRPr sz="2400"/>
-            </a:lvl1pPr>
-            <a:lvl2pPr marL="342900" indent="0">
-              <a:buNone/>
-              <a:defRPr sz="2100"/>
-            </a:lvl2pPr>
-            <a:lvl3pPr marL="685800" indent="0">
-              <a:buNone/>
-              <a:defRPr sz="1800"/>
             </a:lvl3pPr>
-            <a:lvl4pPr marL="1028700" indent="0">
-              <a:buNone/>
-              <a:defRPr sz="1500"/>
+            <a:lvl4pPr marL="1371600" indent="0">
+              <a:buNone/>
+              <a:defRPr sz="2000"/>
             </a:lvl4pPr>
-            <a:lvl5pPr marL="1371600" indent="0">
-              <a:buNone/>
-              <a:defRPr sz="1500"/>
+            <a:lvl5pPr marL="1828800" indent="0">
+              <a:buNone/>
+              <a:defRPr sz="2000"/>
             </a:lvl5pPr>
-            <a:lvl6pPr marL="1714500" indent="0">
-              <a:buNone/>
-              <a:defRPr sz="1500"/>
+            <a:lvl6pPr marL="2286000" indent="0">
+              <a:buNone/>
+              <a:defRPr sz="2000"/>
             </a:lvl6pPr>
-            <a:lvl7pPr marL="2057400" indent="0">
-              <a:buNone/>
-              <a:defRPr sz="1500"/>
+            <a:lvl7pPr marL="2743200" indent="0">
+              <a:buNone/>
+              <a:defRPr sz="2000"/>
             </a:lvl7pPr>
-            <a:lvl8pPr marL="2400300" indent="0">
-              <a:buNone/>
-              <a:defRPr sz="1500"/>
+            <a:lvl8pPr marL="3200400" indent="0">
+              <a:buNone/>
+              <a:defRPr sz="2000"/>
             </a:lvl8pPr>
-            <a:lvl9pPr marL="2743200" indent="0">
-              <a:buNone/>
-              <a:defRPr sz="1500"/>
+            <a:lvl9pPr marL="3657600" indent="0">
+              <a:buNone/>
+              <a:defRPr sz="2000"/>
             </a:lvl9pPr>
           </a:lstStyle>
           <a:p>
@@ -2933,7 +2983,7 @@
       </p:sp>
       <p:sp>
         <p:nvSpPr>
-          <p:cNvPr id="10012" name="Text Placeholder 3"/>
+          <p:cNvPr id="10015" name="Text Placeholder 3"/>
           <p:cNvSpPr>
             <a:spLocks noGrp="1"/>
           </p:cNvSpPr>
@@ -2943,8 +2993,8 @@
         </p:nvSpPr>
         <p:spPr>
           <a:xfrm>
-            <a:off x="1792288" y="4025503"/>
-            <a:ext cx="5486400" cy="603647"/>
+            <a:off x="1792288" y="5367338"/>
+            <a:ext cx="5486400" cy="804862"/>
           </a:xfrm>
         </p:spPr>
         <p:txBody>
@@ -2952,45 +3002,45 @@
           <a:lstStyle>
             <a:lvl1pPr marL="0" indent="0">
               <a:buNone/>
-              <a:defRPr sz="1050"/>
+              <a:defRPr sz="1400"/>
             </a:lvl1pPr>
-            <a:lvl2pPr marL="342900" indent="0">
+            <a:lvl2pPr marL="457200" indent="0">
+              <a:buNone/>
+              <a:defRPr sz="1200"/>
+            </a:lvl2pPr>
+            <a:lvl3pPr marL="914400" indent="0">
+              <a:buNone/>
+              <a:defRPr sz="1000"/>
+            </a:lvl3pPr>
+            <a:lvl4pPr marL="1371600" indent="0">
               <a:buNone/>
               <a:defRPr sz="900"/>
-            </a:lvl2pPr>
-            <a:lvl3pPr marL="685800" indent="0">
-              <a:buNone/>
-              <a:defRPr sz="750"/>
-            </a:lvl3pPr>
-            <a:lvl4pPr marL="1028700" indent="0">
-              <a:buNone/>
-              <a:defRPr sz="675"/>
             </a:lvl4pPr>
-            <a:lvl5pPr marL="1371600" indent="0">
-              <a:buNone/>
-              <a:defRPr sz="675"/>
+            <a:lvl5pPr marL="1828800" indent="0">
+              <a:buNone/>
+              <a:defRPr sz="900"/>
             </a:lvl5pPr>
-            <a:lvl6pPr marL="1714500" indent="0">
-              <a:buNone/>
-              <a:defRPr sz="675"/>
+            <a:lvl6pPr marL="2286000" indent="0">
+              <a:buNone/>
+              <a:defRPr sz="900"/>
             </a:lvl6pPr>
-            <a:lvl7pPr marL="2057400" indent="0">
-              <a:buNone/>
-              <a:defRPr sz="675"/>
+            <a:lvl7pPr marL="2743200" indent="0">
+              <a:buNone/>
+              <a:defRPr sz="900"/>
             </a:lvl7pPr>
-            <a:lvl8pPr marL="2400300" indent="0">
-              <a:buNone/>
-              <a:defRPr sz="675"/>
+            <a:lvl8pPr marL="3200400" indent="0">
+              <a:buNone/>
+              <a:defRPr sz="900"/>
             </a:lvl8pPr>
-            <a:lvl9pPr marL="2743200" indent="0">
-              <a:buNone/>
-              <a:defRPr sz="675"/>
+            <a:lvl9pPr marL="3657600" indent="0">
+              <a:buNone/>
+              <a:defRPr sz="900"/>
             </a:lvl9pPr>
           </a:lstStyle>
           <a:p>
             <a:pPr lvl="0"/>
             <a:r>
-              <a:rPr lang="en-US"/>
+              <a:rPr lang="en-US" smtClean="0"/>
               <a:t>Click to edit Master text styles</a:t>
             </a:r>
           </a:p>
@@ -2998,7 +3048,7 @@
       </p:sp>
       <p:sp>
         <p:nvSpPr>
-          <p:cNvPr id="10013" name="Date Placeholder 4"/>
+          <p:cNvPr id="10016" name="Date Placeholder 4"/>
           <p:cNvSpPr>
             <a:spLocks noGrp="1"/>
           </p:cNvSpPr>
@@ -3011,9 +3061,10 @@
           <a:bodyPr/>
           <a:lstStyle/>
           <a:p>
-            <a:fld id="{241EB5C9-1307-BA42-ABA2-0BC069CD8E7F}" type="datetimeFigureOut">
-              <a:rPr lang="en-US" smtClean="0"/>
-              <a:t>1/2/22</a:t>
+            <a:fld id="{1D8BD707-D9CF-40AE-B4C6-C98DA3205C09}" type="datetimeFigureOut">
+              <a:rPr lang="en-US" smtClean="0"/>
+              <a:pPr/>
+              <a:t>8/1/2011</a:t>
             </a:fld>
             <a:endParaRPr lang="en-US"/>
           </a:p>
@@ -3021,7 +3072,7 @@
       </p:sp>
       <p:sp>
         <p:nvSpPr>
-          <p:cNvPr id="10014" name="Footer Placeholder 5"/>
+          <p:cNvPr id="10017" name="Footer Placeholder 5"/>
           <p:cNvSpPr>
             <a:spLocks noGrp="1"/>
           </p:cNvSpPr>
@@ -3040,7 +3091,7 @@
       </p:sp>
       <p:sp>
         <p:nvSpPr>
-          <p:cNvPr id="10015" name="Slide Number Placeholder 6"/>
+          <p:cNvPr id="10018" name="Slide Number Placeholder 6"/>
           <p:cNvSpPr>
             <a:spLocks noGrp="1"/>
           </p:cNvSpPr>
@@ -3053,20 +3104,78 @@
           <a:bodyPr/>
           <a:lstStyle/>
           <a:p>
-            <a:fld id="{C5EF2332-01BF-834F-8236-50238282D533}" type="slidenum">
-              <a:rPr lang="en-US" smtClean="0"/>
+            <a:fld id="{B6F15528-21DE-4FAA-801E-634DDDAF4B2B}" type="slidenum">
+              <a:rPr lang="en-US" smtClean="0"/>
+              <a:pPr/>
               <a:t>‹#›</a:t>
             </a:fld>
             <a:endParaRPr lang="en-US"/>
           </a:p>
         </p:txBody>
       </p:sp>
+      <p:sp>
+        <p:nvSpPr>
+          <p:cNvPr name="AutoShape 8" id="10019"/>
+          <p:cNvSpPr/>
+          <p:nvPr>
+            <p:ph type="sldNum"/>
+          </p:nvPr>
+        </p:nvSpPr>
+        <p:spPr>
+          <a:xfrm>
+            <a:off x="304800" y="6794500"/>
+            <a:ext cx="1270000" cy="254000"/>
+          </a:xfrm>
+          <a:prstGeom prst="rect">
+            <a:avLst/>
+          </a:prstGeom>
+        </p:spPr>
+        <p:txBody>
+          <a:p>
+            <a:fld type="slidenum">
+              <a:rPr sz="900">
+                <a:solidFill>
+                  <a:srgbClr val="003CD3"/>
+                </a:solidFill>
+                <a:latin typeface="Frutiger for ZKB Light"/>
+              </a:rPr>
+              <a:t>&lt;#&gt;</a:t>
+            </a:fld>
+          </a:p>
+        </p:txBody>
+      </p:sp>
+      <p:sp>
+        <p:nvSpPr>
+          <p:cNvPr name="AutoShape 9" id="10020"/>
+          <p:cNvSpPr/>
+          <p:nvPr>
+            <p:ph type="ftr"/>
+          </p:nvPr>
+        </p:nvSpPr>
+        <p:spPr>
+          <a:xfrm>
+            <a:off x="1905000" y="6794500"/>
+            <a:ext cx="7620000" cy="254000"/>
+          </a:xfrm>
+          <a:prstGeom prst="rect">
+            <a:avLst/>
+          </a:prstGeom>
+        </p:spPr>
+        <p:txBody>
+          <a:p>
+            <a:r>
+              <a:rPr lang="en-US" sz="900">
+                <a:solidFill>
+                  <a:srgbClr val="808080"/>
+                </a:solidFill>
+                <a:latin typeface="Frutiger for ZKB Light"/>
+              </a:rPr>
+              <a:t/>
+            </a:r>
+          </a:p>
+        </p:txBody>
+      </p:sp>
     </p:spTree>
-    <p:extLst>
-      <p:ext uri="{BB962C8B-B14F-4D97-AF65-F5344CB8AC3E}">
-        <p14:creationId xmlns:p14="http://schemas.microsoft.com/office/powerpoint/2010/main" val="3566899855"/>
-      </p:ext>
-    </p:extLst>
   </p:cSld>
   <p:clrMapOvr>
     <a:masterClrMapping/>
@@ -3122,9 +3231,10 @@
           <a:lstStyle/>
           <a:p>
             <a:r>
-              <a:rPr lang="en-US"/>
+              <a:rPr lang="en-US" smtClean="0"/>
               <a:t>Click to edit Master title style</a:t>
             </a:r>
+            <a:endParaRPr lang="en-US"/>
           </a:p>
         </p:txBody>
       </p:sp>
@@ -3155,37 +3265,38 @@
           <a:p>
             <a:pPr lvl="0"/>
             <a:r>
-              <a:rPr lang="en-US"/>
+              <a:rPr lang="en-US" smtClean="0"/>
               <a:t>Click to edit Master text styles</a:t>
             </a:r>
           </a:p>
           <a:p>
             <a:pPr lvl="1"/>
             <a:r>
-              <a:rPr lang="en-US"/>
+              <a:rPr lang="en-US" smtClean="0"/>
               <a:t>Second level</a:t>
             </a:r>
           </a:p>
           <a:p>
             <a:pPr lvl="2"/>
             <a:r>
-              <a:rPr lang="en-US"/>
+              <a:rPr lang="en-US" smtClean="0"/>
               <a:t>Third level</a:t>
             </a:r>
           </a:p>
           <a:p>
             <a:pPr lvl="3"/>
             <a:r>
-              <a:rPr lang="en-US"/>
+              <a:rPr lang="en-US" smtClean="0"/>
               <a:t>Fourth level</a:t>
             </a:r>
           </a:p>
           <a:p>
             <a:pPr lvl="4"/>
             <a:r>
-              <a:rPr lang="en-US"/>
+              <a:rPr lang="en-US" smtClean="0"/>
               <a:t>Fifth level</a:t>
             </a:r>
+            <a:endParaRPr lang="en-US"/>
           </a:p>
         </p:txBody>
       </p:sp>
@@ -3201,8 +3312,8 @@
         </p:nvSpPr>
         <p:spPr>
           <a:xfrm>
-            <a:off x="457200" y="4767263"/>
-            <a:ext cx="2133600" cy="273844"/>
+            <a:off x="457200" y="6356350"/>
+            <a:ext cx="2133600" cy="365125"/>
           </a:xfrm>
           <a:prstGeom prst="rect">
             <a:avLst/>
@@ -3212,7 +3323,7 @@
           <a:bodyPr vert="horz" lIns="91440" tIns="45720" rIns="91440" bIns="45720" rtlCol="0" anchor="ctr"/>
           <a:lstStyle>
             <a:lvl1pPr algn="l">
-              <a:defRPr sz="900">
+              <a:defRPr sz="1200">
                 <a:solidFill>
                   <a:schemeClr val="tx1">
                     <a:tint val="75000"/>
@@ -3222,9 +3333,10 @@
             </a:lvl1pPr>
           </a:lstStyle>
           <a:p>
-            <a:fld id="{241EB5C9-1307-BA42-ABA2-0BC069CD8E7F}" type="datetimeFigureOut">
-              <a:rPr lang="en-US" smtClean="0"/>
-              <a:t>1/2/22</a:t>
+            <a:fld id="{1D8BD707-D9CF-40AE-B4C6-C98DA3205C09}" type="datetimeFigureOut">
+              <a:rPr lang="en-US" smtClean="0"/>
+              <a:pPr/>
+              <a:t>8/1/2011</a:t>
             </a:fld>
             <a:endParaRPr lang="en-US"/>
           </a:p>
@@ -3242,8 +3354,8 @@
         </p:nvSpPr>
         <p:spPr>
           <a:xfrm>
-            <a:off x="3124200" y="4767263"/>
-            <a:ext cx="2895600" cy="273844"/>
+            <a:off x="3124200" y="6356350"/>
+            <a:ext cx="2895600" cy="365125"/>
           </a:xfrm>
           <a:prstGeom prst="rect">
             <a:avLst/>
@@ -3253,7 +3365,7 @@
           <a:bodyPr vert="horz" lIns="91440" tIns="45720" rIns="91440" bIns="45720" rtlCol="0" anchor="ctr"/>
           <a:lstStyle>
             <a:lvl1pPr algn="ctr">
-              <a:defRPr sz="900">
+              <a:defRPr sz="1200">
                 <a:solidFill>
                   <a:schemeClr val="tx1">
                     <a:tint val="75000"/>
@@ -3290,7 +3402,7 @@
           <a:bodyPr vert="horz" lIns="91440" tIns="45720" rIns="91440" bIns="45720" rtlCol="0" anchor="ctr"/>
           <a:lstStyle>
             <a:lvl1pPr algn="r">
-              <a:defRPr sz="900">
+              <a:defRPr sz="1200">
                 <a:solidFill>
                   <a:schemeClr val="tx1">
                     <a:tint val="75000"/>
@@ -3300,8 +3412,9 @@
             </a:lvl1pPr>
           </a:lstStyle>
           <a:p>
-            <a:fld id="{C5EF2332-01BF-834F-8236-50238282D533}" type="slidenum">
-              <a:rPr lang="en-US" smtClean="0"/>
+            <a:fld id="{B6F15528-21DE-4FAA-801E-634DDDAF4B2B}" type="slidenum">
+              <a:rPr lang="en-US" smtClean="0"/>
+              <a:pPr/>
               <a:t>‹#›</a:t>
             </a:fld>
             <a:endParaRPr lang="en-US"/>
@@ -3309,11 +3422,6 @@
         </p:txBody>
       </p:sp>
     </p:spTree>
-    <p:extLst>
-      <p:ext uri="{BB962C8B-B14F-4D97-AF65-F5344CB8AC3E}">
-        <p14:creationId xmlns:p14="http://schemas.microsoft.com/office/powerpoint/2010/main" val="3676200875"/>
-      </p:ext>
-    </p:extLst>
   </p:cSld>
   <p:clrMap bg1="lt1" tx1="dk1" bg2="lt2" tx2="dk2" accent1="accent1" accent2="accent2" accent3="accent3" accent4="accent4" accent5="accent5" accent6="accent6" hlink="hlink" folHlink="folHlink"/>
   <p:sldLayoutIdLst>
@@ -3331,12 +3439,12 @@
   </p:sldLayoutIdLst>
   <p:txStyles>
     <p:titleStyle>
-      <a:lvl1pPr algn="ctr" defTabSz="342900" rtl="0" eaLnBrk="1" latinLnBrk="0" hangingPunct="1">
+      <a:lvl1pPr algn="ctr" defTabSz="914400" rtl="0" eaLnBrk="1" latinLnBrk="0" hangingPunct="1">
         <a:spcBef>
           <a:spcPct val="0"/>
         </a:spcBef>
         <a:buNone/>
-        <a:defRPr sz="3300" kern="1200">
+        <a:defRPr sz="4400" kern="1200">
           <a:solidFill>
             <a:schemeClr val="tx1"/>
           </a:solidFill>
@@ -3347,11 +3455,41 @@
       </a:lvl1pPr>
     </p:titleStyle>
     <p:bodyStyle>
-      <a:lvl1pPr marL="342900" indent="-342900" algn="l" defTabSz="342900" rtl="0" eaLnBrk="1" latinLnBrk="0" hangingPunct="1">
+      <a:lvl1pPr marL="342900" indent="-342900" algn="l" defTabSz="914400" rtl="0" eaLnBrk="1" latinLnBrk="0" hangingPunct="1">
         <a:spcBef>
           <a:spcPct val="20000"/>
         </a:spcBef>
-        <a:buFont typeface="Arial"/>
+        <a:buFont typeface="Arial" pitchFamily="34" charset="0"/>
+        <a:buChar char="•"/>
+        <a:defRPr sz="3200" kern="1200">
+          <a:solidFill>
+            <a:schemeClr val="tx1"/>
+          </a:solidFill>
+          <a:latin typeface="+mn-lt"/>
+          <a:ea typeface="+mn-ea"/>
+          <a:cs typeface="+mn-cs"/>
+        </a:defRPr>
+      </a:lvl1pPr>
+      <a:lvl2pPr marL="742950" indent="-285750" algn="l" defTabSz="914400" rtl="0" eaLnBrk="1" latinLnBrk="0" hangingPunct="1">
+        <a:spcBef>
+          <a:spcPct val="20000"/>
+        </a:spcBef>
+        <a:buFont typeface="Arial" pitchFamily="34" charset="0"/>
+        <a:buChar char="–"/>
+        <a:defRPr sz="2800" kern="1200">
+          <a:solidFill>
+            <a:schemeClr val="tx1"/>
+          </a:solidFill>
+          <a:latin typeface="+mn-lt"/>
+          <a:ea typeface="+mn-ea"/>
+          <a:cs typeface="+mn-cs"/>
+        </a:defRPr>
+      </a:lvl2pPr>
+      <a:lvl3pPr marL="1143000" indent="-228600" algn="l" defTabSz="914400" rtl="0" eaLnBrk="1" latinLnBrk="0" hangingPunct="1">
+        <a:spcBef>
+          <a:spcPct val="20000"/>
+        </a:spcBef>
+        <a:buFont typeface="Arial" pitchFamily="34" charset="0"/>
         <a:buChar char="•"/>
         <a:defRPr sz="2400" kern="1200">
           <a:solidFill>
@@ -3361,44 +3499,14 @@
           <a:ea typeface="+mn-ea"/>
           <a:cs typeface="+mn-cs"/>
         </a:defRPr>
-      </a:lvl1pPr>
-      <a:lvl2pPr marL="685800" indent="-342900" algn="l" defTabSz="342900" rtl="0" eaLnBrk="1" latinLnBrk="0" hangingPunct="1">
+      </a:lvl3pPr>
+      <a:lvl4pPr marL="1600200" indent="-228600" algn="l" defTabSz="914400" rtl="0" eaLnBrk="1" latinLnBrk="0" hangingPunct="1">
         <a:spcBef>
           <a:spcPct val="20000"/>
         </a:spcBef>
-        <a:buFont typeface="Arial"/>
+        <a:buFont typeface="Arial" pitchFamily="34" charset="0"/>
         <a:buChar char="–"/>
-        <a:defRPr sz="2100" kern="1200">
-          <a:solidFill>
-            <a:schemeClr val="tx1"/>
-          </a:solidFill>
-          <a:latin typeface="+mn-lt"/>
-          <a:ea typeface="+mn-ea"/>
-          <a:cs typeface="+mn-cs"/>
-        </a:defRPr>
-      </a:lvl2pPr>
-      <a:lvl3pPr marL="1028700" indent="-342900" algn="l" defTabSz="342900" rtl="0" eaLnBrk="1" latinLnBrk="0" hangingPunct="1">
-        <a:spcBef>
-          <a:spcPct val="20000"/>
-        </a:spcBef>
-        <a:buFont typeface="Arial"/>
-        <a:buChar char="•"/>
-        <a:defRPr sz="1800" kern="1200">
-          <a:solidFill>
-            <a:schemeClr val="tx1"/>
-          </a:solidFill>
-          <a:latin typeface="+mn-lt"/>
-          <a:ea typeface="+mn-ea"/>
-          <a:cs typeface="+mn-cs"/>
-        </a:defRPr>
-      </a:lvl3pPr>
-      <a:lvl4pPr marL="1371600" indent="-342900" algn="l" defTabSz="342900" rtl="0" eaLnBrk="1" latinLnBrk="0" hangingPunct="1">
-        <a:spcBef>
-          <a:spcPct val="20000"/>
-        </a:spcBef>
-        <a:buFont typeface="Arial"/>
-        <a:buChar char="–"/>
-        <a:defRPr sz="1500" kern="1200">
+        <a:defRPr sz="2000" kern="1200">
           <a:solidFill>
             <a:schemeClr val="tx1"/>
           </a:solidFill>
@@ -3407,13 +3515,13 @@
           <a:cs typeface="+mn-cs"/>
         </a:defRPr>
       </a:lvl4pPr>
-      <a:lvl5pPr marL="1714500" indent="-342900" algn="l" defTabSz="342900" rtl="0" eaLnBrk="1" latinLnBrk="0" hangingPunct="1">
+      <a:lvl5pPr marL="2057400" indent="-228600" algn="l" defTabSz="914400" rtl="0" eaLnBrk="1" latinLnBrk="0" hangingPunct="1">
         <a:spcBef>
           <a:spcPct val="20000"/>
         </a:spcBef>
-        <a:buFont typeface="Arial"/>
+        <a:buFont typeface="Arial" pitchFamily="34" charset="0"/>
         <a:buChar char="»"/>
-        <a:defRPr sz="1500" kern="1200">
+        <a:defRPr sz="2000" kern="1200">
           <a:solidFill>
             <a:schemeClr val="tx1"/>
           </a:solidFill>
@@ -3422,13 +3530,13 @@
           <a:cs typeface="+mn-cs"/>
         </a:defRPr>
       </a:lvl5pPr>
-      <a:lvl6pPr marL="2057400" indent="-342900" algn="l" defTabSz="342900" rtl="0" eaLnBrk="1" latinLnBrk="0" hangingPunct="1">
+      <a:lvl6pPr marL="2514600" indent="-228600" algn="l" defTabSz="914400" rtl="0" eaLnBrk="1" latinLnBrk="0" hangingPunct="1">
         <a:spcBef>
           <a:spcPct val="20000"/>
         </a:spcBef>
-        <a:buFont typeface="Arial"/>
+        <a:buFont typeface="Arial" pitchFamily="34" charset="0"/>
         <a:buChar char="•"/>
-        <a:defRPr sz="1500" kern="1200">
+        <a:defRPr sz="2000" kern="1200">
           <a:solidFill>
             <a:schemeClr val="tx1"/>
           </a:solidFill>
@@ -3437,13 +3545,13 @@
           <a:cs typeface="+mn-cs"/>
         </a:defRPr>
       </a:lvl6pPr>
-      <a:lvl7pPr marL="2400300" indent="-342900" algn="l" defTabSz="342900" rtl="0" eaLnBrk="1" latinLnBrk="0" hangingPunct="1">
+      <a:lvl7pPr marL="2971800" indent="-228600" algn="l" defTabSz="914400" rtl="0" eaLnBrk="1" latinLnBrk="0" hangingPunct="1">
         <a:spcBef>
           <a:spcPct val="20000"/>
         </a:spcBef>
-        <a:buFont typeface="Arial"/>
+        <a:buFont typeface="Arial" pitchFamily="34" charset="0"/>
         <a:buChar char="•"/>
-        <a:defRPr sz="1500" kern="1200">
+        <a:defRPr sz="2000" kern="1200">
           <a:solidFill>
             <a:schemeClr val="tx1"/>
           </a:solidFill>
@@ -3452,13 +3560,13 @@
           <a:cs typeface="+mn-cs"/>
         </a:defRPr>
       </a:lvl7pPr>
-      <a:lvl8pPr marL="2743200" indent="-342900" algn="l" defTabSz="342900" rtl="0" eaLnBrk="1" latinLnBrk="0" hangingPunct="1">
+      <a:lvl8pPr marL="3429000" indent="-228600" algn="l" defTabSz="914400" rtl="0" eaLnBrk="1" latinLnBrk="0" hangingPunct="1">
         <a:spcBef>
           <a:spcPct val="20000"/>
         </a:spcBef>
-        <a:buFont typeface="Arial"/>
+        <a:buFont typeface="Arial" pitchFamily="34" charset="0"/>
         <a:buChar char="•"/>
-        <a:defRPr sz="1500" kern="1200">
+        <a:defRPr sz="2000" kern="1200">
           <a:solidFill>
             <a:schemeClr val="tx1"/>
           </a:solidFill>
@@ -3467,13 +3575,13 @@
           <a:cs typeface="+mn-cs"/>
         </a:defRPr>
       </a:lvl8pPr>
-      <a:lvl9pPr marL="3086100" indent="-342900" algn="l" defTabSz="342900" rtl="0" eaLnBrk="1" latinLnBrk="0" hangingPunct="1">
+      <a:lvl9pPr marL="3886200" indent="-228600" algn="l" defTabSz="914400" rtl="0" eaLnBrk="1" latinLnBrk="0" hangingPunct="1">
         <a:spcBef>
           <a:spcPct val="20000"/>
         </a:spcBef>
-        <a:buFont typeface="Arial"/>
+        <a:buFont typeface="Arial" pitchFamily="34" charset="0"/>
         <a:buChar char="•"/>
-        <a:defRPr sz="1500" kern="1200">
+        <a:defRPr sz="2000" kern="1200">
           <a:solidFill>
             <a:schemeClr val="tx1"/>
           </a:solidFill>
@@ -3487,8 +3595,8 @@
       <a:defPPr>
         <a:defRPr lang="en-US"/>
       </a:defPPr>
-      <a:lvl1pPr marL="0" algn="l" defTabSz="342900" rtl="0" eaLnBrk="1" latinLnBrk="0" hangingPunct="1">
-        <a:defRPr sz="1350" kern="1200">
+      <a:lvl1pPr marL="0" algn="l" defTabSz="914400" rtl="0" eaLnBrk="1" latinLnBrk="0" hangingPunct="1">
+        <a:defRPr sz="1800" kern="1200">
           <a:solidFill>
             <a:schemeClr val="tx1"/>
           </a:solidFill>
@@ -3497,8 +3605,8 @@
           <a:cs typeface="+mn-cs"/>
         </a:defRPr>
       </a:lvl1pPr>
-      <a:lvl2pPr marL="342900" algn="l" defTabSz="342900" rtl="0" eaLnBrk="1" latinLnBrk="0" hangingPunct="1">
-        <a:defRPr sz="1350" kern="1200">
+      <a:lvl2pPr marL="457200" algn="l" defTabSz="914400" rtl="0" eaLnBrk="1" latinLnBrk="0" hangingPunct="1">
+        <a:defRPr sz="1800" kern="1200">
           <a:solidFill>
             <a:schemeClr val="tx1"/>
           </a:solidFill>
@@ -3507,8 +3615,8 @@
           <a:cs typeface="+mn-cs"/>
         </a:defRPr>
       </a:lvl2pPr>
-      <a:lvl3pPr marL="685800" algn="l" defTabSz="342900" rtl="0" eaLnBrk="1" latinLnBrk="0" hangingPunct="1">
-        <a:defRPr sz="1350" kern="1200">
+      <a:lvl3pPr marL="914400" algn="l" defTabSz="914400" rtl="0" eaLnBrk="1" latinLnBrk="0" hangingPunct="1">
+        <a:defRPr sz="1800" kern="1200">
           <a:solidFill>
             <a:schemeClr val="tx1"/>
           </a:solidFill>
@@ -3517,8 +3625,8 @@
           <a:cs typeface="+mn-cs"/>
         </a:defRPr>
       </a:lvl3pPr>
-      <a:lvl4pPr marL="1028700" algn="l" defTabSz="342900" rtl="0" eaLnBrk="1" latinLnBrk="0" hangingPunct="1">
-        <a:defRPr sz="1350" kern="1200">
+      <a:lvl4pPr marL="1371600" algn="l" defTabSz="914400" rtl="0" eaLnBrk="1" latinLnBrk="0" hangingPunct="1">
+        <a:defRPr sz="1800" kern="1200">
           <a:solidFill>
             <a:schemeClr val="tx1"/>
           </a:solidFill>
@@ -3527,8 +3635,8 @@
           <a:cs typeface="+mn-cs"/>
         </a:defRPr>
       </a:lvl4pPr>
-      <a:lvl5pPr marL="1371600" algn="l" defTabSz="342900" rtl="0" eaLnBrk="1" latinLnBrk="0" hangingPunct="1">
-        <a:defRPr sz="1350" kern="1200">
+      <a:lvl5pPr marL="1828800" algn="l" defTabSz="914400" rtl="0" eaLnBrk="1" latinLnBrk="0" hangingPunct="1">
+        <a:defRPr sz="1800" kern="1200">
           <a:solidFill>
             <a:schemeClr val="tx1"/>
           </a:solidFill>
@@ -3537,8 +3645,8 @@
           <a:cs typeface="+mn-cs"/>
         </a:defRPr>
       </a:lvl5pPr>
-      <a:lvl6pPr marL="1714500" algn="l" defTabSz="342900" rtl="0" eaLnBrk="1" latinLnBrk="0" hangingPunct="1">
-        <a:defRPr sz="1350" kern="1200">
+      <a:lvl6pPr marL="2286000" algn="l" defTabSz="914400" rtl="0" eaLnBrk="1" latinLnBrk="0" hangingPunct="1">
+        <a:defRPr sz="1800" kern="1200">
           <a:solidFill>
             <a:schemeClr val="tx1"/>
           </a:solidFill>
@@ -3547,8 +3655,8 @@
           <a:cs typeface="+mn-cs"/>
         </a:defRPr>
       </a:lvl6pPr>
-      <a:lvl7pPr marL="2057400" algn="l" defTabSz="342900" rtl="0" eaLnBrk="1" latinLnBrk="0" hangingPunct="1">
-        <a:defRPr sz="1350" kern="1200">
+      <a:lvl7pPr marL="2743200" algn="l" defTabSz="914400" rtl="0" eaLnBrk="1" latinLnBrk="0" hangingPunct="1">
+        <a:defRPr sz="1800" kern="1200">
           <a:solidFill>
             <a:schemeClr val="tx1"/>
           </a:solidFill>
@@ -3557,8 +3665,8 @@
           <a:cs typeface="+mn-cs"/>
         </a:defRPr>
       </a:lvl7pPr>
-      <a:lvl8pPr marL="2400300" algn="l" defTabSz="342900" rtl="0" eaLnBrk="1" latinLnBrk="0" hangingPunct="1">
-        <a:defRPr sz="1350" kern="1200">
+      <a:lvl8pPr marL="3200400" algn="l" defTabSz="914400" rtl="0" eaLnBrk="1" latinLnBrk="0" hangingPunct="1">
+        <a:defRPr sz="1800" kern="1200">
           <a:solidFill>
             <a:schemeClr val="tx1"/>
           </a:solidFill>
@@ -3567,8 +3675,8 @@
           <a:cs typeface="+mn-cs"/>
         </a:defRPr>
       </a:lvl8pPr>
-      <a:lvl9pPr marL="2743200" algn="l" defTabSz="342900" rtl="0" eaLnBrk="1" latinLnBrk="0" hangingPunct="1">
-        <a:defRPr sz="1350" kern="1200">
+      <a:lvl9pPr marL="3657600" algn="l" defTabSz="914400" rtl="0" eaLnBrk="1" latinLnBrk="0" hangingPunct="1">
+        <a:defRPr sz="1800" kern="1200">
           <a:solidFill>
             <a:schemeClr val="tx1"/>
           </a:solidFill>
@@ -3580,332 +3688,6 @@
     </p:otherStyle>
   </p:txStyles>
 </p:sldMaster>
-</file>
-
-<file path=ppt/slides/slide1.xml><?xml version="1.0" encoding="utf-8"?>
-<p:sld xmlns:a="http://schemas.openxmlformats.org/drawingml/2006/main" xmlns:p="http://schemas.openxmlformats.org/presentationml/2006/main" xmlns:r="http://schemas.openxmlformats.org/officeDocument/2006/relationships">
-  <p:cSld>
-    <p:spTree>
-      <p:nvGrpSpPr>
-        <p:cNvPr id="1" name=""/>
-        <p:cNvGrpSpPr/>
-        <p:nvPr/>
-      </p:nvGrpSpPr>
-      <p:grpSpPr>
-        <a:xfrm>
-          <a:off x="0" y="0"/>
-          <a:ext cx="0" cy="0"/>
-          <a:chOff x="0" y="0"/>
-          <a:chExt cx="0" cy="0"/>
-        </a:xfrm>
-      </p:grpSpPr>
-      <p:sp>
-        <p:nvSpPr>
-          <p:cNvPr id="10063" name="Title 1"/>
-          <p:cNvSpPr>
-            <a:spLocks noGrp="1"/>
-          </p:cNvSpPr>
-          <p:nvPr>
-            <p:ph type="ctrTitle"/>
-          </p:nvPr>
-        </p:nvSpPr>
-        <p:spPr/>
-        <p:txBody>
-          <a:bodyPr/>
-          <a:lstStyle/>
-          <a:p>
-            <a:r>
-              <a:rPr dirty="0" lang="en-US"/>
-              <a:t>Presentation Title</a:t>
-            </a:r>
-          </a:p>
-        </p:txBody>
-      </p:sp>
-      <p:sp>
-        <p:nvSpPr>
-          <p:cNvPr id="10064" name="Subtitle 2"/>
-          <p:cNvSpPr>
-            <a:spLocks noGrp="1"/>
-          </p:cNvSpPr>
-          <p:nvPr>
-            <p:ph idx="1" type="subTitle"/>
-          </p:nvPr>
-        </p:nvSpPr>
-        <p:spPr/>
-        <p:txBody>
-          <a:bodyPr/>
-          <a:lstStyle/>
-          <a:p>
-            <a:r>
-              <a:rPr dirty="0" lang="en-US"/>
-              <a:t>Presentation Subtitle</a:t>
-            </a:r>
-          </a:p>
-        </p:txBody>
-      </p:sp>
-    </p:spTree>
-    <p:extLst>
-      <p:ext uri="{BB962C8B-B14F-4D97-AF65-F5344CB8AC3E}">
-        <p14:creationId xmlns:p14="http://schemas.microsoft.com/office/powerpoint/2010/main" val="392669009"/>
-      </p:ext>
-    </p:extLst>
-  </p:cSld>
-  <p:clrMapOvr>
-    <a:masterClrMapping/>
-  </p:clrMapOvr>
-</p:sld>
-</file>
-
-<file path=ppt/slides/slide2.xml><?xml version="1.0" encoding="utf-8"?>
-<p:sld xmlns:a="http://schemas.openxmlformats.org/drawingml/2006/main" xmlns:p="http://schemas.openxmlformats.org/presentationml/2006/main" xmlns:r="http://schemas.openxmlformats.org/officeDocument/2006/relationships">
-  <p:cSld>
-    <p:spTree>
-      <p:nvGrpSpPr>
-        <p:cNvPr id="1" name=""/>
-        <p:cNvGrpSpPr/>
-        <p:nvPr/>
-      </p:nvGrpSpPr>
-      <p:grpSpPr>
-        <a:xfrm>
-          <a:off x="0" y="0"/>
-          <a:ext cx="0" cy="0"/>
-          <a:chOff x="0" y="0"/>
-          <a:chExt cx="0" cy="0"/>
-        </a:xfrm>
-      </p:grpSpPr>
-      <p:sp>
-        <p:nvSpPr>
-          <p:cNvPr id="10065" name="Title 1"/>
-          <p:cNvSpPr>
-            <a:spLocks noGrp="1"/>
-          </p:cNvSpPr>
-          <p:nvPr>
-            <p:ph type="title"/>
-          </p:nvPr>
-        </p:nvSpPr>
-        <p:spPr/>
-        <p:txBody>
-          <a:bodyPr/>
-          <a:lstStyle/>
-          <a:p>
-            <a:r>
-              <a:rPr dirty="0" lang="en-US"/>
-              <a:t>Slide Title</a:t>
-            </a:r>
-          </a:p>
-        </p:txBody>
-      </p:sp>
-      <p:sp>
-        <p:nvSpPr>
-          <p:cNvPr id="10066" name="Content Placeholder 2"/>
-          <p:cNvSpPr>
-            <a:spLocks noGrp="1"/>
-          </p:cNvSpPr>
-          <p:nvPr>
-            <p:ph idx="1"/>
-          </p:nvPr>
-        </p:nvSpPr>
-        <p:spPr/>
-        <p:txBody>
-          <a:bodyPr/>
-          <a:lstStyle/>
-          <a:p>
-            <a:pPr indent="0" marL="0">
-              <a:buNone/>
-            </a:pPr>
-            <a:r>
-              <a:rPr dirty="0" lang="en-US"/>
-              <a:t>Hello</a:t>
-            </a:r>
-            <a:r>
-              <a:rPr lang="en-US"/>
-              <a:t>, world.</a:t>
-            </a:r>
-          </a:p>
-        </p:txBody>
-      </p:sp>
-    </p:spTree>
-    <p:extLst>
-      <p:ext uri="{BB962C8B-B14F-4D97-AF65-F5344CB8AC3E}">
-        <p14:creationId xmlns:p14="http://schemas.microsoft.com/office/powerpoint/2010/main" val="572707455"/>
-      </p:ext>
-    </p:extLst>
-  </p:cSld>
-  <p:clrMapOvr>
-    <a:masterClrMapping/>
-  </p:clrMapOvr>
-</p:sld>
-</file>
-
-<file path=ppt/slides/slide3.xml><?xml version="1.0" encoding="utf-8"?>
-<p:sld xmlns:a="http://schemas.openxmlformats.org/drawingml/2006/main" xmlns:p="http://schemas.openxmlformats.org/presentationml/2006/main" xmlns:r="http://schemas.openxmlformats.org/officeDocument/2006/relationships">
-  <p:cSld>
-    <p:spTree>
-      <p:nvGrpSpPr>
-        <p:cNvPr id="1" name=""/>
-        <p:cNvGrpSpPr/>
-        <p:nvPr/>
-      </p:nvGrpSpPr>
-      <p:grpSpPr>
-        <a:xfrm>
-          <a:off x="0" y="0"/>
-          <a:ext cx="0" cy="0"/>
-          <a:chOff x="0" y="0"/>
-          <a:chExt cx="0" cy="0"/>
-        </a:xfrm>
-      </p:grpSpPr>
-      <p:sp>
-        <p:nvSpPr>
-          <p:cNvPr id="10067" name="Title 1"/>
-          <p:cNvSpPr>
-            <a:spLocks noGrp="1"/>
-          </p:cNvSpPr>
-          <p:nvPr>
-            <p:ph type="title"/>
-          </p:nvPr>
-        </p:nvSpPr>
-        <p:spPr/>
-        <p:txBody>
-          <a:bodyPr/>
-          <a:lstStyle/>
-          <a:p>
-            <a:r>
-              <a:rPr dirty="0" lang="en-US"/>
-              <a:t>Section header</a:t>
-            </a:r>
-          </a:p>
-        </p:txBody>
-      </p:sp>
-      <p:sp>
-        <p:nvSpPr>
-          <p:cNvPr id="10068" name="Text Placeholder 2"/>
-          <p:cNvSpPr>
-            <a:spLocks noGrp="1"/>
-          </p:cNvSpPr>
-          <p:nvPr>
-            <p:ph idx="1" type="body"/>
-          </p:nvPr>
-        </p:nvSpPr>
-        <p:spPr/>
-      </p:sp>
-    </p:spTree>
-    <p:extLst>
-      <p:ext uri="{BB962C8B-B14F-4D97-AF65-F5344CB8AC3E}">
-        <p14:creationId xmlns:p14="http://schemas.microsoft.com/office/powerpoint/2010/main" val="3996781534"/>
-      </p:ext>
-    </p:extLst>
-  </p:cSld>
-  <p:clrMapOvr>
-    <a:masterClrMapping/>
-  </p:clrMapOvr>
-</p:sld>
-</file>
-
-<file path=ppt/slides/slide4.xml><?xml version="1.0" encoding="utf-8"?>
-<p:sld xmlns:a="http://schemas.openxmlformats.org/drawingml/2006/main" xmlns:p="http://schemas.openxmlformats.org/presentationml/2006/main" xmlns:r="http://schemas.openxmlformats.org/officeDocument/2006/relationships">
-  <p:cSld>
-    <p:spTree>
-      <p:nvGrpSpPr>
-        <p:cNvPr id="1" name=""/>
-        <p:cNvGrpSpPr/>
-        <p:nvPr/>
-      </p:nvGrpSpPr>
-      <p:grpSpPr>
-        <a:xfrm>
-          <a:off x="0" y="0"/>
-          <a:ext cx="0" cy="0"/>
-          <a:chOff x="0" y="0"/>
-          <a:chExt cx="0" cy="0"/>
-        </a:xfrm>
-      </p:grpSpPr>
-      <p:sp>
-        <p:nvSpPr>
-          <p:cNvPr id="10069" name="Title 3"/>
-          <p:cNvSpPr>
-            <a:spLocks noGrp="1"/>
-          </p:cNvSpPr>
-          <p:nvPr>
-            <p:ph type="title"/>
-          </p:nvPr>
-        </p:nvSpPr>
-        <p:spPr/>
-        <p:txBody>
-          <a:bodyPr/>
-          <a:lstStyle/>
-          <a:p>
-            <a:r>
-              <a:rPr dirty="0" lang="en-US"/>
-              <a:t>Slide Title for Two-Content</a:t>
-            </a:r>
-          </a:p>
-        </p:txBody>
-      </p:sp>
-      <p:sp>
-        <p:nvSpPr>
-          <p:cNvPr id="10070" name="Content Placeholder 4"/>
-          <p:cNvSpPr>
-            <a:spLocks noGrp="1"/>
-          </p:cNvSpPr>
-          <p:nvPr>
-            <p:ph idx="1" sz="half"/>
-          </p:nvPr>
-        </p:nvSpPr>
-        <p:spPr/>
-        <p:txBody>
-          <a:bodyPr/>
-          <a:lstStyle/>
-          <a:p>
-            <a:r>
-              <a:rPr dirty="0" lang="en-US"/>
-              <a:t>Some content on </a:t>
-            </a:r>
-            <a:r>
-              <a:rPr lang="en-US"/>
-              <a:t>the left.</a:t>
-            </a:r>
-            <a:endParaRPr dirty="0" lang="en-US"/>
-          </a:p>
-          <a:p>
-            <a:pPr indent="0" marL="0">
-              <a:buNone/>
-            </a:pPr>
-            <a:endParaRPr dirty="0" lang="en-US"/>
-          </a:p>
-        </p:txBody>
-      </p:sp>
-      <p:sp>
-        <p:nvSpPr>
-          <p:cNvPr id="10071" name="Content Placeholder 5"/>
-          <p:cNvSpPr>
-            <a:spLocks noGrp="1"/>
-          </p:cNvSpPr>
-          <p:nvPr>
-            <p:ph idx="2" sz="half"/>
-          </p:nvPr>
-        </p:nvSpPr>
-        <p:spPr/>
-        <p:txBody>
-          <a:bodyPr/>
-          <a:lstStyle/>
-          <a:p>
-            <a:r>
-              <a:rPr dirty="0" lang="en-US"/>
-              <a:t>Some content on the right.</a:t>
-            </a:r>
-          </a:p>
-        </p:txBody>
-      </p:sp>
-    </p:spTree>
-    <p:extLst>
-      <p:ext uri="{BB962C8B-B14F-4D97-AF65-F5344CB8AC3E}">
-        <p14:creationId xmlns:p14="http://schemas.microsoft.com/office/powerpoint/2010/main" val="1324621109"/>
-      </p:ext>
-    </p:extLst>
-  </p:cSld>
-  <p:clrMapOvr>
-    <a:masterClrMapping/>
-  </p:clrMapOvr>
-</p:sld>
 </file>
 
 <file path=ppt/theme/theme1.xml><?xml version="1.0" encoding="utf-8"?>
@@ -3983,7 +3765,6 @@
         <a:font script="Mong" typeface="Mongolian Baiti"/>
         <a:font script="Viet" typeface="Times New Roman"/>
         <a:font script="Uigh" typeface="Microsoft Uighur"/>
-        <a:font script="Geor" typeface="Sylfaen"/>
       </a:majorFont>
       <a:minorFont>
         <a:latin typeface="Frutiger for ZKB Light"/>
@@ -4018,7 +3799,6 @@
         <a:font script="Mong" typeface="Mongolian Baiti"/>
         <a:font script="Viet" typeface="Arial"/>
         <a:font script="Uigh" typeface="Microsoft Uighur"/>
-        <a:font script="Geor" typeface="Sylfaen"/>
       </a:minorFont>
     </a:fontScheme>
     <a:fmtScheme name="Office">
@@ -4053,16 +3833,20 @@
           <a:gsLst>
             <a:gs pos="0">
               <a:schemeClr val="phClr">
-                <a:tint val="100000"/>
-                <a:shade val="100000"/>
+                <a:shade val="51000"/>
+                <a:satMod val="130000"/>
+              </a:schemeClr>
+            </a:gs>
+            <a:gs pos="80000">
+              <a:schemeClr val="phClr">
+                <a:shade val="93000"/>
                 <a:satMod val="130000"/>
               </a:schemeClr>
             </a:gs>
             <a:gs pos="100000">
               <a:schemeClr val="phClr">
-                <a:tint val="50000"/>
-                <a:shade val="100000"/>
-                <a:satMod val="350000"/>
+                <a:shade val="94000"/>
+                <a:satMod val="135000"/>
               </a:schemeClr>
             </a:gs>
           </a:gsLst>
@@ -4184,307 +3968,7 @@
       </a:bgFillStyleLst>
     </a:fmtScheme>
   </a:themeElements>
-  <a:objectDefaults>
-    <a:spDef>
-      <a:spPr/>
-      <a:bodyPr/>
-      <a:lstStyle/>
-      <a:style>
-        <a:lnRef idx="1">
-          <a:schemeClr val="accent1"/>
-        </a:lnRef>
-        <a:fillRef idx="3">
-          <a:schemeClr val="accent1"/>
-        </a:fillRef>
-        <a:effectRef idx="2">
-          <a:schemeClr val="accent1"/>
-        </a:effectRef>
-        <a:fontRef idx="minor">
-          <a:schemeClr val="lt1"/>
-        </a:fontRef>
-      </a:style>
-    </a:spDef>
-    <a:lnDef>
-      <a:spPr/>
-      <a:bodyPr/>
-      <a:lstStyle/>
-      <a:style>
-        <a:lnRef idx="2">
-          <a:schemeClr val="accent1"/>
-        </a:lnRef>
-        <a:fillRef idx="0">
-          <a:schemeClr val="accent1"/>
-        </a:fillRef>
-        <a:effectRef idx="1">
-          <a:schemeClr val="accent1"/>
-        </a:effectRef>
-        <a:fontRef idx="minor">
-          <a:schemeClr val="tx1"/>
-        </a:fontRef>
-      </a:style>
-    </a:lnDef>
-  </a:objectDefaults>
+  <a:objectDefaults/>
   <a:extraClrSchemeLst/>
 </a:theme>
-</file>
-
-<file path=ppt/theme/theme2.xml><?xml version="1.0" encoding="utf-8"?>
-<a:theme xmlns:a="http://schemas.openxmlformats.org/drawingml/2006/main" name="Office Theme">
-  <a:themeElements>
-    <a:clrScheme name="Office">
-      <a:dk1>
-        <a:sysClr val="windowText" lastClr="000000"/>
-      </a:dk1>
-      <a:lt1>
-        <a:sysClr val="window" lastClr="FFFFFF"/>
-      </a:lt1>
-      <a:dk2>
-        <a:srgbClr val="44546A"/>
-      </a:dk2>
-      <a:lt2>
-        <a:srgbClr val="E7E6E6"/>
-      </a:lt2>
-      <a:accent1>
-        <a:srgbClr val="5B9BD5"/>
-      </a:accent1>
-      <a:accent2>
-        <a:srgbClr val="ED7D31"/>
-      </a:accent2>
-      <a:accent3>
-        <a:srgbClr val="A5A5A5"/>
-      </a:accent3>
-      <a:accent4>
-        <a:srgbClr val="FFC000"/>
-      </a:accent4>
-      <a:accent5>
-        <a:srgbClr val="4472C4"/>
-      </a:accent5>
-      <a:accent6>
-        <a:srgbClr val="70AD47"/>
-      </a:accent6>
-      <a:hlink>
-        <a:srgbClr val="0563C1"/>
-      </a:hlink>
-      <a:folHlink>
-        <a:srgbClr val="954F72"/>
-      </a:folHlink>
-    </a:clrScheme>
-    <a:fontScheme name="Office">
-      <a:majorFont>
-        <a:latin typeface="Calibri Light" panose="020F0302020204030204"/>
-        <a:ea typeface=""/>
-        <a:cs typeface=""/>
-        <a:font script="Jpan" typeface="ＭＳ Ｐゴシック"/>
-        <a:font script="Hang" typeface="맑은 고딕"/>
-        <a:font script="Hans" typeface="宋体"/>
-        <a:font script="Hant" typeface="新細明體"/>
-        <a:font script="Arab" typeface="Times New Roman"/>
-        <a:font script="Hebr" typeface="Times New Roman"/>
-        <a:font script="Thai" typeface="Angsana New"/>
-        <a:font script="Ethi" typeface="Nyala"/>
-        <a:font script="Beng" typeface="Vrinda"/>
-        <a:font script="Gujr" typeface="Shruti"/>
-        <a:font script="Khmr" typeface="MoolBoran"/>
-        <a:font script="Knda" typeface="Tunga"/>
-        <a:font script="Guru" typeface="Raavi"/>
-        <a:font script="Cans" typeface="Euphemia"/>
-        <a:font script="Cher" typeface="Plantagenet Cherokee"/>
-        <a:font script="Yiii" typeface="Microsoft Yi Baiti"/>
-        <a:font script="Tibt" typeface="Microsoft Himalaya"/>
-        <a:font script="Thaa" typeface="MV Boli"/>
-        <a:font script="Deva" typeface="Mangal"/>
-        <a:font script="Telu" typeface="Gautami"/>
-        <a:font script="Taml" typeface="Latha"/>
-        <a:font script="Syrc" typeface="Estrangelo Edessa"/>
-        <a:font script="Orya" typeface="Kalinga"/>
-        <a:font script="Mlym" typeface="Kartika"/>
-        <a:font script="Laoo" typeface="DokChampa"/>
-        <a:font script="Sinh" typeface="Iskoola Pota"/>
-        <a:font script="Mong" typeface="Mongolian Baiti"/>
-        <a:font script="Viet" typeface="Times New Roman"/>
-        <a:font script="Uigh" typeface="Microsoft Uighur"/>
-        <a:font script="Geor" typeface="Sylfaen"/>
-      </a:majorFont>
-      <a:minorFont>
-        <a:latin typeface="Calibri" panose="020F0502020204030204"/>
-        <a:ea typeface=""/>
-        <a:cs typeface=""/>
-        <a:font script="Jpan" typeface="ＭＳ Ｐゴシック"/>
-        <a:font script="Hang" typeface="맑은 고딕"/>
-        <a:font script="Hans" typeface="宋体"/>
-        <a:font script="Hant" typeface="新細明體"/>
-        <a:font script="Arab" typeface="Arial"/>
-        <a:font script="Hebr" typeface="Arial"/>
-        <a:font script="Thai" typeface="Cordia New"/>
-        <a:font script="Ethi" typeface="Nyala"/>
-        <a:font script="Beng" typeface="Vrinda"/>
-        <a:font script="Gujr" typeface="Shruti"/>
-        <a:font script="Khmr" typeface="DaunPenh"/>
-        <a:font script="Knda" typeface="Tunga"/>
-        <a:font script="Guru" typeface="Raavi"/>
-        <a:font script="Cans" typeface="Euphemia"/>
-        <a:font script="Cher" typeface="Plantagenet Cherokee"/>
-        <a:font script="Yiii" typeface="Microsoft Yi Baiti"/>
-        <a:font script="Tibt" typeface="Microsoft Himalaya"/>
-        <a:font script="Thaa" typeface="MV Boli"/>
-        <a:font script="Deva" typeface="Mangal"/>
-        <a:font script="Telu" typeface="Gautami"/>
-        <a:font script="Taml" typeface="Latha"/>
-        <a:font script="Syrc" typeface="Estrangelo Edessa"/>
-        <a:font script="Orya" typeface="Kalinga"/>
-        <a:font script="Mlym" typeface="Kartika"/>
-        <a:font script="Laoo" typeface="DokChampa"/>
-        <a:font script="Sinh" typeface="Iskoola Pota"/>
-        <a:font script="Mong" typeface="Mongolian Baiti"/>
-        <a:font script="Viet" typeface="Arial"/>
-        <a:font script="Uigh" typeface="Microsoft Uighur"/>
-        <a:font script="Geor" typeface="Sylfaen"/>
-      </a:minorFont>
-    </a:fontScheme>
-    <a:fmtScheme name="Office">
-      <a:fillStyleLst>
-        <a:solidFill>
-          <a:schemeClr val="phClr"/>
-        </a:solidFill>
-        <a:gradFill rotWithShape="1">
-          <a:gsLst>
-            <a:gs pos="0">
-              <a:schemeClr val="phClr">
-                <a:lumMod val="110000"/>
-                <a:satMod val="105000"/>
-                <a:tint val="67000"/>
-              </a:schemeClr>
-            </a:gs>
-            <a:gs pos="50000">
-              <a:schemeClr val="phClr">
-                <a:lumMod val="105000"/>
-                <a:satMod val="103000"/>
-                <a:tint val="73000"/>
-              </a:schemeClr>
-            </a:gs>
-            <a:gs pos="100000">
-              <a:schemeClr val="phClr">
-                <a:lumMod val="105000"/>
-                <a:satMod val="109000"/>
-                <a:tint val="81000"/>
-              </a:schemeClr>
-            </a:gs>
-          </a:gsLst>
-          <a:lin ang="5400000" scaled="0"/>
-        </a:gradFill>
-        <a:gradFill rotWithShape="1">
-          <a:gsLst>
-            <a:gs pos="0">
-              <a:schemeClr val="phClr">
-                <a:satMod val="103000"/>
-                <a:lumMod val="102000"/>
-                <a:tint val="94000"/>
-              </a:schemeClr>
-            </a:gs>
-            <a:gs pos="50000">
-              <a:schemeClr val="phClr">
-                <a:satMod val="110000"/>
-                <a:lumMod val="100000"/>
-                <a:shade val="100000"/>
-              </a:schemeClr>
-            </a:gs>
-            <a:gs pos="100000">
-              <a:schemeClr val="phClr">
-                <a:lumMod val="99000"/>
-                <a:satMod val="120000"/>
-                <a:shade val="78000"/>
-              </a:schemeClr>
-            </a:gs>
-          </a:gsLst>
-          <a:lin ang="5400000" scaled="0"/>
-        </a:gradFill>
-      </a:fillStyleLst>
-      <a:lnStyleLst>
-        <a:ln w="6350" cap="flat" cmpd="sng" algn="ctr">
-          <a:solidFill>
-            <a:schemeClr val="phClr"/>
-          </a:solidFill>
-          <a:prstDash val="solid"/>
-          <a:miter lim="800000"/>
-        </a:ln>
-        <a:ln w="12700" cap="flat" cmpd="sng" algn="ctr">
-          <a:solidFill>
-            <a:schemeClr val="phClr"/>
-          </a:solidFill>
-          <a:prstDash val="solid"/>
-          <a:miter lim="800000"/>
-        </a:ln>
-        <a:ln w="19050" cap="flat" cmpd="sng" algn="ctr">
-          <a:solidFill>
-            <a:schemeClr val="phClr"/>
-          </a:solidFill>
-          <a:prstDash val="solid"/>
-          <a:miter lim="800000"/>
-        </a:ln>
-      </a:lnStyleLst>
-      <a:effectStyleLst>
-        <a:effectStyle>
-          <a:effectLst/>
-        </a:effectStyle>
-        <a:effectStyle>
-          <a:effectLst/>
-        </a:effectStyle>
-        <a:effectStyle>
-          <a:effectLst>
-            <a:outerShdw blurRad="57150" dist="19050" dir="5400000" algn="ctr" rotWithShape="0">
-              <a:srgbClr val="000000">
-                <a:alpha val="63000"/>
-              </a:srgbClr>
-            </a:outerShdw>
-          </a:effectLst>
-        </a:effectStyle>
-      </a:effectStyleLst>
-      <a:bgFillStyleLst>
-        <a:solidFill>
-          <a:schemeClr val="phClr"/>
-        </a:solidFill>
-        <a:solidFill>
-          <a:schemeClr val="phClr">
-            <a:tint val="95000"/>
-            <a:satMod val="170000"/>
-          </a:schemeClr>
-        </a:solidFill>
-        <a:gradFill rotWithShape="1">
-          <a:gsLst>
-            <a:gs pos="0">
-              <a:schemeClr val="phClr">
-                <a:tint val="93000"/>
-                <a:satMod val="150000"/>
-                <a:shade val="98000"/>
-                <a:lumMod val="102000"/>
-              </a:schemeClr>
-            </a:gs>
-            <a:gs pos="50000">
-              <a:schemeClr val="phClr">
-                <a:tint val="98000"/>
-                <a:satMod val="130000"/>
-                <a:shade val="90000"/>
-                <a:lumMod val="103000"/>
-              </a:schemeClr>
-            </a:gs>
-            <a:gs pos="100000">
-              <a:schemeClr val="phClr">
-                <a:shade val="63000"/>
-                <a:satMod val="120000"/>
-              </a:schemeClr>
-            </a:gs>
-          </a:gsLst>
-          <a:lin ang="5400000" scaled="0"/>
-        </a:gradFill>
-      </a:bgFillStyleLst>
-    </a:fmtScheme>
-  </a:themeElements>
-  <a:objectDefaults/>
-  <a:extraClrSchemeLst/>
-  <a:extLst>
-    <a:ext uri="{05A4C25C-085E-4340-85A3-A5531E510DB2}">
-      <thm15:themeFamily xmlns:thm15="http://schemas.microsoft.com/office/thememl/2012/main" name="Office Theme" id="{62F939B6-93AF-4DB8-9C6B-D6C7DFDC589F}" vid="{4A3C46E8-61CC-4603-A589-7422A47A8E4A}"/>
-    </a:ext>
-  </a:extLst>
-</a:theme>
 </file>
</xml_diff>